<commit_message>
Tratando de arreglar CI
</commit_message>
<xml_diff>
--- a/SaleIt-Presentacion.pptx
+++ b/SaleIt-Presentacion.pptx
@@ -139,10 +139,25 @@
   <pc:docChgLst>
     <pc:chgData name="FRASICA GALEANO JUAN SEBASTIAN" userId="128aa009-e141-41b9-a618-d481cff12e1e" providerId="ADAL" clId="{CFFDAFDA-5679-42B5-ACDF-ED79AC33DEC6}"/>
     <pc:docChg chg="custSel addSld modSld sldOrd">
-      <pc:chgData name="FRASICA GALEANO JUAN SEBASTIAN" userId="128aa009-e141-41b9-a618-d481cff12e1e" providerId="ADAL" clId="{CFFDAFDA-5679-42B5-ACDF-ED79AC33DEC6}" dt="2020-09-30T19:39:00.112" v="41" actId="1076"/>
+      <pc:chgData name="FRASICA GALEANO JUAN SEBASTIAN" userId="128aa009-e141-41b9-a618-d481cff12e1e" providerId="ADAL" clId="{CFFDAFDA-5679-42B5-ACDF-ED79AC33DEC6}" dt="2020-10-01T17:41:37.716" v="95" actId="20577"/>
       <pc:docMkLst>
         <pc:docMk/>
       </pc:docMkLst>
+      <pc:sldChg chg="modSp mod">
+        <pc:chgData name="FRASICA GALEANO JUAN SEBASTIAN" userId="128aa009-e141-41b9-a618-d481cff12e1e" providerId="ADAL" clId="{CFFDAFDA-5679-42B5-ACDF-ED79AC33DEC6}" dt="2020-10-01T17:41:37.716" v="95" actId="20577"/>
+        <pc:sldMkLst>
+          <pc:docMk/>
+          <pc:sldMk cId="1046913354" sldId="257"/>
+        </pc:sldMkLst>
+        <pc:spChg chg="mod">
+          <ac:chgData name="FRASICA GALEANO JUAN SEBASTIAN" userId="128aa009-e141-41b9-a618-d481cff12e1e" providerId="ADAL" clId="{CFFDAFDA-5679-42B5-ACDF-ED79AC33DEC6}" dt="2020-10-01T17:41:37.716" v="95" actId="20577"/>
+          <ac:spMkLst>
+            <pc:docMk/>
+            <pc:sldMk cId="1046913354" sldId="257"/>
+            <ac:spMk id="3" creationId="{E86A9A0E-D6E1-42F1-9BA8-9654A388A139}"/>
+          </ac:spMkLst>
+        </pc:spChg>
+      </pc:sldChg>
       <pc:sldChg chg="addSp delSp modSp mod">
         <pc:chgData name="FRASICA GALEANO JUAN SEBASTIAN" userId="128aa009-e141-41b9-a618-d481cff12e1e" providerId="ADAL" clId="{CFFDAFDA-5679-42B5-ACDF-ED79AC33DEC6}" dt="2020-09-30T19:38:21.136" v="27" actId="1076"/>
         <pc:sldMkLst>
@@ -5396,7 +5411,7 @@
           <a:p>
             <a:fld id="{3C04E684-10F4-4CC3-A0B9-F03AA7BE37CF}" type="datetimeFigureOut">
               <a:rPr lang="en-US" smtClean="0"/>
-              <a:t>9/30/2020</a:t>
+              <a:t>10/1/2020</a:t>
             </a:fld>
             <a:endParaRPr lang="en-US"/>
           </a:p>
@@ -7886,7 +7901,7 @@
           <a:p>
             <a:fld id="{3C04E684-10F4-4CC3-A0B9-F03AA7BE37CF}" type="datetimeFigureOut">
               <a:rPr lang="en-US" smtClean="0"/>
-              <a:t>9/30/2020</a:t>
+              <a:t>10/1/2020</a:t>
             </a:fld>
             <a:endParaRPr lang="en-US"/>
           </a:p>
@@ -8084,7 +8099,7 @@
           <a:p>
             <a:fld id="{3C04E684-10F4-4CC3-A0B9-F03AA7BE37CF}" type="datetimeFigureOut">
               <a:rPr lang="en-US" smtClean="0"/>
-              <a:t>9/30/2020</a:t>
+              <a:t>10/1/2020</a:t>
             </a:fld>
             <a:endParaRPr lang="en-US"/>
           </a:p>
@@ -8292,7 +8307,7 @@
           <a:p>
             <a:fld id="{3C04E684-10F4-4CC3-A0B9-F03AA7BE37CF}" type="datetimeFigureOut">
               <a:rPr lang="en-US" smtClean="0"/>
-              <a:t>9/30/2020</a:t>
+              <a:t>10/1/2020</a:t>
             </a:fld>
             <a:endParaRPr lang="en-US"/>
           </a:p>
@@ -9029,7 +9044,7 @@
           <a:p>
             <a:fld id="{3C04E684-10F4-4CC3-A0B9-F03AA7BE37CF}" type="datetimeFigureOut">
               <a:rPr lang="en-US" smtClean="0"/>
-              <a:t>9/30/2020</a:t>
+              <a:t>10/1/2020</a:t>
             </a:fld>
             <a:endParaRPr lang="en-US"/>
           </a:p>
@@ -9671,7 +9686,7 @@
           <a:p>
             <a:fld id="{3C04E684-10F4-4CC3-A0B9-F03AA7BE37CF}" type="datetimeFigureOut">
               <a:rPr lang="en-US" smtClean="0"/>
-              <a:t>9/30/2020</a:t>
+              <a:t>10/1/2020</a:t>
             </a:fld>
             <a:endParaRPr lang="en-US"/>
           </a:p>
@@ -10471,7 +10486,7 @@
           <a:p>
             <a:fld id="{3C04E684-10F4-4CC3-A0B9-F03AA7BE37CF}" type="datetimeFigureOut">
               <a:rPr lang="en-US" smtClean="0"/>
-              <a:t>9/30/2020</a:t>
+              <a:t>10/1/2020</a:t>
             </a:fld>
             <a:endParaRPr lang="en-US"/>
           </a:p>
@@ -11422,7 +11437,7 @@
           <a:p>
             <a:fld id="{3C04E684-10F4-4CC3-A0B9-F03AA7BE37CF}" type="datetimeFigureOut">
               <a:rPr lang="en-US" smtClean="0"/>
-              <a:t>9/30/2020</a:t>
+              <a:t>10/1/2020</a:t>
             </a:fld>
             <a:endParaRPr lang="en-US"/>
           </a:p>
@@ -13771,7 +13786,7 @@
           <a:p>
             <a:fld id="{3C04E684-10F4-4CC3-A0B9-F03AA7BE37CF}" type="datetimeFigureOut">
               <a:rPr lang="en-US" smtClean="0"/>
-              <a:t>9/30/2020</a:t>
+              <a:t>10/1/2020</a:t>
             </a:fld>
             <a:endParaRPr lang="en-US"/>
           </a:p>
@@ -13884,7 +13899,7 @@
           <a:p>
             <a:fld id="{3C04E684-10F4-4CC3-A0B9-F03AA7BE37CF}" type="datetimeFigureOut">
               <a:rPr lang="en-US" smtClean="0"/>
-              <a:t>9/30/2020</a:t>
+              <a:t>10/1/2020</a:t>
             </a:fld>
             <a:endParaRPr lang="en-US"/>
           </a:p>
@@ -14391,7 +14406,7 @@
           <a:p>
             <a:fld id="{3C04E684-10F4-4CC3-A0B9-F03AA7BE37CF}" type="datetimeFigureOut">
               <a:rPr lang="en-US" smtClean="0"/>
-              <a:t>9/30/2020</a:t>
+              <a:t>10/1/2020</a:t>
             </a:fld>
             <a:endParaRPr lang="en-US"/>
           </a:p>
@@ -15694,7 +15709,7 @@
           <a:p>
             <a:fld id="{3C04E684-10F4-4CC3-A0B9-F03AA7BE37CF}" type="datetimeFigureOut">
               <a:rPr lang="en-US" smtClean="0"/>
-              <a:t>9/30/2020</a:t>
+              <a:t>10/1/2020</a:t>
             </a:fld>
             <a:endParaRPr lang="en-US"/>
           </a:p>
@@ -15941,7 +15956,7 @@
           <a:p>
             <a:fld id="{3C04E684-10F4-4CC3-A0B9-F03AA7BE37CF}" type="datetimeFigureOut">
               <a:rPr lang="en-US" smtClean="0"/>
-              <a:t>9/30/2020</a:t>
+              <a:t>10/1/2020</a:t>
             </a:fld>
             <a:endParaRPr lang="en-US"/>
           </a:p>
@@ -21352,27 +21367,57 @@
           <a:lstStyle/>
           <a:p>
             <a:r>
-              <a:rPr lang="es-CO" sz="2000" b="0">
+              <a:rPr lang="es-CO" sz="2000" b="0" dirty="0" err="1">
                 <a:effectLst/>
                 <a:latin typeface="-apple-system"/>
               </a:rPr>
-              <a:t>SaleIt es una aplicación web realizada como proyecto para la materia </a:t>
+              <a:t>SaleIt</a:t>
             </a:r>
             <a:r>
-              <a:rPr lang="es-CO" sz="2000" b="1">
+              <a:rPr lang="es-CO" sz="2000" b="0" dirty="0">
+                <a:effectLst/>
+                <a:latin typeface="-apple-system"/>
+              </a:rPr>
+              <a:t> es una aplicación web realizada como proyecto para la materia </a:t>
+            </a:r>
+            <a:r>
+              <a:rPr lang="es-CO" sz="2000" b="1" dirty="0">
                 <a:effectLst/>
                 <a:latin typeface="-apple-system"/>
               </a:rPr>
               <a:t>Arquitecturas de Software (ARSW)</a:t>
             </a:r>
             <a:r>
+              <a:rPr lang="es-CO" sz="2000" b="0" dirty="0">
+                <a:effectLst/>
+                <a:latin typeface="-apple-system"/>
+              </a:rPr>
+              <a:t> de la Escuela Colombiana de Ingeniería Julio Garavito. </a:t>
+            </a:r>
+          </a:p>
+          <a:p>
+            <a:r>
+              <a:rPr lang="es-CO" sz="2000" b="0" dirty="0">
+                <a:effectLst/>
+                <a:latin typeface="-apple-system"/>
+              </a:rPr>
+              <a:t>Es una aplicación para realizar subastas </a:t>
+            </a:r>
+            <a:r>
               <a:rPr lang="es-CO" sz="2000" b="0">
                 <a:effectLst/>
                 <a:latin typeface="-apple-system"/>
               </a:rPr>
-              <a:t> de la Escuela Colombiana de Ingeniería Julio Garavito. Es una aplicación para realizar subastas. Allí el usuario podrá ofertar artículos y pujar para conseguirlos.</a:t>
+              <a:t>en línea. </a:t>
             </a:r>
-            <a:endParaRPr lang="es-CO" sz="2000"/>
+            <a:r>
+              <a:rPr lang="es-CO" sz="2000" b="0" dirty="0">
+                <a:effectLst/>
+                <a:latin typeface="-apple-system"/>
+              </a:rPr>
+              <a:t>Allí el usuario podrá conseguir y vender artículos únicos.</a:t>
+            </a:r>
+            <a:endParaRPr lang="es-CO" sz="2000" dirty="0"/>
           </a:p>
         </p:txBody>
       </p:sp>

</xml_diff>

<commit_message>
Correccion readme y diagrama de despliegue
</commit_message>
<xml_diff>
--- a/SaleIt-Presentacion.pptx
+++ b/SaleIt-Presentacion.pptx
@@ -9,17 +9,14 @@
     <p:sldId id="257" r:id="rId3"/>
     <p:sldId id="258" r:id="rId4"/>
     <p:sldId id="260" r:id="rId5"/>
-    <p:sldId id="261" r:id="rId6"/>
-    <p:sldId id="262" r:id="rId7"/>
-    <p:sldId id="259" r:id="rId8"/>
-    <p:sldId id="270" r:id="rId9"/>
-    <p:sldId id="269" r:id="rId10"/>
-    <p:sldId id="263" r:id="rId11"/>
-    <p:sldId id="264" r:id="rId12"/>
-    <p:sldId id="265" r:id="rId13"/>
-    <p:sldId id="266" r:id="rId14"/>
-    <p:sldId id="268" r:id="rId15"/>
-    <p:sldId id="267" r:id="rId16"/>
+    <p:sldId id="259" r:id="rId6"/>
+    <p:sldId id="270" r:id="rId7"/>
+    <p:sldId id="263" r:id="rId8"/>
+    <p:sldId id="264" r:id="rId9"/>
+    <p:sldId id="265" r:id="rId10"/>
+    <p:sldId id="269" r:id="rId11"/>
+    <p:sldId id="266" r:id="rId12"/>
+    <p:sldId id="267" r:id="rId13"/>
   </p:sldIdLst>
   <p:sldSz cx="12192000" cy="6858000"/>
   <p:notesSz cx="6858000" cy="9144000"/>
@@ -5411,7 +5408,7 @@
           <a:p>
             <a:fld id="{3C04E684-10F4-4CC3-A0B9-F03AA7BE37CF}" type="datetimeFigureOut">
               <a:rPr lang="en-US" smtClean="0"/>
-              <a:t>10/1/2020</a:t>
+              <a:t>10/19/2020</a:t>
             </a:fld>
             <a:endParaRPr lang="en-US"/>
           </a:p>
@@ -7901,7 +7898,7 @@
           <a:p>
             <a:fld id="{3C04E684-10F4-4CC3-A0B9-F03AA7BE37CF}" type="datetimeFigureOut">
               <a:rPr lang="en-US" smtClean="0"/>
-              <a:t>10/1/2020</a:t>
+              <a:t>10/19/2020</a:t>
             </a:fld>
             <a:endParaRPr lang="en-US"/>
           </a:p>
@@ -8099,7 +8096,7 @@
           <a:p>
             <a:fld id="{3C04E684-10F4-4CC3-A0B9-F03AA7BE37CF}" type="datetimeFigureOut">
               <a:rPr lang="en-US" smtClean="0"/>
-              <a:t>10/1/2020</a:t>
+              <a:t>10/19/2020</a:t>
             </a:fld>
             <a:endParaRPr lang="en-US"/>
           </a:p>
@@ -8307,7 +8304,7 @@
           <a:p>
             <a:fld id="{3C04E684-10F4-4CC3-A0B9-F03AA7BE37CF}" type="datetimeFigureOut">
               <a:rPr lang="en-US" smtClean="0"/>
-              <a:t>10/1/2020</a:t>
+              <a:t>10/19/2020</a:t>
             </a:fld>
             <a:endParaRPr lang="en-US"/>
           </a:p>
@@ -9044,7 +9041,7 @@
           <a:p>
             <a:fld id="{3C04E684-10F4-4CC3-A0B9-F03AA7BE37CF}" type="datetimeFigureOut">
               <a:rPr lang="en-US" smtClean="0"/>
-              <a:t>10/1/2020</a:t>
+              <a:t>10/19/2020</a:t>
             </a:fld>
             <a:endParaRPr lang="en-US"/>
           </a:p>
@@ -9686,7 +9683,7 @@
           <a:p>
             <a:fld id="{3C04E684-10F4-4CC3-A0B9-F03AA7BE37CF}" type="datetimeFigureOut">
               <a:rPr lang="en-US" smtClean="0"/>
-              <a:t>10/1/2020</a:t>
+              <a:t>10/19/2020</a:t>
             </a:fld>
             <a:endParaRPr lang="en-US"/>
           </a:p>
@@ -10486,7 +10483,7 @@
           <a:p>
             <a:fld id="{3C04E684-10F4-4CC3-A0B9-F03AA7BE37CF}" type="datetimeFigureOut">
               <a:rPr lang="en-US" smtClean="0"/>
-              <a:t>10/1/2020</a:t>
+              <a:t>10/19/2020</a:t>
             </a:fld>
             <a:endParaRPr lang="en-US"/>
           </a:p>
@@ -11437,7 +11434,7 @@
           <a:p>
             <a:fld id="{3C04E684-10F4-4CC3-A0B9-F03AA7BE37CF}" type="datetimeFigureOut">
               <a:rPr lang="en-US" smtClean="0"/>
-              <a:t>10/1/2020</a:t>
+              <a:t>10/19/2020</a:t>
             </a:fld>
             <a:endParaRPr lang="en-US"/>
           </a:p>
@@ -13786,7 +13783,7 @@
           <a:p>
             <a:fld id="{3C04E684-10F4-4CC3-A0B9-F03AA7BE37CF}" type="datetimeFigureOut">
               <a:rPr lang="en-US" smtClean="0"/>
-              <a:t>10/1/2020</a:t>
+              <a:t>10/19/2020</a:t>
             </a:fld>
             <a:endParaRPr lang="en-US"/>
           </a:p>
@@ -13899,7 +13896,7 @@
           <a:p>
             <a:fld id="{3C04E684-10F4-4CC3-A0B9-F03AA7BE37CF}" type="datetimeFigureOut">
               <a:rPr lang="en-US" smtClean="0"/>
-              <a:t>10/1/2020</a:t>
+              <a:t>10/19/2020</a:t>
             </a:fld>
             <a:endParaRPr lang="en-US"/>
           </a:p>
@@ -14406,7 +14403,7 @@
           <a:p>
             <a:fld id="{3C04E684-10F4-4CC3-A0B9-F03AA7BE37CF}" type="datetimeFigureOut">
               <a:rPr lang="en-US" smtClean="0"/>
-              <a:t>10/1/2020</a:t>
+              <a:t>10/19/2020</a:t>
             </a:fld>
             <a:endParaRPr lang="en-US"/>
           </a:p>
@@ -15709,7 +15706,7 @@
           <a:p>
             <a:fld id="{3C04E684-10F4-4CC3-A0B9-F03AA7BE37CF}" type="datetimeFigureOut">
               <a:rPr lang="en-US" smtClean="0"/>
-              <a:t>10/1/2020</a:t>
+              <a:t>10/19/2020</a:t>
             </a:fld>
             <a:endParaRPr lang="en-US"/>
           </a:p>
@@ -15956,7 +15953,7 @@
           <a:p>
             <a:fld id="{3C04E684-10F4-4CC3-A0B9-F03AA7BE37CF}" type="datetimeFigureOut">
               <a:rPr lang="en-US" smtClean="0"/>
-              <a:t>10/1/2020</a:t>
+              <a:t>10/19/2020</a:t>
             </a:fld>
             <a:endParaRPr lang="en-US"/>
           </a:p>
@@ -17060,7 +17057,7 @@
             </a:r>
             <a:r>
               <a:rPr lang="es-419" sz="2000" dirty="0" err="1"/>
-              <a:t>frasica</a:t>
+              <a:t>frásica</a:t>
             </a:r>
             <a:r>
               <a:rPr lang="es-419" sz="2000" dirty="0"/>
@@ -17157,41 +17154,64 @@
       </p:grpSpPr>
       <p:sp>
         <p:nvSpPr>
-          <p:cNvPr id="2" name="Título 1">
+          <p:cNvPr id="4" name="Título 1">
             <a:extLst>
               <a:ext uri="{FF2B5EF4-FFF2-40B4-BE49-F238E27FC236}">
-                <a16:creationId xmlns:a16="http://schemas.microsoft.com/office/drawing/2014/main" id="{7F0FB012-18D7-4251-B852-FFBB125A6374}"/>
+                <a16:creationId xmlns:a16="http://schemas.microsoft.com/office/drawing/2014/main" id="{4A70FBBF-6280-476B-BEB6-140ADEBC943A}"/>
               </a:ext>
             </a:extLst>
           </p:cNvPr>
-          <p:cNvSpPr>
-            <a:spLocks noGrp="1"/>
+          <p:cNvSpPr txBox="1">
+            <a:spLocks/>
           </p:cNvSpPr>
-          <p:nvPr>
-            <p:ph type="title"/>
-          </p:nvPr>
+          <p:nvPr/>
         </p:nvSpPr>
-        <p:spPr/>
+        <p:spPr>
+          <a:xfrm>
+            <a:off x="838200" y="313882"/>
+            <a:ext cx="10515600" cy="1325563"/>
+          </a:xfrm>
+          <a:prstGeom prst="rect">
+            <a:avLst/>
+          </a:prstGeom>
+        </p:spPr>
         <p:txBody>
-          <a:bodyPr/>
-          <a:lstStyle/>
+          <a:bodyPr vert="horz" lIns="91440" tIns="45720" rIns="91440" bIns="45720" rtlCol="0" anchor="ctr">
+            <a:normAutofit/>
+          </a:bodyPr>
+          <a:lstStyle>
+            <a:lvl1pPr algn="l" defTabSz="914400" rtl="0" eaLnBrk="1" latinLnBrk="0" hangingPunct="1">
+              <a:lnSpc>
+                <a:spcPct val="90000"/>
+              </a:lnSpc>
+              <a:spcBef>
+                <a:spcPct val="0"/>
+              </a:spcBef>
+              <a:buNone/>
+              <a:defRPr sz="4000" i="1" kern="1200">
+                <a:solidFill>
+                  <a:schemeClr val="tx1"/>
+                </a:solidFill>
+                <a:latin typeface="+mj-lt"/>
+                <a:ea typeface="+mj-ea"/>
+                <a:cs typeface="+mj-cs"/>
+              </a:defRPr>
+            </a:lvl1pPr>
+          </a:lstStyle>
           <a:p>
-            <a:pPr algn="l"/>
             <a:r>
-              <a:rPr lang="es-CO" b="1" i="1" dirty="0">
+              <a:rPr lang="es-CO" b="1" dirty="0">
                 <a:solidFill>
                   <a:srgbClr val="24292E"/>
                 </a:solidFill>
-                <a:effectLst/>
                 <a:latin typeface="-apple-system"/>
               </a:rPr>
-              <a:t>Diagrama de componentes</a:t>
+              <a:t>Diagrama de despliegue</a:t>
             </a:r>
             <a:endParaRPr lang="es-CO" b="1" i="0" dirty="0">
               <a:solidFill>
                 <a:srgbClr val="24292E"/>
               </a:solidFill>
-              <a:effectLst/>
               <a:latin typeface="-apple-system"/>
             </a:endParaRPr>
           </a:p>
@@ -17199,10 +17219,10 @@
       </p:sp>
       <p:pic>
         <p:nvPicPr>
-          <p:cNvPr id="5" name="Imagen 4" descr="Diagrama, Esquemático&#10;&#10;Descripción generada automáticamente">
+          <p:cNvPr id="2" name="Imagen 1">
             <a:extLst>
               <a:ext uri="{FF2B5EF4-FFF2-40B4-BE49-F238E27FC236}">
-                <a16:creationId xmlns:a16="http://schemas.microsoft.com/office/drawing/2014/main" id="{8CA46BAA-1AC8-457E-87D0-8FC10FB434A6}"/>
+                <a16:creationId xmlns:a16="http://schemas.microsoft.com/office/drawing/2014/main" id="{6B9FD2A0-3259-447A-A6F9-66DEA0500292}"/>
               </a:ext>
             </a:extLst>
           </p:cNvPr>
@@ -17212,31 +17232,257 @@
           <p:nvPr/>
         </p:nvPicPr>
         <p:blipFill>
-          <a:blip r:embed="rId2">
-            <a:extLst>
-              <a:ext uri="{28A0092B-C50C-407E-A947-70E740481C1C}">
-                <a14:useLocalDpi xmlns:a14="http://schemas.microsoft.com/office/drawing/2010/main" val="0"/>
-              </a:ext>
-            </a:extLst>
-          </a:blip>
+          <a:blip r:embed="rId2"/>
           <a:stretch>
             <a:fillRect/>
           </a:stretch>
         </p:blipFill>
         <p:spPr>
           <a:xfrm>
-            <a:off x="2172749" y="1519488"/>
-            <a:ext cx="8298671" cy="5090833"/>
+            <a:off x="2276668" y="1336891"/>
+            <a:ext cx="7107311" cy="5381150"/>
           </a:xfrm>
           <a:prstGeom prst="rect">
             <a:avLst/>
           </a:prstGeom>
         </p:spPr>
       </p:pic>
+      <p:sp>
+        <p:nvSpPr>
+          <p:cNvPr id="3" name="CuadroTexto 2">
+            <a:extLst>
+              <a:ext uri="{FF2B5EF4-FFF2-40B4-BE49-F238E27FC236}">
+                <a16:creationId xmlns:a16="http://schemas.microsoft.com/office/drawing/2014/main" id="{CB4EEE1B-871B-4121-AE56-6570544D978A}"/>
+              </a:ext>
+            </a:extLst>
+          </p:cNvPr>
+          <p:cNvSpPr txBox="1"/>
+          <p:nvPr/>
+        </p:nvSpPr>
+        <p:spPr>
+          <a:xfrm>
+            <a:off x="5318449" y="2239347"/>
+            <a:ext cx="1138335" cy="261610"/>
+          </a:xfrm>
+          <a:prstGeom prst="rect">
+            <a:avLst/>
+          </a:prstGeom>
+          <a:noFill/>
+        </p:spPr>
+        <p:txBody>
+          <a:bodyPr wrap="square" rtlCol="0">
+            <a:spAutoFit/>
+          </a:bodyPr>
+          <a:lstStyle/>
+          <a:p>
+            <a:r>
+              <a:rPr lang="es-MX" sz="1100" dirty="0"/>
+              <a:t>&lt;&lt;</a:t>
+            </a:r>
+            <a:r>
+              <a:rPr lang="es-MX" sz="1100" dirty="0" err="1"/>
+              <a:t>protocol</a:t>
+            </a:r>
+            <a:r>
+              <a:rPr lang="es-MX" sz="1100" dirty="0"/>
+              <a:t>&gt;&gt;</a:t>
+            </a:r>
+            <a:endParaRPr lang="es-CO" sz="1100" dirty="0"/>
+          </a:p>
+        </p:txBody>
+      </p:sp>
+      <p:sp>
+        <p:nvSpPr>
+          <p:cNvPr id="5" name="CuadroTexto 4">
+            <a:extLst>
+              <a:ext uri="{FF2B5EF4-FFF2-40B4-BE49-F238E27FC236}">
+                <a16:creationId xmlns:a16="http://schemas.microsoft.com/office/drawing/2014/main" id="{E24FB7D9-1343-4900-8019-EC6C483388F6}"/>
+              </a:ext>
+            </a:extLst>
+          </p:cNvPr>
+          <p:cNvSpPr txBox="1"/>
+          <p:nvPr/>
+        </p:nvSpPr>
+        <p:spPr>
+          <a:xfrm>
+            <a:off x="5452673" y="2662454"/>
+            <a:ext cx="1138335" cy="261610"/>
+          </a:xfrm>
+          <a:prstGeom prst="rect">
+            <a:avLst/>
+          </a:prstGeom>
+          <a:noFill/>
+        </p:spPr>
+        <p:txBody>
+          <a:bodyPr wrap="square" rtlCol="0">
+            <a:spAutoFit/>
+          </a:bodyPr>
+          <a:lstStyle/>
+          <a:p>
+            <a:r>
+              <a:rPr lang="es-MX" sz="1100" dirty="0"/>
+              <a:t>HTTP:8080</a:t>
+            </a:r>
+            <a:endParaRPr lang="es-CO" sz="1100" dirty="0"/>
+          </a:p>
+        </p:txBody>
+      </p:sp>
+      <p:sp>
+        <p:nvSpPr>
+          <p:cNvPr id="9" name="CuadroTexto 8">
+            <a:extLst>
+              <a:ext uri="{FF2B5EF4-FFF2-40B4-BE49-F238E27FC236}">
+                <a16:creationId xmlns:a16="http://schemas.microsoft.com/office/drawing/2014/main" id="{20107866-B5B3-43C4-AE94-F27B52D21EF2}"/>
+              </a:ext>
+            </a:extLst>
+          </p:cNvPr>
+          <p:cNvSpPr txBox="1"/>
+          <p:nvPr/>
+        </p:nvSpPr>
+        <p:spPr>
+          <a:xfrm>
+            <a:off x="6885850" y="4203769"/>
+            <a:ext cx="1138335" cy="261610"/>
+          </a:xfrm>
+          <a:prstGeom prst="rect">
+            <a:avLst/>
+          </a:prstGeom>
+          <a:noFill/>
+        </p:spPr>
+        <p:txBody>
+          <a:bodyPr wrap="square" rtlCol="0">
+            <a:spAutoFit/>
+          </a:bodyPr>
+          <a:lstStyle/>
+          <a:p>
+            <a:r>
+              <a:rPr lang="es-MX" sz="1100" dirty="0"/>
+              <a:t>&lt;&lt;</a:t>
+            </a:r>
+            <a:r>
+              <a:rPr lang="es-MX" sz="1100" dirty="0" err="1"/>
+              <a:t>protocol</a:t>
+            </a:r>
+            <a:r>
+              <a:rPr lang="es-MX" sz="1100" dirty="0"/>
+              <a:t>&gt;&gt;</a:t>
+            </a:r>
+            <a:endParaRPr lang="es-CO" sz="1100" dirty="0"/>
+          </a:p>
+        </p:txBody>
+      </p:sp>
+      <p:sp>
+        <p:nvSpPr>
+          <p:cNvPr id="11" name="CuadroTexto 10">
+            <a:extLst>
+              <a:ext uri="{FF2B5EF4-FFF2-40B4-BE49-F238E27FC236}">
+                <a16:creationId xmlns:a16="http://schemas.microsoft.com/office/drawing/2014/main" id="{B88684C4-EAAE-4E34-809B-5D19A74AD07D}"/>
+              </a:ext>
+            </a:extLst>
+          </p:cNvPr>
+          <p:cNvSpPr txBox="1"/>
+          <p:nvPr/>
+        </p:nvSpPr>
+        <p:spPr>
+          <a:xfrm>
+            <a:off x="8024185" y="4203769"/>
+            <a:ext cx="1138335" cy="261610"/>
+          </a:xfrm>
+          <a:prstGeom prst="rect">
+            <a:avLst/>
+          </a:prstGeom>
+          <a:noFill/>
+        </p:spPr>
+        <p:txBody>
+          <a:bodyPr wrap="square" rtlCol="0">
+            <a:spAutoFit/>
+          </a:bodyPr>
+          <a:lstStyle/>
+          <a:p>
+            <a:r>
+              <a:rPr lang="es-MX" sz="1100" dirty="0"/>
+              <a:t>HTTP:80</a:t>
+            </a:r>
+            <a:endParaRPr lang="es-CO" sz="1100" dirty="0"/>
+          </a:p>
+        </p:txBody>
+      </p:sp>
+      <p:sp>
+        <p:nvSpPr>
+          <p:cNvPr id="13" name="CuadroTexto 12">
+            <a:extLst>
+              <a:ext uri="{FF2B5EF4-FFF2-40B4-BE49-F238E27FC236}">
+                <a16:creationId xmlns:a16="http://schemas.microsoft.com/office/drawing/2014/main" id="{937199CA-6262-426E-9F37-2299BD42C3CA}"/>
+              </a:ext>
+            </a:extLst>
+          </p:cNvPr>
+          <p:cNvSpPr txBox="1"/>
+          <p:nvPr/>
+        </p:nvSpPr>
+        <p:spPr>
+          <a:xfrm>
+            <a:off x="3683994" y="4078285"/>
+            <a:ext cx="1138335" cy="261610"/>
+          </a:xfrm>
+          <a:prstGeom prst="rect">
+            <a:avLst/>
+          </a:prstGeom>
+          <a:noFill/>
+        </p:spPr>
+        <p:txBody>
+          <a:bodyPr wrap="square" rtlCol="0">
+            <a:spAutoFit/>
+          </a:bodyPr>
+          <a:lstStyle/>
+          <a:p>
+            <a:r>
+              <a:rPr lang="es-MX" sz="1100" dirty="0"/>
+              <a:t>Port: 5432</a:t>
+            </a:r>
+            <a:endParaRPr lang="es-CO" sz="1100" dirty="0"/>
+          </a:p>
+        </p:txBody>
+      </p:sp>
+      <p:sp>
+        <p:nvSpPr>
+          <p:cNvPr id="15" name="CuadroTexto 14">
+            <a:extLst>
+              <a:ext uri="{FF2B5EF4-FFF2-40B4-BE49-F238E27FC236}">
+                <a16:creationId xmlns:a16="http://schemas.microsoft.com/office/drawing/2014/main" id="{5F9E0C64-61AE-4526-B34E-E9FD99EB7638}"/>
+              </a:ext>
+            </a:extLst>
+          </p:cNvPr>
+          <p:cNvSpPr txBox="1"/>
+          <p:nvPr/>
+        </p:nvSpPr>
+        <p:spPr>
+          <a:xfrm>
+            <a:off x="2808021" y="4078285"/>
+            <a:ext cx="1138335" cy="261610"/>
+          </a:xfrm>
+          <a:prstGeom prst="rect">
+            <a:avLst/>
+          </a:prstGeom>
+          <a:noFill/>
+        </p:spPr>
+        <p:txBody>
+          <a:bodyPr wrap="square" rtlCol="0">
+            <a:spAutoFit/>
+          </a:bodyPr>
+          <a:lstStyle/>
+          <a:p>
+            <a:r>
+              <a:rPr lang="es-MX" sz="1100" dirty="0"/>
+              <a:t>&lt;&lt;JDBC&gt;&gt;</a:t>
+            </a:r>
+            <a:endParaRPr lang="es-CO" sz="1100" dirty="0"/>
+          </a:p>
+        </p:txBody>
+      </p:sp>
     </p:spTree>
     <p:extLst>
       <p:ext uri="{BB962C8B-B14F-4D97-AF65-F5344CB8AC3E}">
-        <p14:creationId xmlns:p14="http://schemas.microsoft.com/office/powerpoint/2010/main" val="1247634998"/>
+        <p14:creationId xmlns:p14="http://schemas.microsoft.com/office/powerpoint/2010/main" val="3999526091"/>
       </p:ext>
     </p:extLst>
   </p:cSld>
@@ -17247,208 +17493,6 @@
 </file>
 
 <file path=ppt/slides/slide11.xml><?xml version="1.0" encoding="utf-8"?>
-<p:sld xmlns:a="http://schemas.openxmlformats.org/drawingml/2006/main" xmlns:r="http://schemas.openxmlformats.org/officeDocument/2006/relationships" xmlns:p="http://schemas.openxmlformats.org/presentationml/2006/main">
-  <p:cSld>
-    <p:spTree>
-      <p:nvGrpSpPr>
-        <p:cNvPr id="1" name=""/>
-        <p:cNvGrpSpPr/>
-        <p:nvPr/>
-      </p:nvGrpSpPr>
-      <p:grpSpPr>
-        <a:xfrm>
-          <a:off x="0" y="0"/>
-          <a:ext cx="0" cy="0"/>
-          <a:chOff x="0" y="0"/>
-          <a:chExt cx="0" cy="0"/>
-        </a:xfrm>
-      </p:grpSpPr>
-      <p:sp>
-        <p:nvSpPr>
-          <p:cNvPr id="2" name="Título 1">
-            <a:extLst>
-              <a:ext uri="{FF2B5EF4-FFF2-40B4-BE49-F238E27FC236}">
-                <a16:creationId xmlns:a16="http://schemas.microsoft.com/office/drawing/2014/main" id="{D63646E1-2BDA-48F6-972E-6DFF9E4BE879}"/>
-              </a:ext>
-            </a:extLst>
-          </p:cNvPr>
-          <p:cNvSpPr>
-            <a:spLocks noGrp="1"/>
-          </p:cNvSpPr>
-          <p:nvPr>
-            <p:ph type="title"/>
-          </p:nvPr>
-        </p:nvSpPr>
-        <p:spPr/>
-        <p:txBody>
-          <a:bodyPr/>
-          <a:lstStyle/>
-          <a:p>
-            <a:r>
-              <a:rPr lang="es-CO" b="1" i="1" dirty="0">
-                <a:solidFill>
-                  <a:srgbClr val="24292E"/>
-                </a:solidFill>
-                <a:effectLst/>
-                <a:latin typeface="-apple-system"/>
-              </a:rPr>
-              <a:t>Diagrama de clases</a:t>
-            </a:r>
-            <a:endParaRPr lang="es-CO" dirty="0"/>
-          </a:p>
-        </p:txBody>
-      </p:sp>
-      <p:pic>
-        <p:nvPicPr>
-          <p:cNvPr id="5" name="Imagen 4" descr="Diagrama&#10;&#10;Descripción generada automáticamente">
-            <a:extLst>
-              <a:ext uri="{FF2B5EF4-FFF2-40B4-BE49-F238E27FC236}">
-                <a16:creationId xmlns:a16="http://schemas.microsoft.com/office/drawing/2014/main" id="{5364F1C4-7A31-4FBD-A268-A5AC2E5F03CC}"/>
-              </a:ext>
-            </a:extLst>
-          </p:cNvPr>
-          <p:cNvPicPr>
-            <a:picLocks noChangeAspect="1"/>
-          </p:cNvPicPr>
-          <p:nvPr/>
-        </p:nvPicPr>
-        <p:blipFill>
-          <a:blip r:embed="rId2">
-            <a:extLst>
-              <a:ext uri="{28A0092B-C50C-407E-A947-70E740481C1C}">
-                <a14:useLocalDpi xmlns:a14="http://schemas.microsoft.com/office/drawing/2010/main" val="0"/>
-              </a:ext>
-            </a:extLst>
-          </a:blip>
-          <a:stretch>
-            <a:fillRect/>
-          </a:stretch>
-        </p:blipFill>
-        <p:spPr>
-          <a:xfrm>
-            <a:off x="2491273" y="1502420"/>
-            <a:ext cx="7411144" cy="4990455"/>
-          </a:xfrm>
-          <a:prstGeom prst="rect">
-            <a:avLst/>
-          </a:prstGeom>
-        </p:spPr>
-      </p:pic>
-    </p:spTree>
-    <p:extLst>
-      <p:ext uri="{BB962C8B-B14F-4D97-AF65-F5344CB8AC3E}">
-        <p14:creationId xmlns:p14="http://schemas.microsoft.com/office/powerpoint/2010/main" val="1545984780"/>
-      </p:ext>
-    </p:extLst>
-  </p:cSld>
-  <p:clrMapOvr>
-    <a:masterClrMapping/>
-  </p:clrMapOvr>
-</p:sld>
-</file>
-
-<file path=ppt/slides/slide12.xml><?xml version="1.0" encoding="utf-8"?>
-<p:sld xmlns:a="http://schemas.openxmlformats.org/drawingml/2006/main" xmlns:r="http://schemas.openxmlformats.org/officeDocument/2006/relationships" xmlns:p="http://schemas.openxmlformats.org/presentationml/2006/main">
-  <p:cSld>
-    <p:spTree>
-      <p:nvGrpSpPr>
-        <p:cNvPr id="1" name=""/>
-        <p:cNvGrpSpPr/>
-        <p:nvPr/>
-      </p:nvGrpSpPr>
-      <p:grpSpPr>
-        <a:xfrm>
-          <a:off x="0" y="0"/>
-          <a:ext cx="0" cy="0"/>
-          <a:chOff x="0" y="0"/>
-          <a:chExt cx="0" cy="0"/>
-        </a:xfrm>
-      </p:grpSpPr>
-      <p:sp>
-        <p:nvSpPr>
-          <p:cNvPr id="2" name="Título 1">
-            <a:extLst>
-              <a:ext uri="{FF2B5EF4-FFF2-40B4-BE49-F238E27FC236}">
-                <a16:creationId xmlns:a16="http://schemas.microsoft.com/office/drawing/2014/main" id="{9E9E082A-2796-4515-A2B5-079BD864BED2}"/>
-              </a:ext>
-            </a:extLst>
-          </p:cNvPr>
-          <p:cNvSpPr>
-            <a:spLocks noGrp="1"/>
-          </p:cNvSpPr>
-          <p:nvPr>
-            <p:ph type="title"/>
-          </p:nvPr>
-        </p:nvSpPr>
-        <p:spPr/>
-        <p:txBody>
-          <a:bodyPr/>
-          <a:lstStyle/>
-          <a:p>
-            <a:r>
-              <a:rPr lang="es-CO" b="1" i="1" dirty="0">
-                <a:solidFill>
-                  <a:srgbClr val="24292E"/>
-                </a:solidFill>
-                <a:effectLst/>
-                <a:latin typeface="-apple-system"/>
-              </a:rPr>
-              <a:t>Diagrama E-R</a:t>
-            </a:r>
-            <a:endParaRPr lang="es-CO" dirty="0"/>
-          </a:p>
-        </p:txBody>
-      </p:sp>
-      <p:pic>
-        <p:nvPicPr>
-          <p:cNvPr id="5" name="Imagen 4" descr="Diagrama, Esquemático&#10;&#10;Descripción generada automáticamente">
-            <a:extLst>
-              <a:ext uri="{FF2B5EF4-FFF2-40B4-BE49-F238E27FC236}">
-                <a16:creationId xmlns:a16="http://schemas.microsoft.com/office/drawing/2014/main" id="{339BFD40-EE99-4F9A-99AC-C0E1347E542A}"/>
-              </a:ext>
-            </a:extLst>
-          </p:cNvPr>
-          <p:cNvPicPr>
-            <a:picLocks noChangeAspect="1"/>
-          </p:cNvPicPr>
-          <p:nvPr/>
-        </p:nvPicPr>
-        <p:blipFill>
-          <a:blip r:embed="rId2">
-            <a:extLst>
-              <a:ext uri="{28A0092B-C50C-407E-A947-70E740481C1C}">
-                <a14:useLocalDpi xmlns:a14="http://schemas.microsoft.com/office/drawing/2010/main" val="0"/>
-              </a:ext>
-            </a:extLst>
-          </a:blip>
-          <a:stretch>
-            <a:fillRect/>
-          </a:stretch>
-        </p:blipFill>
-        <p:spPr>
-          <a:xfrm>
-            <a:off x="5051854" y="0"/>
-            <a:ext cx="6301946" cy="6858000"/>
-          </a:xfrm>
-          <a:prstGeom prst="rect">
-            <a:avLst/>
-          </a:prstGeom>
-        </p:spPr>
-      </p:pic>
-    </p:spTree>
-    <p:extLst>
-      <p:ext uri="{BB962C8B-B14F-4D97-AF65-F5344CB8AC3E}">
-        <p14:creationId xmlns:p14="http://schemas.microsoft.com/office/powerpoint/2010/main" val="2364458723"/>
-      </p:ext>
-    </p:extLst>
-  </p:cSld>
-  <p:clrMapOvr>
-    <a:masterClrMapping/>
-  </p:clrMapOvr>
-</p:sld>
-</file>
-
-<file path=ppt/slides/slide13.xml><?xml version="1.0" encoding="utf-8"?>
 <p:sld xmlns:a="http://schemas.openxmlformats.org/drawingml/2006/main" xmlns:r="http://schemas.openxmlformats.org/officeDocument/2006/relationships" xmlns:p="http://schemas.openxmlformats.org/presentationml/2006/main">
   <p:cSld>
     <p:spTree>
@@ -17522,8 +17566,8 @@
         </p:blipFill>
         <p:spPr>
           <a:xfrm>
-            <a:off x="475344" y="1769372"/>
-            <a:ext cx="5866766" cy="3319256"/>
+            <a:off x="576012" y="2773295"/>
+            <a:ext cx="4336499" cy="2453473"/>
           </a:xfrm>
           <a:prstGeom prst="rect">
             <a:avLst/>
@@ -17532,10 +17576,10 @@
       </p:pic>
       <p:pic>
         <p:nvPicPr>
-          <p:cNvPr id="5" name="Imagen 4">
+          <p:cNvPr id="3" name="Imagen 2">
             <a:extLst>
               <a:ext uri="{FF2B5EF4-FFF2-40B4-BE49-F238E27FC236}">
-                <a16:creationId xmlns:a16="http://schemas.microsoft.com/office/drawing/2014/main" id="{87E4A655-48BF-4FA7-9342-1D8FC4B5A927}"/>
+                <a16:creationId xmlns:a16="http://schemas.microsoft.com/office/drawing/2014/main" id="{C7C83804-7AFC-486D-8421-AD29F7DBEF73}"/>
               </a:ext>
             </a:extLst>
           </p:cNvPr>
@@ -17552,8 +17596,8 @@
         </p:blipFill>
         <p:spPr>
           <a:xfrm>
-            <a:off x="6762109" y="2636583"/>
-            <a:ext cx="4591691" cy="1247949"/>
+            <a:off x="5577863" y="1546791"/>
+            <a:ext cx="5908747" cy="5124596"/>
           </a:xfrm>
           <a:prstGeom prst="rect">
             <a:avLst/>
@@ -17573,167 +17617,7 @@
 </p:sld>
 </file>
 
-<file path=ppt/slides/slide14.xml><?xml version="1.0" encoding="utf-8"?>
-<p:sld xmlns:a="http://schemas.openxmlformats.org/drawingml/2006/main" xmlns:r="http://schemas.openxmlformats.org/officeDocument/2006/relationships" xmlns:p="http://schemas.openxmlformats.org/presentationml/2006/main">
-  <p:cSld>
-    <p:spTree>
-      <p:nvGrpSpPr>
-        <p:cNvPr id="1" name=""/>
-        <p:cNvGrpSpPr/>
-        <p:nvPr/>
-      </p:nvGrpSpPr>
-      <p:grpSpPr>
-        <a:xfrm>
-          <a:off x="0" y="0"/>
-          <a:ext cx="0" cy="0"/>
-          <a:chOff x="0" y="0"/>
-          <a:chExt cx="0" cy="0"/>
-        </a:xfrm>
-      </p:grpSpPr>
-      <p:sp>
-        <p:nvSpPr>
-          <p:cNvPr id="4" name="Título 1">
-            <a:extLst>
-              <a:ext uri="{FF2B5EF4-FFF2-40B4-BE49-F238E27FC236}">
-                <a16:creationId xmlns:a16="http://schemas.microsoft.com/office/drawing/2014/main" id="{BE4DEA8D-2509-43DC-AEB8-705874FFDD58}"/>
-              </a:ext>
-            </a:extLst>
-          </p:cNvPr>
-          <p:cNvSpPr>
-            <a:spLocks noGrp="1"/>
-          </p:cNvSpPr>
-          <p:nvPr>
-            <p:ph type="title"/>
-          </p:nvPr>
-        </p:nvSpPr>
-        <p:spPr>
-          <a:xfrm>
-            <a:off x="838200" y="365125"/>
-            <a:ext cx="10515600" cy="1325563"/>
-          </a:xfrm>
-        </p:spPr>
-        <p:txBody>
-          <a:bodyPr/>
-          <a:lstStyle/>
-          <a:p>
-            <a:r>
-              <a:rPr lang="es-CO" b="1" i="1" dirty="0">
-                <a:solidFill>
-                  <a:srgbClr val="24292E"/>
-                </a:solidFill>
-                <a:effectLst/>
-                <a:latin typeface="-apple-system"/>
-              </a:rPr>
-              <a:t>Algunos avances</a:t>
-            </a:r>
-            <a:endParaRPr lang="es-CO" dirty="0"/>
-          </a:p>
-        </p:txBody>
-      </p:sp>
-      <p:pic>
-        <p:nvPicPr>
-          <p:cNvPr id="5" name="Imagen 4">
-            <a:extLst>
-              <a:ext uri="{FF2B5EF4-FFF2-40B4-BE49-F238E27FC236}">
-                <a16:creationId xmlns:a16="http://schemas.microsoft.com/office/drawing/2014/main" id="{30512E26-4063-4893-9B33-EF3921C14125}"/>
-              </a:ext>
-            </a:extLst>
-          </p:cNvPr>
-          <p:cNvPicPr>
-            <a:picLocks noChangeAspect="1"/>
-          </p:cNvPicPr>
-          <p:nvPr/>
-        </p:nvPicPr>
-        <p:blipFill>
-          <a:blip r:embed="rId2"/>
-          <a:stretch>
-            <a:fillRect/>
-          </a:stretch>
-        </p:blipFill>
-        <p:spPr>
-          <a:xfrm>
-            <a:off x="0" y="1834107"/>
-            <a:ext cx="12192000" cy="1159650"/>
-          </a:xfrm>
-          <a:prstGeom prst="rect">
-            <a:avLst/>
-          </a:prstGeom>
-        </p:spPr>
-      </p:pic>
-      <p:pic>
-        <p:nvPicPr>
-          <p:cNvPr id="6" name="Imagen 5">
-            <a:extLst>
-              <a:ext uri="{FF2B5EF4-FFF2-40B4-BE49-F238E27FC236}">
-                <a16:creationId xmlns:a16="http://schemas.microsoft.com/office/drawing/2014/main" id="{5DA544DF-484B-438B-890D-B6FF9F8FE4CD}"/>
-              </a:ext>
-            </a:extLst>
-          </p:cNvPr>
-          <p:cNvPicPr>
-            <a:picLocks noChangeAspect="1"/>
-          </p:cNvPicPr>
-          <p:nvPr/>
-        </p:nvPicPr>
-        <p:blipFill>
-          <a:blip r:embed="rId3"/>
-          <a:stretch>
-            <a:fillRect/>
-          </a:stretch>
-        </p:blipFill>
-        <p:spPr>
-          <a:xfrm>
-            <a:off x="0" y="3266849"/>
-            <a:ext cx="12192000" cy="1194790"/>
-          </a:xfrm>
-          <a:prstGeom prst="rect">
-            <a:avLst/>
-          </a:prstGeom>
-        </p:spPr>
-      </p:pic>
-      <p:pic>
-        <p:nvPicPr>
-          <p:cNvPr id="7" name="Imagen 6">
-            <a:extLst>
-              <a:ext uri="{FF2B5EF4-FFF2-40B4-BE49-F238E27FC236}">
-                <a16:creationId xmlns:a16="http://schemas.microsoft.com/office/drawing/2014/main" id="{0DC354E3-5122-4F3E-A1E5-930A8157D825}"/>
-              </a:ext>
-            </a:extLst>
-          </p:cNvPr>
-          <p:cNvPicPr>
-            <a:picLocks noChangeAspect="1"/>
-          </p:cNvPicPr>
-          <p:nvPr/>
-        </p:nvPicPr>
-        <p:blipFill>
-          <a:blip r:embed="rId4"/>
-          <a:stretch>
-            <a:fillRect/>
-          </a:stretch>
-        </p:blipFill>
-        <p:spPr>
-          <a:xfrm>
-            <a:off x="0" y="4734731"/>
-            <a:ext cx="12192000" cy="800420"/>
-          </a:xfrm>
-          <a:prstGeom prst="rect">
-            <a:avLst/>
-          </a:prstGeom>
-        </p:spPr>
-      </p:pic>
-    </p:spTree>
-    <p:extLst>
-      <p:ext uri="{BB962C8B-B14F-4D97-AF65-F5344CB8AC3E}">
-        <p14:creationId xmlns:p14="http://schemas.microsoft.com/office/powerpoint/2010/main" val="4059310163"/>
-      </p:ext>
-    </p:extLst>
-  </p:cSld>
-  <p:clrMapOvr>
-    <a:masterClrMapping/>
-  </p:clrMapOvr>
-</p:sld>
-</file>
-
-<file path=ppt/slides/slide15.xml><?xml version="1.0" encoding="utf-8"?>
+<file path=ppt/slides/slide12.xml><?xml version="1.0" encoding="utf-8"?>
 <p:sld xmlns:a="http://schemas.openxmlformats.org/drawingml/2006/main" xmlns:r="http://schemas.openxmlformats.org/officeDocument/2006/relationships" xmlns:p="http://schemas.openxmlformats.org/presentationml/2006/main">
   <p:cSld>
     <p:bg>
@@ -21328,7 +21212,7 @@
           <a:lstStyle/>
           <a:p>
             <a:r>
-              <a:rPr lang="es-CO" b="1" i="1">
+              <a:rPr lang="es-CO" b="1" i="1" dirty="0">
                 <a:effectLst/>
                 <a:latin typeface="-apple-system"/>
               </a:rPr>
@@ -21357,7 +21241,7 @@
         <p:spPr>
           <a:xfrm>
             <a:off x="838201" y="2333297"/>
-            <a:ext cx="3816096" cy="3843666"/>
+            <a:ext cx="3943524" cy="3843666"/>
           </a:xfrm>
         </p:spPr>
         <p:txBody>
@@ -21367,18 +21251,25 @@
           <a:lstStyle/>
           <a:p>
             <a:r>
+              <a:rPr lang="es-CO" sz="2000" b="0" dirty="0">
+                <a:effectLst/>
+                <a:latin typeface="-apple-system"/>
+              </a:rPr>
+              <a:t>Sale </a:t>
+            </a:r>
+            <a:r>
               <a:rPr lang="es-CO" sz="2000" b="0" dirty="0" err="1">
                 <a:effectLst/>
                 <a:latin typeface="-apple-system"/>
               </a:rPr>
-              <a:t>SaleIt</a:t>
+              <a:t>It</a:t>
             </a:r>
             <a:r>
               <a:rPr lang="es-CO" sz="2000" b="0" dirty="0">
                 <a:effectLst/>
                 <a:latin typeface="-apple-system"/>
               </a:rPr>
-              <a:t> es una aplicación web realizada como proyecto para la materia </a:t>
+              <a:t> es una aplicación web realizada como proyecto para la asignatura </a:t>
             </a:r>
             <a:r>
               <a:rPr lang="es-CO" sz="2000" b="1" dirty="0">
@@ -21401,21 +21292,7 @@
                 <a:effectLst/>
                 <a:latin typeface="-apple-system"/>
               </a:rPr>
-              <a:t>Es una aplicación para realizar subastas </a:t>
-            </a:r>
-            <a:r>
-              <a:rPr lang="es-CO" sz="2000" b="0">
-                <a:effectLst/>
-                <a:latin typeface="-apple-system"/>
-              </a:rPr>
-              <a:t>en línea. </a:t>
-            </a:r>
-            <a:r>
-              <a:rPr lang="es-CO" sz="2000" b="0" dirty="0">
-                <a:effectLst/>
-                <a:latin typeface="-apple-system"/>
-              </a:rPr>
-              <a:t>Allí el usuario podrá conseguir y vender artículos únicos.</a:t>
+              <a:t>Es una aplicación para realizar subastas en línea. Allí el usuario podrá conseguir y vender artículos únicos.</a:t>
             </a:r>
             <a:endParaRPr lang="es-CO" sz="2000" dirty="0"/>
           </a:p>
@@ -21423,10 +21300,10 @@
       </p:sp>
       <p:pic>
         <p:nvPicPr>
-          <p:cNvPr id="4" name="Imagen 3">
+          <p:cNvPr id="6" name="Gráfico 5" descr="Martillo de juez">
             <a:extLst>
               <a:ext uri="{FF2B5EF4-FFF2-40B4-BE49-F238E27FC236}">
-                <a16:creationId xmlns:a16="http://schemas.microsoft.com/office/drawing/2014/main" id="{884377BD-C375-45DF-B021-430AE2C7DFCA}"/>
+                <a16:creationId xmlns:a16="http://schemas.microsoft.com/office/drawing/2014/main" id="{BC4F1327-FCD2-4AF8-8187-C7A5EC08F95A}"/>
               </a:ext>
             </a:extLst>
           </p:cNvPr>
@@ -21435,489 +21312,29 @@
           </p:cNvPicPr>
           <p:nvPr/>
         </p:nvPicPr>
-        <p:blipFill rotWithShape="1">
-          <a:blip r:embed="rId2"/>
-          <a:srcRect l="2186" r="21544" b="1"/>
-          <a:stretch/>
+        <p:blipFill>
+          <a:blip r:embed="rId2">
+            <a:extLst>
+              <a:ext uri="{28A0092B-C50C-407E-A947-70E740481C1C}">
+                <a14:useLocalDpi xmlns:a14="http://schemas.microsoft.com/office/drawing/2010/main" val="0"/>
+              </a:ext>
+              <a:ext uri="{96DAC541-7B7A-43D3-8B79-37D633B846F1}">
+                <asvg:svgBlip xmlns:asvg="http://schemas.microsoft.com/office/drawing/2016/SVG/main" r:embed="rId3"/>
+              </a:ext>
+            </a:extLst>
+          </a:blip>
+          <a:stretch>
+            <a:fillRect/>
+          </a:stretch>
         </p:blipFill>
         <p:spPr>
           <a:xfrm>
-            <a:off x="4726728" y="10"/>
-            <a:ext cx="7472381" cy="6857990"/>
+            <a:off x="5842150" y="583675"/>
+            <a:ext cx="5158946" cy="5158946"/>
           </a:xfrm>
-          <a:custGeom>
+          <a:prstGeom prst="rect">
             <a:avLst/>
-            <a:gdLst/>
-            <a:ahLst/>
-            <a:cxnLst/>
-            <a:rect l="l" t="t" r="r" b="b"/>
-            <a:pathLst>
-              <a:path w="7472381" h="6886575">
-                <a:moveTo>
-                  <a:pt x="1232666" y="0"/>
-                </a:moveTo>
-                <a:lnTo>
-                  <a:pt x="7472381" y="0"/>
-                </a:lnTo>
-                <a:lnTo>
-                  <a:pt x="7472381" y="814388"/>
-                </a:lnTo>
-                <a:lnTo>
-                  <a:pt x="7472381" y="6411516"/>
-                </a:lnTo>
-                <a:lnTo>
-                  <a:pt x="7472381" y="6886575"/>
-                </a:lnTo>
-                <a:lnTo>
-                  <a:pt x="6992676" y="6886575"/>
-                </a:lnTo>
-                <a:lnTo>
-                  <a:pt x="1946893" y="6886575"/>
-                </a:lnTo>
-                <a:cubicBezTo>
-                  <a:pt x="1801205" y="6815137"/>
-                  <a:pt x="1662624" y="6729412"/>
-                  <a:pt x="1506276" y="6686550"/>
-                </a:cubicBezTo>
-                <a:cubicBezTo>
-                  <a:pt x="1399675" y="6657975"/>
-                  <a:pt x="1296627" y="6607969"/>
-                  <a:pt x="1314394" y="6457949"/>
-                </a:cubicBezTo>
-                <a:cubicBezTo>
-                  <a:pt x="1317947" y="6415087"/>
-                  <a:pt x="1289520" y="6382941"/>
-                  <a:pt x="1246880" y="6393656"/>
-                </a:cubicBezTo>
-                <a:cubicBezTo>
-                  <a:pt x="1165153" y="6415087"/>
-                  <a:pt x="1126065" y="6354365"/>
-                  <a:pt x="1079872" y="6307931"/>
-                </a:cubicBezTo>
-                <a:cubicBezTo>
-                  <a:pt x="998144" y="6225779"/>
-                  <a:pt x="919970" y="6140052"/>
-                  <a:pt x="788495" y="6125765"/>
-                </a:cubicBezTo>
-                <a:cubicBezTo>
-                  <a:pt x="813369" y="6061471"/>
-                  <a:pt x="856009" y="6068615"/>
-                  <a:pt x="895097" y="6082903"/>
-                </a:cubicBezTo>
-                <a:cubicBezTo>
-                  <a:pt x="998144" y="6118622"/>
-                  <a:pt x="1101192" y="6157912"/>
-                  <a:pt x="1204239" y="6193631"/>
-                </a:cubicBezTo>
-                <a:cubicBezTo>
-                  <a:pt x="1271754" y="6215062"/>
-                  <a:pt x="1339267" y="6247209"/>
-                  <a:pt x="1428102" y="6222206"/>
-                </a:cubicBezTo>
-                <a:cubicBezTo>
-                  <a:pt x="1349928" y="6093619"/>
-                  <a:pt x="1218453" y="6068615"/>
-                  <a:pt x="1111852" y="6029325"/>
-                </a:cubicBezTo>
-                <a:cubicBezTo>
-                  <a:pt x="980377" y="5979319"/>
-                  <a:pt x="902203" y="5886450"/>
-                  <a:pt x="806262" y="5779294"/>
-                </a:cubicBezTo>
-                <a:cubicBezTo>
-                  <a:pt x="902203" y="5750719"/>
-                  <a:pt x="962610" y="5829300"/>
-                  <a:pt x="1040785" y="5825728"/>
-                </a:cubicBezTo>
-                <a:cubicBezTo>
-                  <a:pt x="1044338" y="5815012"/>
-                  <a:pt x="1051445" y="5793581"/>
-                  <a:pt x="1051445" y="5793581"/>
-                </a:cubicBezTo>
-                <a:cubicBezTo>
-                  <a:pt x="923523" y="5736431"/>
-                  <a:pt x="866670" y="5629275"/>
-                  <a:pt x="845349" y="5497115"/>
-                </a:cubicBezTo>
-                <a:cubicBezTo>
-                  <a:pt x="838243" y="5429250"/>
-                  <a:pt x="792049" y="5407819"/>
-                  <a:pt x="745855" y="5375672"/>
-                </a:cubicBezTo>
-                <a:cubicBezTo>
-                  <a:pt x="589507" y="5264943"/>
-                  <a:pt x="422499" y="5164931"/>
-                  <a:pt x="291024" y="5014913"/>
-                </a:cubicBezTo>
-                <a:cubicBezTo>
-                  <a:pt x="443819" y="5032771"/>
-                  <a:pt x="564633" y="5132784"/>
-                  <a:pt x="724535" y="5175647"/>
-                </a:cubicBezTo>
-                <a:cubicBezTo>
-                  <a:pt x="596614" y="5011340"/>
-                  <a:pt x="429605" y="4925615"/>
-                  <a:pt x="276811" y="4825603"/>
-                </a:cubicBezTo>
-                <a:cubicBezTo>
-                  <a:pt x="205743" y="4779169"/>
-                  <a:pt x="141783" y="4722018"/>
-                  <a:pt x="60055" y="4697016"/>
-                </a:cubicBezTo>
-                <a:cubicBezTo>
-                  <a:pt x="31628" y="4689872"/>
-                  <a:pt x="-18119" y="4672013"/>
-                  <a:pt x="6755" y="4622006"/>
-                </a:cubicBezTo>
-                <a:cubicBezTo>
-                  <a:pt x="28075" y="4579144"/>
-                  <a:pt x="67162" y="4593432"/>
-                  <a:pt x="102696" y="4604146"/>
-                </a:cubicBezTo>
-                <a:cubicBezTo>
-                  <a:pt x="187976" y="4632722"/>
-                  <a:pt x="280364" y="4632722"/>
-                  <a:pt x="397625" y="4632722"/>
-                </a:cubicBezTo>
-                <a:cubicBezTo>
-                  <a:pt x="298131" y="4496990"/>
-                  <a:pt x="116909" y="4539853"/>
-                  <a:pt x="31628" y="4396978"/>
-                </a:cubicBezTo>
-                <a:cubicBezTo>
-                  <a:pt x="138229" y="4371976"/>
-                  <a:pt x="219957" y="4421982"/>
-                  <a:pt x="305237" y="4432697"/>
-                </a:cubicBezTo>
-                <a:cubicBezTo>
-                  <a:pt x="383412" y="4443413"/>
-                  <a:pt x="401178" y="4418409"/>
-                  <a:pt x="383412" y="4339828"/>
-                </a:cubicBezTo>
-                <a:cubicBezTo>
-                  <a:pt x="354985" y="4218385"/>
-                  <a:pt x="397625" y="4157662"/>
-                  <a:pt x="511333" y="4189810"/>
-                </a:cubicBezTo>
-                <a:cubicBezTo>
-                  <a:pt x="617934" y="4221956"/>
-                  <a:pt x="628594" y="4175522"/>
-                  <a:pt x="600167" y="4107656"/>
-                </a:cubicBezTo>
-                <a:cubicBezTo>
-                  <a:pt x="557527" y="4007644"/>
-                  <a:pt x="603720" y="3929063"/>
-                  <a:pt x="635701" y="3843337"/>
-                </a:cubicBezTo>
-                <a:cubicBezTo>
-                  <a:pt x="685448" y="3714750"/>
-                  <a:pt x="664128" y="3650456"/>
-                  <a:pt x="561080" y="3554015"/>
-                </a:cubicBezTo>
-                <a:cubicBezTo>
-                  <a:pt x="500673" y="3500438"/>
-                  <a:pt x="440265" y="3454003"/>
-                  <a:pt x="354985" y="3407569"/>
-                </a:cubicBezTo>
-                <a:cubicBezTo>
-                  <a:pt x="550420" y="3382565"/>
-                  <a:pt x="347878" y="3296841"/>
-                  <a:pt x="415392" y="3243263"/>
-                </a:cubicBezTo>
-                <a:cubicBezTo>
-                  <a:pt x="553973" y="3221831"/>
-                  <a:pt x="664128" y="3393282"/>
-                  <a:pt x="852456" y="3343275"/>
-                </a:cubicBezTo>
-                <a:cubicBezTo>
-                  <a:pt x="625041" y="3196828"/>
-                  <a:pt x="369198" y="3150393"/>
-                  <a:pt x="202190" y="2953940"/>
-                </a:cubicBezTo>
-                <a:cubicBezTo>
-                  <a:pt x="241277" y="2911078"/>
-                  <a:pt x="280364" y="2953940"/>
-                  <a:pt x="312344" y="2936081"/>
-                </a:cubicBezTo>
-                <a:cubicBezTo>
-                  <a:pt x="312344" y="2925365"/>
-                  <a:pt x="685448" y="2993232"/>
-                  <a:pt x="706768" y="2714625"/>
-                </a:cubicBezTo>
-                <a:cubicBezTo>
-                  <a:pt x="713875" y="2714625"/>
-                  <a:pt x="720982" y="2714625"/>
-                  <a:pt x="728088" y="2703909"/>
-                </a:cubicBezTo>
-                <a:cubicBezTo>
-                  <a:pt x="767175" y="2664619"/>
-                  <a:pt x="731642" y="2571750"/>
-                  <a:pt x="795602" y="2564606"/>
-                </a:cubicBezTo>
-                <a:cubicBezTo>
-                  <a:pt x="866670" y="2557462"/>
-                  <a:pt x="934184" y="2525315"/>
-                  <a:pt x="1008804" y="2543175"/>
-                </a:cubicBezTo>
-                <a:cubicBezTo>
-                  <a:pt x="1065658" y="2557462"/>
-                  <a:pt x="1126065" y="2575322"/>
-                  <a:pt x="1186473" y="2575322"/>
-                </a:cubicBezTo>
-                <a:cubicBezTo>
-                  <a:pt x="1250433" y="2575322"/>
-                  <a:pt x="1339267" y="2696766"/>
-                  <a:pt x="1378355" y="2536031"/>
-                </a:cubicBezTo>
-                <a:cubicBezTo>
-                  <a:pt x="1378355" y="2528888"/>
-                  <a:pt x="1488509" y="2546747"/>
-                  <a:pt x="1548916" y="2553891"/>
-                </a:cubicBezTo>
-                <a:cubicBezTo>
-                  <a:pt x="1598663" y="2561035"/>
-                  <a:pt x="1659071" y="2593181"/>
-                  <a:pt x="1694604" y="2528888"/>
-                </a:cubicBezTo>
-                <a:cubicBezTo>
-                  <a:pt x="1712371" y="2489596"/>
-                  <a:pt x="1627090" y="2418159"/>
-                  <a:pt x="1552469" y="2411015"/>
-                </a:cubicBezTo>
-                <a:cubicBezTo>
-                  <a:pt x="1484956" y="2403872"/>
-                  <a:pt x="1417442" y="2396728"/>
-                  <a:pt x="1353481" y="2411015"/>
-                </a:cubicBezTo>
-                <a:cubicBezTo>
-                  <a:pt x="1275307" y="2428875"/>
-                  <a:pt x="1232666" y="2400300"/>
-                  <a:pt x="1211346" y="2336007"/>
-                </a:cubicBezTo>
-                <a:cubicBezTo>
-                  <a:pt x="1186473" y="2268141"/>
-                  <a:pt x="1140279" y="2232422"/>
-                  <a:pt x="1076318" y="2200275"/>
-                </a:cubicBezTo>
-                <a:cubicBezTo>
-                  <a:pt x="919970" y="2121694"/>
-                  <a:pt x="770729" y="2028825"/>
-                  <a:pt x="600167" y="1982390"/>
-                </a:cubicBezTo>
-                <a:cubicBezTo>
-                  <a:pt x="568187" y="1975246"/>
-                  <a:pt x="529100" y="1960959"/>
-                  <a:pt x="514886" y="1900238"/>
-                </a:cubicBezTo>
-                <a:cubicBezTo>
-                  <a:pt x="976824" y="1993106"/>
-                  <a:pt x="1396121" y="2232422"/>
-                  <a:pt x="1872273" y="2218135"/>
-                </a:cubicBezTo>
-                <a:cubicBezTo>
-                  <a:pt x="1744351" y="2143125"/>
-                  <a:pt x="1591557" y="2139554"/>
-                  <a:pt x="1452975" y="2085975"/>
-                </a:cubicBezTo>
-                <a:cubicBezTo>
-                  <a:pt x="1552469" y="2046685"/>
-                  <a:pt x="1644857" y="2089547"/>
-                  <a:pt x="1737245" y="2110978"/>
-                </a:cubicBezTo>
-                <a:cubicBezTo>
-                  <a:pt x="1815419" y="2128837"/>
-                  <a:pt x="1886486" y="2132410"/>
-                  <a:pt x="1893593" y="2021681"/>
-                </a:cubicBezTo>
-                <a:cubicBezTo>
-                  <a:pt x="1893593" y="2010965"/>
-                  <a:pt x="1893593" y="2003821"/>
-                  <a:pt x="1893593" y="1993106"/>
-                </a:cubicBezTo>
-                <a:cubicBezTo>
-                  <a:pt x="1865166" y="1946672"/>
-                  <a:pt x="1826079" y="1925240"/>
-                  <a:pt x="1776332" y="1910953"/>
-                </a:cubicBezTo>
-                <a:cubicBezTo>
-                  <a:pt x="1747905" y="1903809"/>
-                  <a:pt x="1708818" y="1889522"/>
-                  <a:pt x="1708818" y="1857375"/>
-                </a:cubicBezTo>
-                <a:cubicBezTo>
-                  <a:pt x="1712371" y="1735931"/>
-                  <a:pt x="1616430" y="1700212"/>
-                  <a:pt x="1524043" y="1664493"/>
-                </a:cubicBezTo>
-                <a:cubicBezTo>
-                  <a:pt x="1573790" y="1603772"/>
-                  <a:pt x="1616430" y="1646635"/>
-                  <a:pt x="1655517" y="1643062"/>
-                </a:cubicBezTo>
-                <a:cubicBezTo>
-                  <a:pt x="1680391" y="1639491"/>
-                  <a:pt x="1705264" y="1635919"/>
-                  <a:pt x="1705264" y="1603772"/>
-                </a:cubicBezTo>
-                <a:cubicBezTo>
-                  <a:pt x="1705264" y="1578769"/>
-                  <a:pt x="1694604" y="1546622"/>
-                  <a:pt x="1669731" y="1546622"/>
-                </a:cubicBezTo>
-                <a:cubicBezTo>
-                  <a:pt x="1513383" y="1543050"/>
-                  <a:pt x="1424548" y="1371600"/>
-                  <a:pt x="1261093" y="1371600"/>
-                </a:cubicBezTo>
-                <a:cubicBezTo>
-                  <a:pt x="1161599" y="1371600"/>
-                  <a:pt x="1310841" y="1275159"/>
-                  <a:pt x="1229113" y="1235869"/>
-                </a:cubicBezTo>
-                <a:cubicBezTo>
-                  <a:pt x="1211346" y="1225153"/>
-                  <a:pt x="1278860" y="1210866"/>
-                  <a:pt x="1307287" y="1214437"/>
-                </a:cubicBezTo>
-                <a:cubicBezTo>
-                  <a:pt x="1335714" y="1218009"/>
-                  <a:pt x="1360588" y="1243013"/>
-                  <a:pt x="1396121" y="1225153"/>
-                </a:cubicBezTo>
-                <a:cubicBezTo>
-                  <a:pt x="1413888" y="1160860"/>
-                  <a:pt x="1367694" y="1135856"/>
-                  <a:pt x="1325054" y="1117997"/>
-                </a:cubicBezTo>
-                <a:cubicBezTo>
-                  <a:pt x="1232666" y="1075135"/>
-                  <a:pt x="1140279" y="1025129"/>
-                  <a:pt x="1037231" y="1010841"/>
-                </a:cubicBezTo>
-                <a:cubicBezTo>
-                  <a:pt x="1001698" y="1007269"/>
-                  <a:pt x="980377" y="989409"/>
-                  <a:pt x="983931" y="953690"/>
-                </a:cubicBezTo>
-                <a:cubicBezTo>
-                  <a:pt x="991037" y="907256"/>
-                  <a:pt x="1026571" y="921544"/>
-                  <a:pt x="1054998" y="925115"/>
-                </a:cubicBezTo>
-                <a:cubicBezTo>
-                  <a:pt x="1072765" y="928688"/>
-                  <a:pt x="1090532" y="939403"/>
-                  <a:pt x="1108299" y="914400"/>
-                </a:cubicBezTo>
-                <a:cubicBezTo>
-                  <a:pt x="692555" y="660797"/>
-                  <a:pt x="472246" y="675085"/>
-                  <a:pt x="6755" y="467915"/>
-                </a:cubicBezTo>
-                <a:cubicBezTo>
-                  <a:pt x="109802" y="428625"/>
-                  <a:pt x="184423" y="457200"/>
-                  <a:pt x="255490" y="464344"/>
-                </a:cubicBezTo>
-                <a:cubicBezTo>
-                  <a:pt x="433159" y="482203"/>
-                  <a:pt x="323004" y="514350"/>
-                  <a:pt x="500673" y="535781"/>
-                </a:cubicBezTo>
-                <a:cubicBezTo>
-                  <a:pt x="585954" y="546497"/>
-                  <a:pt x="664128" y="582216"/>
-                  <a:pt x="760069" y="525066"/>
-                </a:cubicBezTo>
-                <a:cubicBezTo>
-                  <a:pt x="824029" y="485775"/>
-                  <a:pt x="927077" y="528637"/>
-                  <a:pt x="1005251" y="560785"/>
-                </a:cubicBezTo>
-                <a:cubicBezTo>
-                  <a:pt x="1069212" y="589360"/>
-                  <a:pt x="1133172" y="596503"/>
-                  <a:pt x="1218453" y="560785"/>
-                </a:cubicBezTo>
-                <a:cubicBezTo>
-                  <a:pt x="1140279" y="539354"/>
-                  <a:pt x="1079872" y="521494"/>
-                  <a:pt x="1019464" y="507206"/>
-                </a:cubicBezTo>
-                <a:cubicBezTo>
-                  <a:pt x="969717" y="496491"/>
-                  <a:pt x="941290" y="471488"/>
-                  <a:pt x="944844" y="417909"/>
-                </a:cubicBezTo>
-                <a:cubicBezTo>
-                  <a:pt x="944844" y="389334"/>
-                  <a:pt x="934184" y="350044"/>
-                  <a:pt x="969717" y="335757"/>
-                </a:cubicBezTo>
-                <a:cubicBezTo>
-                  <a:pt x="998144" y="321469"/>
-                  <a:pt x="1037231" y="335757"/>
-                  <a:pt x="1051445" y="360759"/>
-                </a:cubicBezTo>
-                <a:cubicBezTo>
-                  <a:pt x="1069212" y="407194"/>
-                  <a:pt x="1086978" y="450056"/>
-                  <a:pt x="1147386" y="453629"/>
-                </a:cubicBezTo>
-                <a:cubicBezTo>
-                  <a:pt x="1229113" y="460771"/>
-                  <a:pt x="1182919" y="432197"/>
-                  <a:pt x="1168706" y="396478"/>
-                </a:cubicBezTo>
-                <a:cubicBezTo>
-                  <a:pt x="1154492" y="357188"/>
-                  <a:pt x="1197133" y="346472"/>
-                  <a:pt x="1225560" y="353615"/>
-                </a:cubicBezTo>
-                <a:cubicBezTo>
-                  <a:pt x="1332161" y="385763"/>
-                  <a:pt x="1442315" y="328613"/>
-                  <a:pt x="1552469" y="375047"/>
-                </a:cubicBezTo>
-                <a:cubicBezTo>
-                  <a:pt x="1524043" y="260747"/>
-                  <a:pt x="1463635" y="210741"/>
-                  <a:pt x="1335714" y="192881"/>
-                </a:cubicBezTo>
-                <a:cubicBezTo>
-                  <a:pt x="1289520" y="189310"/>
-                  <a:pt x="1239773" y="196453"/>
-                  <a:pt x="1197133" y="164306"/>
-                </a:cubicBezTo>
-                <a:cubicBezTo>
-                  <a:pt x="1172259" y="146447"/>
-                  <a:pt x="1147386" y="125016"/>
-                  <a:pt x="1165153" y="89297"/>
-                </a:cubicBezTo>
-                <a:cubicBezTo>
-                  <a:pt x="1175813" y="64294"/>
-                  <a:pt x="1204239" y="64294"/>
-                  <a:pt x="1229113" y="71437"/>
-                </a:cubicBezTo>
-                <a:cubicBezTo>
-                  <a:pt x="1332161" y="110728"/>
-                  <a:pt x="1442315" y="121444"/>
-                  <a:pt x="1548916" y="135731"/>
-                </a:cubicBezTo>
-                <a:cubicBezTo>
-                  <a:pt x="1566683" y="139303"/>
-                  <a:pt x="1584450" y="146447"/>
-                  <a:pt x="1602217" y="110728"/>
-                </a:cubicBezTo>
-                <a:cubicBezTo>
-                  <a:pt x="1477849" y="78581"/>
-                  <a:pt x="1357034" y="35719"/>
-                  <a:pt x="1232666" y="0"/>
-                </a:cubicBezTo>
-                <a:close/>
-              </a:path>
-            </a:pathLst>
-          </a:custGeom>
+          </a:prstGeom>
         </p:spPr>
       </p:pic>
     </p:spTree>
@@ -22755,196 +22172,6 @@
           <p:cNvPr id="2" name="Título 1">
             <a:extLst>
               <a:ext uri="{FF2B5EF4-FFF2-40B4-BE49-F238E27FC236}">
-                <a16:creationId xmlns:a16="http://schemas.microsoft.com/office/drawing/2014/main" id="{5F18166D-0ED3-41FF-A42E-3FEEEE3C71C2}"/>
-              </a:ext>
-            </a:extLst>
-          </p:cNvPr>
-          <p:cNvSpPr>
-            <a:spLocks noGrp="1"/>
-          </p:cNvSpPr>
-          <p:nvPr>
-            <p:ph type="title"/>
-          </p:nvPr>
-        </p:nvSpPr>
-        <p:spPr/>
-        <p:txBody>
-          <a:bodyPr/>
-          <a:lstStyle/>
-          <a:p>
-            <a:r>
-              <a:rPr lang="es-CO" b="1" i="1" dirty="0">
-                <a:solidFill>
-                  <a:srgbClr val="24292E"/>
-                </a:solidFill>
-                <a:effectLst/>
-                <a:latin typeface="-apple-system"/>
-              </a:rPr>
-              <a:t>Mockups</a:t>
-            </a:r>
-            <a:endParaRPr lang="es-CO" dirty="0"/>
-          </a:p>
-        </p:txBody>
-      </p:sp>
-      <p:pic>
-        <p:nvPicPr>
-          <p:cNvPr id="4" name="Imagen 3">
-            <a:extLst>
-              <a:ext uri="{FF2B5EF4-FFF2-40B4-BE49-F238E27FC236}">
-                <a16:creationId xmlns:a16="http://schemas.microsoft.com/office/drawing/2014/main" id="{AB9DE418-20AD-4A40-A9B1-4844A1E2C901}"/>
-              </a:ext>
-            </a:extLst>
-          </p:cNvPr>
-          <p:cNvPicPr>
-            <a:picLocks noChangeAspect="1"/>
-          </p:cNvPicPr>
-          <p:nvPr/>
-        </p:nvPicPr>
-        <p:blipFill>
-          <a:blip r:embed="rId2"/>
-          <a:stretch>
-            <a:fillRect/>
-          </a:stretch>
-        </p:blipFill>
-        <p:spPr>
-          <a:xfrm>
-            <a:off x="2508379" y="1363415"/>
-            <a:ext cx="6685242" cy="5494585"/>
-          </a:xfrm>
-          <a:prstGeom prst="rect">
-            <a:avLst/>
-          </a:prstGeom>
-        </p:spPr>
-      </p:pic>
-    </p:spTree>
-    <p:extLst>
-      <p:ext uri="{BB962C8B-B14F-4D97-AF65-F5344CB8AC3E}">
-        <p14:creationId xmlns:p14="http://schemas.microsoft.com/office/powerpoint/2010/main" val="2785193253"/>
-      </p:ext>
-    </p:extLst>
-  </p:cSld>
-  <p:clrMapOvr>
-    <a:masterClrMapping/>
-  </p:clrMapOvr>
-</p:sld>
-</file>
-
-<file path=ppt/slides/slide6.xml><?xml version="1.0" encoding="utf-8"?>
-<p:sld xmlns:a="http://schemas.openxmlformats.org/drawingml/2006/main" xmlns:r="http://schemas.openxmlformats.org/officeDocument/2006/relationships" xmlns:p="http://schemas.openxmlformats.org/presentationml/2006/main">
-  <p:cSld>
-    <p:spTree>
-      <p:nvGrpSpPr>
-        <p:cNvPr id="1" name=""/>
-        <p:cNvGrpSpPr/>
-        <p:nvPr/>
-      </p:nvGrpSpPr>
-      <p:grpSpPr>
-        <a:xfrm>
-          <a:off x="0" y="0"/>
-          <a:ext cx="0" cy="0"/>
-          <a:chOff x="0" y="0"/>
-          <a:chExt cx="0" cy="0"/>
-        </a:xfrm>
-      </p:grpSpPr>
-      <p:pic>
-        <p:nvPicPr>
-          <p:cNvPr id="4" name="Imagen 3">
-            <a:extLst>
-              <a:ext uri="{FF2B5EF4-FFF2-40B4-BE49-F238E27FC236}">
-                <a16:creationId xmlns:a16="http://schemas.microsoft.com/office/drawing/2014/main" id="{A6BD3D6B-0111-46D9-9AD5-E5E3B564A19E}"/>
-              </a:ext>
-            </a:extLst>
-          </p:cNvPr>
-          <p:cNvPicPr>
-            <a:picLocks noChangeAspect="1"/>
-          </p:cNvPicPr>
-          <p:nvPr/>
-        </p:nvPicPr>
-        <p:blipFill>
-          <a:blip r:embed="rId2"/>
-          <a:stretch>
-            <a:fillRect/>
-          </a:stretch>
-        </p:blipFill>
-        <p:spPr>
-          <a:xfrm>
-            <a:off x="2485572" y="1306558"/>
-            <a:ext cx="7915730" cy="5551442"/>
-          </a:xfrm>
-          <a:prstGeom prst="rect">
-            <a:avLst/>
-          </a:prstGeom>
-        </p:spPr>
-      </p:pic>
-      <p:sp>
-        <p:nvSpPr>
-          <p:cNvPr id="2" name="Título 1">
-            <a:extLst>
-              <a:ext uri="{FF2B5EF4-FFF2-40B4-BE49-F238E27FC236}">
-                <a16:creationId xmlns:a16="http://schemas.microsoft.com/office/drawing/2014/main" id="{6D413397-D867-4641-920E-0F712B8E5458}"/>
-              </a:ext>
-            </a:extLst>
-          </p:cNvPr>
-          <p:cNvSpPr>
-            <a:spLocks noGrp="1"/>
-          </p:cNvSpPr>
-          <p:nvPr>
-            <p:ph type="title"/>
-          </p:nvPr>
-        </p:nvSpPr>
-        <p:spPr/>
-        <p:txBody>
-          <a:bodyPr/>
-          <a:lstStyle/>
-          <a:p>
-            <a:r>
-              <a:rPr lang="es-CO" b="1" i="1" dirty="0">
-                <a:solidFill>
-                  <a:srgbClr val="24292E"/>
-                </a:solidFill>
-                <a:effectLst/>
-                <a:latin typeface="-apple-system"/>
-              </a:rPr>
-              <a:t>Mockups</a:t>
-            </a:r>
-            <a:endParaRPr lang="es-CO" dirty="0"/>
-          </a:p>
-        </p:txBody>
-      </p:sp>
-    </p:spTree>
-    <p:extLst>
-      <p:ext uri="{BB962C8B-B14F-4D97-AF65-F5344CB8AC3E}">
-        <p14:creationId xmlns:p14="http://schemas.microsoft.com/office/powerpoint/2010/main" val="3726789079"/>
-      </p:ext>
-    </p:extLst>
-  </p:cSld>
-  <p:clrMapOvr>
-    <a:masterClrMapping/>
-  </p:clrMapOvr>
-</p:sld>
-</file>
-
-<file path=ppt/slides/slide7.xml><?xml version="1.0" encoding="utf-8"?>
-<p:sld xmlns:a="http://schemas.openxmlformats.org/drawingml/2006/main" xmlns:r="http://schemas.openxmlformats.org/officeDocument/2006/relationships" xmlns:p="http://schemas.openxmlformats.org/presentationml/2006/main">
-  <p:cSld>
-    <p:spTree>
-      <p:nvGrpSpPr>
-        <p:cNvPr id="1" name=""/>
-        <p:cNvGrpSpPr/>
-        <p:nvPr/>
-      </p:nvGrpSpPr>
-      <p:grpSpPr>
-        <a:xfrm>
-          <a:off x="0" y="0"/>
-          <a:ext cx="0" cy="0"/>
-          <a:chOff x="0" y="0"/>
-          <a:chExt cx="0" cy="0"/>
-        </a:xfrm>
-      </p:grpSpPr>
-      <p:sp>
-        <p:nvSpPr>
-          <p:cNvPr id="2" name="Título 1">
-            <a:extLst>
-              <a:ext uri="{FF2B5EF4-FFF2-40B4-BE49-F238E27FC236}">
                 <a16:creationId xmlns:a16="http://schemas.microsoft.com/office/drawing/2014/main" id="{C2952587-5319-4615-ABF7-C69974F6BBEC}"/>
               </a:ext>
             </a:extLst>
@@ -23066,7 +22293,7 @@
 </p:sld>
 </file>
 
-<file path=ppt/slides/slide8.xml><?xml version="1.0" encoding="utf-8"?>
+<file path=ppt/slides/slide6.xml><?xml version="1.0" encoding="utf-8"?>
 <p:sld xmlns:a="http://schemas.openxmlformats.org/drawingml/2006/main" xmlns:r="http://schemas.openxmlformats.org/officeDocument/2006/relationships" xmlns:p="http://schemas.openxmlformats.org/presentationml/2006/main">
   <p:cSld>
     <p:spTree>
@@ -23126,10 +22353,10 @@
       </p:sp>
       <p:pic>
         <p:nvPicPr>
-          <p:cNvPr id="9" name="Imagen 8" descr="Diagrama&#10;&#10;Descripción generada automáticamente">
+          <p:cNvPr id="11" name="Imagen 10" descr="Diagrama&#10;&#10;Descripción generada automáticamente">
             <a:extLst>
               <a:ext uri="{FF2B5EF4-FFF2-40B4-BE49-F238E27FC236}">
-                <a16:creationId xmlns:a16="http://schemas.microsoft.com/office/drawing/2014/main" id="{61AAFD75-2BE4-4C78-930A-363670E8FD7A}"/>
+                <a16:creationId xmlns:a16="http://schemas.microsoft.com/office/drawing/2014/main" id="{B19E7466-FCF2-4674-8946-626D1797DECF}"/>
               </a:ext>
             </a:extLst>
           </p:cNvPr>
@@ -23152,8 +22379,8 @@
         </p:blipFill>
         <p:spPr>
           <a:xfrm>
-            <a:off x="1037445" y="2003571"/>
-            <a:ext cx="4105848" cy="3962953"/>
+            <a:off x="6626164" y="3037177"/>
+            <a:ext cx="3686689" cy="1895740"/>
           </a:xfrm>
           <a:prstGeom prst="rect">
             <a:avLst/>
@@ -23162,10 +22389,10 @@
       </p:pic>
       <p:pic>
         <p:nvPicPr>
-          <p:cNvPr id="11" name="Imagen 10" descr="Diagrama&#10;&#10;Descripción generada automáticamente">
+          <p:cNvPr id="3" name="Imagen 2">
             <a:extLst>
               <a:ext uri="{FF2B5EF4-FFF2-40B4-BE49-F238E27FC236}">
-                <a16:creationId xmlns:a16="http://schemas.microsoft.com/office/drawing/2014/main" id="{B19E7466-FCF2-4674-8946-626D1797DECF}"/>
+                <a16:creationId xmlns:a16="http://schemas.microsoft.com/office/drawing/2014/main" id="{C1525D0E-D1E7-49E2-BA87-EC9D25086F1C}"/>
               </a:ext>
             </a:extLst>
           </p:cNvPr>
@@ -23175,7 +22402,109 @@
           <p:nvPr/>
         </p:nvPicPr>
         <p:blipFill>
-          <a:blip r:embed="rId3">
+          <a:blip r:embed="rId3"/>
+          <a:stretch>
+            <a:fillRect/>
+          </a:stretch>
+        </p:blipFill>
+        <p:spPr>
+          <a:xfrm>
+            <a:off x="1319431" y="2496074"/>
+            <a:ext cx="4133850" cy="3124200"/>
+          </a:xfrm>
+          <a:prstGeom prst="rect">
+            <a:avLst/>
+          </a:prstGeom>
+        </p:spPr>
+      </p:pic>
+    </p:spTree>
+    <p:extLst>
+      <p:ext uri="{BB962C8B-B14F-4D97-AF65-F5344CB8AC3E}">
+        <p14:creationId xmlns:p14="http://schemas.microsoft.com/office/powerpoint/2010/main" val="3283598691"/>
+      </p:ext>
+    </p:extLst>
+  </p:cSld>
+  <p:clrMapOvr>
+    <a:masterClrMapping/>
+  </p:clrMapOvr>
+</p:sld>
+</file>
+
+<file path=ppt/slides/slide7.xml><?xml version="1.0" encoding="utf-8"?>
+<p:sld xmlns:a="http://schemas.openxmlformats.org/drawingml/2006/main" xmlns:r="http://schemas.openxmlformats.org/officeDocument/2006/relationships" xmlns:p="http://schemas.openxmlformats.org/presentationml/2006/main">
+  <p:cSld>
+    <p:spTree>
+      <p:nvGrpSpPr>
+        <p:cNvPr id="1" name=""/>
+        <p:cNvGrpSpPr/>
+        <p:nvPr/>
+      </p:nvGrpSpPr>
+      <p:grpSpPr>
+        <a:xfrm>
+          <a:off x="0" y="0"/>
+          <a:ext cx="0" cy="0"/>
+          <a:chOff x="0" y="0"/>
+          <a:chExt cx="0" cy="0"/>
+        </a:xfrm>
+      </p:grpSpPr>
+      <p:sp>
+        <p:nvSpPr>
+          <p:cNvPr id="2" name="Título 1">
+            <a:extLst>
+              <a:ext uri="{FF2B5EF4-FFF2-40B4-BE49-F238E27FC236}">
+                <a16:creationId xmlns:a16="http://schemas.microsoft.com/office/drawing/2014/main" id="{7F0FB012-18D7-4251-B852-FFBB125A6374}"/>
+              </a:ext>
+            </a:extLst>
+          </p:cNvPr>
+          <p:cNvSpPr>
+            <a:spLocks noGrp="1"/>
+          </p:cNvSpPr>
+          <p:nvPr>
+            <p:ph type="title"/>
+          </p:nvPr>
+        </p:nvSpPr>
+        <p:spPr/>
+        <p:txBody>
+          <a:bodyPr/>
+          <a:lstStyle/>
+          <a:p>
+            <a:pPr algn="l"/>
+            <a:r>
+              <a:rPr lang="es-CO" b="1" i="1" dirty="0">
+                <a:solidFill>
+                  <a:srgbClr val="24292E"/>
+                </a:solidFill>
+                <a:effectLst/>
+                <a:latin typeface="-apple-system"/>
+              </a:rPr>
+              <a:t>Diagrama de componentes</a:t>
+            </a:r>
+            <a:endParaRPr lang="es-CO" b="1" i="0" dirty="0">
+              <a:solidFill>
+                <a:srgbClr val="24292E"/>
+              </a:solidFill>
+              <a:effectLst/>
+              <a:latin typeface="-apple-system"/>
+            </a:endParaRPr>
+          </a:p>
+        </p:txBody>
+      </p:sp>
+      <p:pic>
+        <p:nvPicPr>
+          <p:cNvPr id="7" name="Imagen 6" descr="Diagrama&#10;&#10;Descripción generada automáticamente">
+            <a:extLst>
+              <a:ext uri="{FF2B5EF4-FFF2-40B4-BE49-F238E27FC236}">
+                <a16:creationId xmlns:a16="http://schemas.microsoft.com/office/drawing/2014/main" id="{E5AF297C-8C02-410B-8BC6-9FADBE9DC3C3}"/>
+              </a:ext>
+            </a:extLst>
+          </p:cNvPr>
+          <p:cNvPicPr>
+            <a:picLocks noChangeAspect="1"/>
+          </p:cNvPicPr>
+          <p:nvPr/>
+        </p:nvPicPr>
+        <p:blipFill>
+          <a:blip r:embed="rId2">
             <a:extLst>
               <a:ext uri="{28A0092B-C50C-407E-A947-70E740481C1C}">
                 <a14:useLocalDpi xmlns:a14="http://schemas.microsoft.com/office/drawing/2010/main" val="0"/>
@@ -23188,8 +22517,8 @@
         </p:blipFill>
         <p:spPr>
           <a:xfrm>
-            <a:off x="6626164" y="3037177"/>
-            <a:ext cx="3686689" cy="1895740"/>
+            <a:off x="2481942" y="1690688"/>
+            <a:ext cx="8071569" cy="5107886"/>
           </a:xfrm>
           <a:prstGeom prst="rect">
             <a:avLst/>
@@ -23199,7 +22528,108 @@
     </p:spTree>
     <p:extLst>
       <p:ext uri="{BB962C8B-B14F-4D97-AF65-F5344CB8AC3E}">
-        <p14:creationId xmlns:p14="http://schemas.microsoft.com/office/powerpoint/2010/main" val="3283598691"/>
+        <p14:creationId xmlns:p14="http://schemas.microsoft.com/office/powerpoint/2010/main" val="1247634998"/>
+      </p:ext>
+    </p:extLst>
+  </p:cSld>
+  <p:clrMapOvr>
+    <a:masterClrMapping/>
+  </p:clrMapOvr>
+</p:sld>
+</file>
+
+<file path=ppt/slides/slide8.xml><?xml version="1.0" encoding="utf-8"?>
+<p:sld xmlns:a="http://schemas.openxmlformats.org/drawingml/2006/main" xmlns:r="http://schemas.openxmlformats.org/officeDocument/2006/relationships" xmlns:p="http://schemas.openxmlformats.org/presentationml/2006/main">
+  <p:cSld>
+    <p:spTree>
+      <p:nvGrpSpPr>
+        <p:cNvPr id="1" name=""/>
+        <p:cNvGrpSpPr/>
+        <p:nvPr/>
+      </p:nvGrpSpPr>
+      <p:grpSpPr>
+        <a:xfrm>
+          <a:off x="0" y="0"/>
+          <a:ext cx="0" cy="0"/>
+          <a:chOff x="0" y="0"/>
+          <a:chExt cx="0" cy="0"/>
+        </a:xfrm>
+      </p:grpSpPr>
+      <p:sp>
+        <p:nvSpPr>
+          <p:cNvPr id="2" name="Título 1">
+            <a:extLst>
+              <a:ext uri="{FF2B5EF4-FFF2-40B4-BE49-F238E27FC236}">
+                <a16:creationId xmlns:a16="http://schemas.microsoft.com/office/drawing/2014/main" id="{D63646E1-2BDA-48F6-972E-6DFF9E4BE879}"/>
+              </a:ext>
+            </a:extLst>
+          </p:cNvPr>
+          <p:cNvSpPr>
+            <a:spLocks noGrp="1"/>
+          </p:cNvSpPr>
+          <p:nvPr>
+            <p:ph type="title"/>
+          </p:nvPr>
+        </p:nvSpPr>
+        <p:spPr/>
+        <p:txBody>
+          <a:bodyPr/>
+          <a:lstStyle/>
+          <a:p>
+            <a:r>
+              <a:rPr lang="es-CO" b="1" i="1" dirty="0">
+                <a:solidFill>
+                  <a:srgbClr val="24292E"/>
+                </a:solidFill>
+                <a:effectLst/>
+                <a:latin typeface="-apple-system"/>
+              </a:rPr>
+              <a:t>Diagrama de clases</a:t>
+            </a:r>
+            <a:endParaRPr lang="es-CO" dirty="0"/>
+          </a:p>
+        </p:txBody>
+      </p:sp>
+      <p:pic>
+        <p:nvPicPr>
+          <p:cNvPr id="4" name="Imagen 3" descr="Diagrama&#10;&#10;Descripción generada automáticamente">
+            <a:extLst>
+              <a:ext uri="{FF2B5EF4-FFF2-40B4-BE49-F238E27FC236}">
+                <a16:creationId xmlns:a16="http://schemas.microsoft.com/office/drawing/2014/main" id="{7CA69C3B-CBBC-4258-825F-2A6B28B7E2EA}"/>
+              </a:ext>
+            </a:extLst>
+          </p:cNvPr>
+          <p:cNvPicPr>
+            <a:picLocks noChangeAspect="1"/>
+          </p:cNvPicPr>
+          <p:nvPr/>
+        </p:nvPicPr>
+        <p:blipFill>
+          <a:blip r:embed="rId2">
+            <a:extLst>
+              <a:ext uri="{28A0092B-C50C-407E-A947-70E740481C1C}">
+                <a14:useLocalDpi xmlns:a14="http://schemas.microsoft.com/office/drawing/2010/main" val="0"/>
+              </a:ext>
+            </a:extLst>
+          </a:blip>
+          <a:stretch>
+            <a:fillRect/>
+          </a:stretch>
+        </p:blipFill>
+        <p:spPr>
+          <a:xfrm>
+            <a:off x="2812293" y="1644651"/>
+            <a:ext cx="7722115" cy="5157958"/>
+          </a:xfrm>
+          <a:prstGeom prst="rect">
+            <a:avLst/>
+          </a:prstGeom>
+        </p:spPr>
+      </p:pic>
+    </p:spTree>
+    <p:extLst>
+      <p:ext uri="{BB962C8B-B14F-4D97-AF65-F5344CB8AC3E}">
+        <p14:creationId xmlns:p14="http://schemas.microsoft.com/office/powerpoint/2010/main" val="1545984780"/>
       </p:ext>
     </p:extLst>
   </p:cSld>
@@ -23228,75 +22658,45 @@
       </p:grpSpPr>
       <p:sp>
         <p:nvSpPr>
-          <p:cNvPr id="4" name="Título 1">
+          <p:cNvPr id="2" name="Título 1">
             <a:extLst>
               <a:ext uri="{FF2B5EF4-FFF2-40B4-BE49-F238E27FC236}">
-                <a16:creationId xmlns:a16="http://schemas.microsoft.com/office/drawing/2014/main" id="{4A70FBBF-6280-476B-BEB6-140ADEBC943A}"/>
+                <a16:creationId xmlns:a16="http://schemas.microsoft.com/office/drawing/2014/main" id="{9E9E082A-2796-4515-A2B5-079BD864BED2}"/>
               </a:ext>
             </a:extLst>
           </p:cNvPr>
-          <p:cNvSpPr txBox="1">
-            <a:spLocks/>
+          <p:cNvSpPr>
+            <a:spLocks noGrp="1"/>
           </p:cNvSpPr>
-          <p:nvPr/>
+          <p:nvPr>
+            <p:ph type="title"/>
+          </p:nvPr>
         </p:nvSpPr>
-        <p:spPr>
-          <a:xfrm>
-            <a:off x="838200" y="313882"/>
-            <a:ext cx="10515600" cy="1325563"/>
-          </a:xfrm>
-          <a:prstGeom prst="rect">
-            <a:avLst/>
-          </a:prstGeom>
-        </p:spPr>
+        <p:spPr/>
         <p:txBody>
-          <a:bodyPr vert="horz" lIns="91440" tIns="45720" rIns="91440" bIns="45720" rtlCol="0" anchor="ctr">
-            <a:normAutofit/>
-          </a:bodyPr>
-          <a:lstStyle>
-            <a:lvl1pPr algn="l" defTabSz="914400" rtl="0" eaLnBrk="1" latinLnBrk="0" hangingPunct="1">
-              <a:lnSpc>
-                <a:spcPct val="90000"/>
-              </a:lnSpc>
-              <a:spcBef>
-                <a:spcPct val="0"/>
-              </a:spcBef>
-              <a:buNone/>
-              <a:defRPr sz="4000" i="1" kern="1200">
-                <a:solidFill>
-                  <a:schemeClr val="tx1"/>
-                </a:solidFill>
-                <a:latin typeface="+mj-lt"/>
-                <a:ea typeface="+mj-ea"/>
-                <a:cs typeface="+mj-cs"/>
-              </a:defRPr>
-            </a:lvl1pPr>
-          </a:lstStyle>
+          <a:bodyPr/>
+          <a:lstStyle/>
           <a:p>
             <a:r>
-              <a:rPr lang="es-CO" b="1" dirty="0">
+              <a:rPr lang="es-CO" b="1" i="1" dirty="0">
                 <a:solidFill>
                   <a:srgbClr val="24292E"/>
                 </a:solidFill>
+                <a:effectLst/>
                 <a:latin typeface="-apple-system"/>
               </a:rPr>
-              <a:t>Diagrama de despliegue</a:t>
+              <a:t>Diagrama E-R</a:t>
             </a:r>
-            <a:endParaRPr lang="es-CO" b="1" i="0" dirty="0">
-              <a:solidFill>
-                <a:srgbClr val="24292E"/>
-              </a:solidFill>
-              <a:latin typeface="-apple-system"/>
-            </a:endParaRPr>
+            <a:endParaRPr lang="es-CO" dirty="0"/>
           </a:p>
         </p:txBody>
       </p:sp>
       <p:pic>
         <p:nvPicPr>
-          <p:cNvPr id="6" name="Imagen 5" descr="Diagrama&#10;&#10;Descripción generada automáticamente">
+          <p:cNvPr id="3" name="Imagen 2">
             <a:extLst>
               <a:ext uri="{FF2B5EF4-FFF2-40B4-BE49-F238E27FC236}">
-                <a16:creationId xmlns:a16="http://schemas.microsoft.com/office/drawing/2014/main" id="{8C37D84F-0977-4847-A2B2-4BDBE610E501}"/>
+                <a16:creationId xmlns:a16="http://schemas.microsoft.com/office/drawing/2014/main" id="{EB528903-6FC0-44C0-8132-7202910BF4A2}"/>
               </a:ext>
             </a:extLst>
           </p:cNvPr>
@@ -23306,21 +22706,45 @@
           <p:nvPr/>
         </p:nvPicPr>
         <p:blipFill>
-          <a:blip r:embed="rId2">
-            <a:extLst>
-              <a:ext uri="{28A0092B-C50C-407E-A947-70E740481C1C}">
-                <a14:useLocalDpi xmlns:a14="http://schemas.microsoft.com/office/drawing/2010/main" val="0"/>
-              </a:ext>
-            </a:extLst>
-          </a:blip>
+          <a:blip r:embed="rId2"/>
           <a:stretch>
             <a:fillRect/>
           </a:stretch>
         </p:blipFill>
         <p:spPr>
           <a:xfrm>
-            <a:off x="2239346" y="1639445"/>
-            <a:ext cx="7435483" cy="5148239"/>
+            <a:off x="3918856" y="542408"/>
+            <a:ext cx="8038967" cy="6156972"/>
+          </a:xfrm>
+          <a:prstGeom prst="rect">
+            <a:avLst/>
+          </a:prstGeom>
+        </p:spPr>
+      </p:pic>
+      <p:pic>
+        <p:nvPicPr>
+          <p:cNvPr id="4" name="Imagen 3">
+            <a:extLst>
+              <a:ext uri="{FF2B5EF4-FFF2-40B4-BE49-F238E27FC236}">
+                <a16:creationId xmlns:a16="http://schemas.microsoft.com/office/drawing/2014/main" id="{21F568C4-2894-4D41-A146-95F279F43DD2}"/>
+              </a:ext>
+            </a:extLst>
+          </p:cNvPr>
+          <p:cNvPicPr>
+            <a:picLocks noChangeAspect="1"/>
+          </p:cNvPicPr>
+          <p:nvPr/>
+        </p:nvPicPr>
+        <p:blipFill>
+          <a:blip r:embed="rId3"/>
+          <a:stretch>
+            <a:fillRect/>
+          </a:stretch>
+        </p:blipFill>
+        <p:spPr>
+          <a:xfrm>
+            <a:off x="337456" y="3200400"/>
+            <a:ext cx="3581400" cy="228600"/>
           </a:xfrm>
           <a:prstGeom prst="rect">
             <a:avLst/>
@@ -23330,7 +22754,7 @@
     </p:spTree>
     <p:extLst>
       <p:ext uri="{BB962C8B-B14F-4D97-AF65-F5344CB8AC3E}">
-        <p14:creationId xmlns:p14="http://schemas.microsoft.com/office/powerpoint/2010/main" val="3999526091"/>
+        <p14:creationId xmlns:p14="http://schemas.microsoft.com/office/powerpoint/2010/main" val="2364458723"/>
       </p:ext>
     </p:extLst>
   </p:cSld>

</xml_diff>

<commit_message>
Revisando si usuario existe
</commit_message>
<xml_diff>
--- a/SaleIt-Presentacion.pptx
+++ b/SaleIt-Presentacion.pptx
@@ -7,17 +7,15 @@
   <p:sldIdLst>
     <p:sldId id="256" r:id="rId2"/>
     <p:sldId id="257" r:id="rId3"/>
-    <p:sldId id="258" r:id="rId4"/>
-    <p:sldId id="260" r:id="rId5"/>
-    <p:sldId id="259" r:id="rId6"/>
-    <p:sldId id="270" r:id="rId7"/>
-    <p:sldId id="263" r:id="rId8"/>
-    <p:sldId id="264" r:id="rId9"/>
-    <p:sldId id="265" r:id="rId10"/>
-    <p:sldId id="269" r:id="rId11"/>
-    <p:sldId id="271" r:id="rId12"/>
-    <p:sldId id="266" r:id="rId13"/>
-    <p:sldId id="267" r:id="rId14"/>
+    <p:sldId id="259" r:id="rId4"/>
+    <p:sldId id="270" r:id="rId5"/>
+    <p:sldId id="263" r:id="rId6"/>
+    <p:sldId id="264" r:id="rId7"/>
+    <p:sldId id="265" r:id="rId8"/>
+    <p:sldId id="269" r:id="rId9"/>
+    <p:sldId id="271" r:id="rId10"/>
+    <p:sldId id="266" r:id="rId11"/>
+    <p:sldId id="267" r:id="rId12"/>
   </p:sldIdLst>
   <p:sldSz cx="12192000" cy="6858000"/>
   <p:notesSz cx="6858000" cy="9144000"/>
@@ -304,2762 +302,6 @@
     </pc:docChg>
   </pc:docChgLst>
 </pc:chgInfo>
-</file>
-
-<file path=ppt/diagrams/colors1.xml><?xml version="1.0" encoding="utf-8"?>
-<dgm:colorsDef xmlns:dgm="http://schemas.openxmlformats.org/drawingml/2006/diagram" xmlns:a="http://schemas.openxmlformats.org/drawingml/2006/main" uniqueId="urn:microsoft.com/office/officeart/2018/5/colors/Iconchunking_neutralicon_colorful1">
-  <dgm:title val=""/>
-  <dgm:desc val=""/>
-  <dgm:catLst>
-    <dgm:cat type="colorful" pri="10100"/>
-  </dgm:catLst>
-  <dgm:styleLbl name="node0">
-    <dgm:fillClrLst meth="repeat">
-      <a:schemeClr val="accent1"/>
-    </dgm:fillClrLst>
-    <dgm:linClrLst meth="repeat">
-      <a:schemeClr val="lt1"/>
-    </dgm:linClrLst>
-    <dgm:effectClrLst/>
-    <dgm:txLinClrLst/>
-    <dgm:txFillClrLst/>
-    <dgm:txEffectClrLst/>
-  </dgm:styleLbl>
-  <dgm:styleLbl name="node1">
-    <dgm:fillClrLst meth="repeat">
-      <a:schemeClr val="bg1"/>
-    </dgm:fillClrLst>
-    <dgm:linClrLst meth="repeat">
-      <a:schemeClr val="lt1">
-        <a:alpha val="0"/>
-      </a:schemeClr>
-    </dgm:linClrLst>
-    <dgm:effectClrLst/>
-    <dgm:txLinClrLst/>
-    <dgm:txFillClrLst meth="repeat">
-      <a:schemeClr val="dk1"/>
-    </dgm:txFillClrLst>
-    <dgm:txEffectClrLst/>
-  </dgm:styleLbl>
-  <dgm:styleLbl name="alignNode1">
-    <dgm:fillClrLst meth="repeat">
-      <a:schemeClr val="accent2"/>
-      <a:schemeClr val="accent3"/>
-      <a:schemeClr val="accent4"/>
-      <a:schemeClr val="accent5"/>
-      <a:schemeClr val="accent6"/>
-    </dgm:fillClrLst>
-    <dgm:linClrLst meth="repeat">
-      <a:schemeClr val="accent2"/>
-      <a:schemeClr val="accent3"/>
-      <a:schemeClr val="accent4"/>
-      <a:schemeClr val="accent5"/>
-      <a:schemeClr val="accent6"/>
-    </dgm:linClrLst>
-    <dgm:effectClrLst/>
-    <dgm:txLinClrLst/>
-    <dgm:txFillClrLst/>
-    <dgm:txEffectClrLst/>
-  </dgm:styleLbl>
-  <dgm:styleLbl name="lnNode1">
-    <dgm:fillClrLst meth="repeat">
-      <a:schemeClr val="accent2"/>
-      <a:schemeClr val="accent3"/>
-      <a:schemeClr val="accent4"/>
-      <a:schemeClr val="accent5"/>
-      <a:schemeClr val="accent6"/>
-    </dgm:fillClrLst>
-    <dgm:linClrLst meth="repeat">
-      <a:schemeClr val="lt1"/>
-    </dgm:linClrLst>
-    <dgm:effectClrLst/>
-    <dgm:txLinClrLst/>
-    <dgm:txFillClrLst/>
-    <dgm:txEffectClrLst/>
-  </dgm:styleLbl>
-  <dgm:styleLbl name="vennNode1">
-    <dgm:fillClrLst meth="repeat">
-      <a:schemeClr val="accent2">
-        <a:alpha val="50000"/>
-      </a:schemeClr>
-      <a:schemeClr val="accent3">
-        <a:alpha val="50000"/>
-      </a:schemeClr>
-      <a:schemeClr val="accent4">
-        <a:alpha val="50000"/>
-      </a:schemeClr>
-      <a:schemeClr val="accent5">
-        <a:alpha val="50000"/>
-      </a:schemeClr>
-      <a:schemeClr val="accent6">
-        <a:alpha val="50000"/>
-      </a:schemeClr>
-    </dgm:fillClrLst>
-    <dgm:linClrLst meth="repeat">
-      <a:schemeClr val="lt1"/>
-    </dgm:linClrLst>
-    <dgm:effectClrLst/>
-    <dgm:txLinClrLst/>
-    <dgm:txFillClrLst/>
-    <dgm:txEffectClrLst/>
-  </dgm:styleLbl>
-  <dgm:styleLbl name="node2">
-    <dgm:fillClrLst>
-      <a:schemeClr val="accent2"/>
-    </dgm:fillClrLst>
-    <dgm:linClrLst meth="repeat">
-      <a:schemeClr val="lt1"/>
-    </dgm:linClrLst>
-    <dgm:effectClrLst/>
-    <dgm:txLinClrLst/>
-    <dgm:txFillClrLst/>
-    <dgm:txEffectClrLst/>
-  </dgm:styleLbl>
-  <dgm:styleLbl name="node3">
-    <dgm:fillClrLst>
-      <a:schemeClr val="accent3"/>
-    </dgm:fillClrLst>
-    <dgm:linClrLst meth="repeat">
-      <a:schemeClr val="lt1"/>
-    </dgm:linClrLst>
-    <dgm:effectClrLst/>
-    <dgm:txLinClrLst/>
-    <dgm:txFillClrLst/>
-    <dgm:txEffectClrLst/>
-  </dgm:styleLbl>
-  <dgm:styleLbl name="node4">
-    <dgm:fillClrLst>
-      <a:schemeClr val="accent4"/>
-    </dgm:fillClrLst>
-    <dgm:linClrLst meth="repeat">
-      <a:schemeClr val="lt1"/>
-    </dgm:linClrLst>
-    <dgm:effectClrLst/>
-    <dgm:txLinClrLst/>
-    <dgm:txFillClrLst/>
-    <dgm:txEffectClrLst/>
-  </dgm:styleLbl>
-  <dgm:styleLbl name="fgImgPlace1">
-    <dgm:fillClrLst meth="repeat">
-      <a:schemeClr val="accent2">
-        <a:tint val="50000"/>
-      </a:schemeClr>
-      <a:schemeClr val="accent3">
-        <a:tint val="50000"/>
-      </a:schemeClr>
-      <a:schemeClr val="accent4">
-        <a:tint val="50000"/>
-      </a:schemeClr>
-      <a:schemeClr val="accent5">
-        <a:tint val="50000"/>
-      </a:schemeClr>
-      <a:schemeClr val="accent6">
-        <a:tint val="50000"/>
-      </a:schemeClr>
-    </dgm:fillClrLst>
-    <dgm:linClrLst meth="repeat">
-      <a:schemeClr val="lt1"/>
-    </dgm:linClrLst>
-    <dgm:effectClrLst/>
-    <dgm:txLinClrLst/>
-    <dgm:txFillClrLst meth="repeat">
-      <a:schemeClr val="lt1"/>
-    </dgm:txFillClrLst>
-    <dgm:txEffectClrLst/>
-  </dgm:styleLbl>
-  <dgm:styleLbl name="alignImgPlace1">
-    <dgm:fillClrLst>
-      <a:schemeClr val="accent1">
-        <a:tint val="50000"/>
-      </a:schemeClr>
-      <a:schemeClr val="accent2">
-        <a:tint val="20000"/>
-      </a:schemeClr>
-    </dgm:fillClrLst>
-    <dgm:linClrLst meth="repeat">
-      <a:schemeClr val="lt1"/>
-    </dgm:linClrLst>
-    <dgm:effectClrLst/>
-    <dgm:txLinClrLst/>
-    <dgm:txFillClrLst meth="repeat">
-      <a:schemeClr val="lt1"/>
-    </dgm:txFillClrLst>
-    <dgm:txEffectClrLst/>
-  </dgm:styleLbl>
-  <dgm:styleLbl name="bgImgPlace1">
-    <dgm:fillClrLst>
-      <a:schemeClr val="accent1">
-        <a:tint val="50000"/>
-      </a:schemeClr>
-      <a:schemeClr val="accent2">
-        <a:tint val="20000"/>
-      </a:schemeClr>
-    </dgm:fillClrLst>
-    <dgm:linClrLst meth="repeat">
-      <a:schemeClr val="lt1"/>
-    </dgm:linClrLst>
-    <dgm:effectClrLst/>
-    <dgm:txLinClrLst/>
-    <dgm:txFillClrLst meth="repeat">
-      <a:schemeClr val="lt1"/>
-    </dgm:txFillClrLst>
-    <dgm:txEffectClrLst/>
-  </dgm:styleLbl>
-  <dgm:styleLbl name="sibTrans2D1">
-    <dgm:fillClrLst meth="repeat">
-      <a:schemeClr val="accent2"/>
-      <a:schemeClr val="accent3"/>
-      <a:schemeClr val="accent4"/>
-      <a:schemeClr val="accent5"/>
-      <a:schemeClr val="accent6"/>
-    </dgm:fillClrLst>
-    <dgm:linClrLst meth="cycle">
-      <a:schemeClr val="lt1"/>
-    </dgm:linClrLst>
-    <dgm:effectClrLst/>
-    <dgm:txLinClrLst/>
-    <dgm:txFillClrLst/>
-    <dgm:txEffectClrLst/>
-  </dgm:styleLbl>
-  <dgm:styleLbl name="fgSibTrans2D1">
-    <dgm:fillClrLst meth="repeat">
-      <a:schemeClr val="accent2"/>
-      <a:schemeClr val="accent3"/>
-      <a:schemeClr val="accent4"/>
-      <a:schemeClr val="accent5"/>
-      <a:schemeClr val="accent6"/>
-    </dgm:fillClrLst>
-    <dgm:linClrLst meth="cycle">
-      <a:schemeClr val="lt1"/>
-    </dgm:linClrLst>
-    <dgm:effectClrLst/>
-    <dgm:txLinClrLst/>
-    <dgm:txFillClrLst meth="repeat">
-      <a:schemeClr val="lt1"/>
-    </dgm:txFillClrLst>
-    <dgm:txEffectClrLst/>
-  </dgm:styleLbl>
-  <dgm:styleLbl name="bgSibTrans2D1">
-    <dgm:fillClrLst meth="repeat">
-      <a:schemeClr val="accent2"/>
-      <a:schemeClr val="accent3"/>
-      <a:schemeClr val="accent4"/>
-      <a:schemeClr val="accent5"/>
-      <a:schemeClr val="accent6"/>
-    </dgm:fillClrLst>
-    <dgm:linClrLst meth="cycle">
-      <a:schemeClr val="lt1"/>
-    </dgm:linClrLst>
-    <dgm:effectClrLst/>
-    <dgm:txLinClrLst/>
-    <dgm:txFillClrLst meth="repeat">
-      <a:schemeClr val="lt1"/>
-    </dgm:txFillClrLst>
-    <dgm:txEffectClrLst/>
-  </dgm:styleLbl>
-  <dgm:styleLbl name="sibTrans1D1">
-    <dgm:fillClrLst meth="repeat">
-      <a:schemeClr val="accent2"/>
-      <a:schemeClr val="accent3"/>
-      <a:schemeClr val="accent4"/>
-      <a:schemeClr val="accent5"/>
-      <a:schemeClr val="accent6"/>
-    </dgm:fillClrLst>
-    <dgm:linClrLst meth="repeat">
-      <a:schemeClr val="accent2"/>
-      <a:schemeClr val="accent3"/>
-      <a:schemeClr val="accent4"/>
-      <a:schemeClr val="accent5"/>
-      <a:schemeClr val="accent6"/>
-    </dgm:linClrLst>
-    <dgm:effectClrLst/>
-    <dgm:txLinClrLst/>
-    <dgm:txFillClrLst meth="repeat">
-      <a:schemeClr val="tx1"/>
-    </dgm:txFillClrLst>
-    <dgm:txEffectClrLst/>
-  </dgm:styleLbl>
-  <dgm:styleLbl name="callout">
-    <dgm:fillClrLst meth="repeat">
-      <a:schemeClr val="accent2"/>
-    </dgm:fillClrLst>
-    <dgm:linClrLst meth="repeat">
-      <a:schemeClr val="accent2">
-        <a:tint val="50000"/>
-      </a:schemeClr>
-    </dgm:linClrLst>
-    <dgm:effectClrLst/>
-    <dgm:txLinClrLst/>
-    <dgm:txFillClrLst meth="repeat">
-      <a:schemeClr val="tx1"/>
-    </dgm:txFillClrLst>
-    <dgm:txEffectClrLst/>
-  </dgm:styleLbl>
-  <dgm:styleLbl name="asst0">
-    <dgm:fillClrLst meth="repeat">
-      <a:schemeClr val="accent1"/>
-    </dgm:fillClrLst>
-    <dgm:linClrLst meth="repeat">
-      <a:schemeClr val="lt1"/>
-    </dgm:linClrLst>
-    <dgm:effectClrLst/>
-    <dgm:txLinClrLst/>
-    <dgm:txFillClrLst/>
-    <dgm:txEffectClrLst/>
-  </dgm:styleLbl>
-  <dgm:styleLbl name="asst1">
-    <dgm:fillClrLst meth="repeat">
-      <a:schemeClr val="accent2"/>
-    </dgm:fillClrLst>
-    <dgm:linClrLst meth="repeat">
-      <a:schemeClr val="lt1"/>
-    </dgm:linClrLst>
-    <dgm:effectClrLst/>
-    <dgm:txLinClrLst/>
-    <dgm:txFillClrLst/>
-    <dgm:txEffectClrLst/>
-  </dgm:styleLbl>
-  <dgm:styleLbl name="asst2">
-    <dgm:fillClrLst>
-      <a:schemeClr val="accent3"/>
-    </dgm:fillClrLst>
-    <dgm:linClrLst meth="repeat">
-      <a:schemeClr val="lt1"/>
-    </dgm:linClrLst>
-    <dgm:effectClrLst/>
-    <dgm:txLinClrLst/>
-    <dgm:txFillClrLst/>
-    <dgm:txEffectClrLst/>
-  </dgm:styleLbl>
-  <dgm:styleLbl name="asst3">
-    <dgm:fillClrLst>
-      <a:schemeClr val="accent4"/>
-    </dgm:fillClrLst>
-    <dgm:linClrLst meth="repeat">
-      <a:schemeClr val="lt1"/>
-    </dgm:linClrLst>
-    <dgm:effectClrLst/>
-    <dgm:txLinClrLst/>
-    <dgm:txFillClrLst/>
-    <dgm:txEffectClrLst/>
-  </dgm:styleLbl>
-  <dgm:styleLbl name="asst4">
-    <dgm:fillClrLst>
-      <a:schemeClr val="accent5"/>
-    </dgm:fillClrLst>
-    <dgm:linClrLst meth="repeat">
-      <a:schemeClr val="lt1"/>
-    </dgm:linClrLst>
-    <dgm:effectClrLst/>
-    <dgm:txLinClrLst/>
-    <dgm:txFillClrLst/>
-    <dgm:txEffectClrLst/>
-  </dgm:styleLbl>
-  <dgm:styleLbl name="parChTrans2D1">
-    <dgm:fillClrLst meth="repeat">
-      <a:schemeClr val="accent2"/>
-    </dgm:fillClrLst>
-    <dgm:linClrLst meth="repeat">
-      <a:schemeClr val="lt1"/>
-    </dgm:linClrLst>
-    <dgm:effectClrLst/>
-    <dgm:txLinClrLst/>
-    <dgm:txFillClrLst meth="repeat">
-      <a:schemeClr val="lt1"/>
-    </dgm:txFillClrLst>
-    <dgm:txEffectClrLst/>
-  </dgm:styleLbl>
-  <dgm:styleLbl name="parChTrans2D2">
-    <dgm:fillClrLst meth="repeat">
-      <a:schemeClr val="accent3"/>
-    </dgm:fillClrLst>
-    <dgm:linClrLst meth="repeat">
-      <a:schemeClr val="lt1"/>
-    </dgm:linClrLst>
-    <dgm:effectClrLst/>
-    <dgm:txLinClrLst/>
-    <dgm:txFillClrLst/>
-    <dgm:txEffectClrLst/>
-  </dgm:styleLbl>
-  <dgm:styleLbl name="parChTrans2D3">
-    <dgm:fillClrLst meth="repeat">
-      <a:schemeClr val="accent4"/>
-    </dgm:fillClrLst>
-    <dgm:linClrLst meth="repeat">
-      <a:schemeClr val="lt1"/>
-    </dgm:linClrLst>
-    <dgm:effectClrLst/>
-    <dgm:txLinClrLst/>
-    <dgm:txFillClrLst/>
-    <dgm:txEffectClrLst/>
-  </dgm:styleLbl>
-  <dgm:styleLbl name="parChTrans2D4">
-    <dgm:fillClrLst meth="repeat">
-      <a:schemeClr val="accent5"/>
-    </dgm:fillClrLst>
-    <dgm:linClrLst meth="repeat">
-      <a:schemeClr val="lt1"/>
-    </dgm:linClrLst>
-    <dgm:effectClrLst/>
-    <dgm:txLinClrLst/>
-    <dgm:txFillClrLst meth="repeat">
-      <a:schemeClr val="lt1"/>
-    </dgm:txFillClrLst>
-    <dgm:txEffectClrLst/>
-  </dgm:styleLbl>
-  <dgm:styleLbl name="parChTrans1D1">
-    <dgm:fillClrLst meth="repeat">
-      <a:schemeClr val="accent2"/>
-    </dgm:fillClrLst>
-    <dgm:linClrLst meth="repeat">
-      <a:schemeClr val="accent1"/>
-    </dgm:linClrLst>
-    <dgm:effectClrLst/>
-    <dgm:txLinClrLst/>
-    <dgm:txFillClrLst meth="repeat">
-      <a:schemeClr val="tx1"/>
-    </dgm:txFillClrLst>
-    <dgm:txEffectClrLst/>
-  </dgm:styleLbl>
-  <dgm:styleLbl name="parChTrans1D2">
-    <dgm:fillClrLst meth="repeat">
-      <a:schemeClr val="accent3">
-        <a:tint val="90000"/>
-      </a:schemeClr>
-    </dgm:fillClrLst>
-    <dgm:linClrLst meth="repeat">
-      <a:schemeClr val="accent2"/>
-    </dgm:linClrLst>
-    <dgm:effectClrLst/>
-    <dgm:txLinClrLst/>
-    <dgm:txFillClrLst meth="repeat">
-      <a:schemeClr val="tx1"/>
-    </dgm:txFillClrLst>
-    <dgm:txEffectClrLst/>
-  </dgm:styleLbl>
-  <dgm:styleLbl name="parChTrans1D3">
-    <dgm:fillClrLst meth="repeat">
-      <a:schemeClr val="accent4">
-        <a:tint val="70000"/>
-      </a:schemeClr>
-    </dgm:fillClrLst>
-    <dgm:linClrLst meth="repeat">
-      <a:schemeClr val="accent3"/>
-    </dgm:linClrLst>
-    <dgm:effectClrLst/>
-    <dgm:txLinClrLst/>
-    <dgm:txFillClrLst meth="repeat">
-      <a:schemeClr val="tx1"/>
-    </dgm:txFillClrLst>
-    <dgm:txEffectClrLst/>
-  </dgm:styleLbl>
-  <dgm:styleLbl name="parChTrans1D4">
-    <dgm:fillClrLst meth="repeat">
-      <a:schemeClr val="accent5">
-        <a:tint val="50000"/>
-      </a:schemeClr>
-    </dgm:fillClrLst>
-    <dgm:linClrLst meth="repeat">
-      <a:schemeClr val="accent4"/>
-    </dgm:linClrLst>
-    <dgm:effectClrLst/>
-    <dgm:txLinClrLst/>
-    <dgm:txFillClrLst meth="repeat">
-      <a:schemeClr val="tx1"/>
-    </dgm:txFillClrLst>
-    <dgm:txEffectClrLst/>
-  </dgm:styleLbl>
-  <dgm:styleLbl name="fgAcc1">
-    <dgm:fillClrLst meth="repeat">
-      <a:schemeClr val="lt1">
-        <a:alpha val="90000"/>
-      </a:schemeClr>
-    </dgm:fillClrLst>
-    <dgm:linClrLst meth="repeat">
-      <a:schemeClr val="accent2"/>
-      <a:schemeClr val="accent3"/>
-      <a:schemeClr val="accent4"/>
-      <a:schemeClr val="accent5"/>
-      <a:schemeClr val="accent6"/>
-    </dgm:linClrLst>
-    <dgm:effectClrLst/>
-    <dgm:txLinClrLst/>
-    <dgm:txFillClrLst meth="repeat">
-      <a:schemeClr val="dk1"/>
-    </dgm:txFillClrLst>
-    <dgm:txEffectClrLst/>
-  </dgm:styleLbl>
-  <dgm:styleLbl name="conFgAcc1">
-    <dgm:fillClrLst meth="repeat">
-      <a:schemeClr val="lt1">
-        <a:alpha val="90000"/>
-      </a:schemeClr>
-    </dgm:fillClrLst>
-    <dgm:linClrLst meth="repeat">
-      <a:schemeClr val="accent2"/>
-      <a:schemeClr val="accent3"/>
-      <a:schemeClr val="accent4"/>
-      <a:schemeClr val="accent5"/>
-      <a:schemeClr val="accent6"/>
-    </dgm:linClrLst>
-    <dgm:effectClrLst/>
-    <dgm:txLinClrLst/>
-    <dgm:txFillClrLst meth="repeat">
-      <a:schemeClr val="dk1"/>
-    </dgm:txFillClrLst>
-    <dgm:txEffectClrLst/>
-  </dgm:styleLbl>
-  <dgm:styleLbl name="alignAcc1">
-    <dgm:fillClrLst meth="repeat">
-      <a:schemeClr val="lt1">
-        <a:alpha val="90000"/>
-      </a:schemeClr>
-    </dgm:fillClrLst>
-    <dgm:linClrLst meth="repeat">
-      <a:schemeClr val="accent2"/>
-      <a:schemeClr val="accent3"/>
-      <a:schemeClr val="accent4"/>
-      <a:schemeClr val="accent5"/>
-      <a:schemeClr val="accent6"/>
-    </dgm:linClrLst>
-    <dgm:effectClrLst/>
-    <dgm:txLinClrLst/>
-    <dgm:txFillClrLst meth="repeat">
-      <a:schemeClr val="dk1"/>
-    </dgm:txFillClrLst>
-    <dgm:txEffectClrLst/>
-  </dgm:styleLbl>
-  <dgm:styleLbl name="trAlignAcc1">
-    <dgm:fillClrLst meth="repeat">
-      <a:schemeClr val="lt1">
-        <a:alpha val="40000"/>
-      </a:schemeClr>
-    </dgm:fillClrLst>
-    <dgm:linClrLst meth="repeat">
-      <a:schemeClr val="accent1"/>
-    </dgm:linClrLst>
-    <dgm:effectClrLst/>
-    <dgm:txLinClrLst/>
-    <dgm:txFillClrLst meth="repeat">
-      <a:schemeClr val="dk1"/>
-    </dgm:txFillClrLst>
-    <dgm:txEffectClrLst/>
-  </dgm:styleLbl>
-  <dgm:styleLbl name="bgAcc1">
-    <dgm:fillClrLst meth="repeat">
-      <a:schemeClr val="lt1">
-        <a:alpha val="90000"/>
-      </a:schemeClr>
-    </dgm:fillClrLst>
-    <dgm:linClrLst meth="repeat">
-      <a:schemeClr val="accent2"/>
-      <a:schemeClr val="accent3"/>
-      <a:schemeClr val="accent4"/>
-      <a:schemeClr val="accent5"/>
-      <a:schemeClr val="accent6"/>
-    </dgm:linClrLst>
-    <dgm:effectClrLst/>
-    <dgm:txLinClrLst/>
-    <dgm:txFillClrLst meth="repeat">
-      <a:schemeClr val="dk1"/>
-    </dgm:txFillClrLst>
-    <dgm:txEffectClrLst/>
-  </dgm:styleLbl>
-  <dgm:styleLbl name="solidFgAcc1">
-    <dgm:fillClrLst meth="repeat">
-      <a:schemeClr val="lt1"/>
-    </dgm:fillClrLst>
-    <dgm:linClrLst meth="repeat">
-      <a:schemeClr val="accent2"/>
-      <a:schemeClr val="accent3"/>
-      <a:schemeClr val="accent4"/>
-      <a:schemeClr val="accent5"/>
-      <a:schemeClr val="accent6"/>
-    </dgm:linClrLst>
-    <dgm:effectClrLst/>
-    <dgm:txLinClrLst/>
-    <dgm:txFillClrLst meth="repeat">
-      <a:schemeClr val="dk1"/>
-    </dgm:txFillClrLst>
-    <dgm:txEffectClrLst/>
-  </dgm:styleLbl>
-  <dgm:styleLbl name="solidAlignAcc1">
-    <dgm:fillClrLst meth="repeat">
-      <a:schemeClr val="lt1"/>
-    </dgm:fillClrLst>
-    <dgm:linClrLst meth="repeat">
-      <a:schemeClr val="accent2"/>
-      <a:schemeClr val="accent3"/>
-      <a:schemeClr val="accent4"/>
-      <a:schemeClr val="accent5"/>
-      <a:schemeClr val="accent6"/>
-    </dgm:linClrLst>
-    <dgm:effectClrLst/>
-    <dgm:txLinClrLst/>
-    <dgm:txFillClrLst meth="repeat">
-      <a:schemeClr val="dk1"/>
-    </dgm:txFillClrLst>
-    <dgm:txEffectClrLst/>
-  </dgm:styleLbl>
-  <dgm:styleLbl name="solidBgAcc1">
-    <dgm:fillClrLst meth="repeat">
-      <a:schemeClr val="lt1"/>
-    </dgm:fillClrLst>
-    <dgm:linClrLst meth="repeat">
-      <a:schemeClr val="accent2"/>
-      <a:schemeClr val="accent3"/>
-      <a:schemeClr val="accent4"/>
-      <a:schemeClr val="accent5"/>
-      <a:schemeClr val="accent6"/>
-    </dgm:linClrLst>
-    <dgm:effectClrLst/>
-    <dgm:txLinClrLst/>
-    <dgm:txFillClrLst meth="repeat">
-      <a:schemeClr val="dk1"/>
-    </dgm:txFillClrLst>
-    <dgm:txEffectClrLst/>
-  </dgm:styleLbl>
-  <dgm:styleLbl name="fgAccFollowNode1">
-    <dgm:fillClrLst meth="repeat">
-      <a:schemeClr val="accent2">
-        <a:tint val="40000"/>
-        <a:alpha val="90000"/>
-      </a:schemeClr>
-      <a:schemeClr val="accent3">
-        <a:tint val="40000"/>
-        <a:alpha val="90000"/>
-      </a:schemeClr>
-      <a:schemeClr val="accent4">
-        <a:tint val="40000"/>
-        <a:alpha val="90000"/>
-      </a:schemeClr>
-      <a:schemeClr val="accent5">
-        <a:tint val="40000"/>
-        <a:alpha val="90000"/>
-      </a:schemeClr>
-      <a:schemeClr val="accent6">
-        <a:tint val="40000"/>
-        <a:alpha val="90000"/>
-      </a:schemeClr>
-    </dgm:fillClrLst>
-    <dgm:linClrLst meth="repeat">
-      <a:schemeClr val="accent2">
-        <a:tint val="40000"/>
-        <a:alpha val="90000"/>
-      </a:schemeClr>
-      <a:schemeClr val="accent3">
-        <a:tint val="40000"/>
-        <a:alpha val="90000"/>
-      </a:schemeClr>
-      <a:schemeClr val="accent4">
-        <a:tint val="40000"/>
-        <a:alpha val="90000"/>
-      </a:schemeClr>
-      <a:schemeClr val="accent5">
-        <a:tint val="40000"/>
-        <a:alpha val="90000"/>
-      </a:schemeClr>
-      <a:schemeClr val="accent6">
-        <a:tint val="40000"/>
-        <a:alpha val="90000"/>
-      </a:schemeClr>
-    </dgm:linClrLst>
-    <dgm:effectClrLst/>
-    <dgm:txLinClrLst/>
-    <dgm:txFillClrLst meth="repeat">
-      <a:schemeClr val="dk1"/>
-    </dgm:txFillClrLst>
-    <dgm:txEffectClrLst/>
-  </dgm:styleLbl>
-  <dgm:styleLbl name="alignAccFollowNode1">
-    <dgm:fillClrLst meth="repeat">
-      <a:schemeClr val="accent2">
-        <a:tint val="40000"/>
-        <a:alpha val="90000"/>
-      </a:schemeClr>
-      <a:schemeClr val="accent3">
-        <a:tint val="40000"/>
-        <a:alpha val="90000"/>
-      </a:schemeClr>
-      <a:schemeClr val="accent4">
-        <a:tint val="40000"/>
-        <a:alpha val="90000"/>
-      </a:schemeClr>
-      <a:schemeClr val="accent5">
-        <a:tint val="40000"/>
-        <a:alpha val="90000"/>
-      </a:schemeClr>
-      <a:schemeClr val="accent6">
-        <a:tint val="40000"/>
-        <a:alpha val="90000"/>
-      </a:schemeClr>
-    </dgm:fillClrLst>
-    <dgm:linClrLst meth="repeat">
-      <a:schemeClr val="accent2">
-        <a:tint val="40000"/>
-        <a:alpha val="90000"/>
-      </a:schemeClr>
-      <a:schemeClr val="accent3">
-        <a:tint val="40000"/>
-        <a:alpha val="90000"/>
-      </a:schemeClr>
-      <a:schemeClr val="accent4">
-        <a:tint val="40000"/>
-        <a:alpha val="90000"/>
-      </a:schemeClr>
-      <a:schemeClr val="accent5">
-        <a:tint val="40000"/>
-        <a:alpha val="90000"/>
-      </a:schemeClr>
-      <a:schemeClr val="accent6">
-        <a:tint val="40000"/>
-        <a:alpha val="90000"/>
-      </a:schemeClr>
-    </dgm:linClrLst>
-    <dgm:effectClrLst/>
-    <dgm:txLinClrLst/>
-    <dgm:txFillClrLst meth="repeat">
-      <a:schemeClr val="dk1"/>
-    </dgm:txFillClrLst>
-    <dgm:txEffectClrLst/>
-  </dgm:styleLbl>
-  <dgm:styleLbl name="bgAccFollowNode1">
-    <dgm:fillClrLst meth="repeat">
-      <a:schemeClr val="accent2">
-        <a:tint val="40000"/>
-        <a:alpha val="90000"/>
-      </a:schemeClr>
-      <a:schemeClr val="accent3">
-        <a:tint val="40000"/>
-        <a:alpha val="90000"/>
-      </a:schemeClr>
-      <a:schemeClr val="accent4">
-        <a:tint val="40000"/>
-        <a:alpha val="90000"/>
-      </a:schemeClr>
-      <a:schemeClr val="accent5">
-        <a:tint val="40000"/>
-        <a:alpha val="90000"/>
-      </a:schemeClr>
-      <a:schemeClr val="accent6">
-        <a:tint val="40000"/>
-        <a:alpha val="90000"/>
-      </a:schemeClr>
-    </dgm:fillClrLst>
-    <dgm:linClrLst meth="repeat">
-      <a:schemeClr val="accent2">
-        <a:tint val="40000"/>
-        <a:alpha val="90000"/>
-      </a:schemeClr>
-      <a:schemeClr val="accent3">
-        <a:tint val="40000"/>
-        <a:alpha val="90000"/>
-      </a:schemeClr>
-      <a:schemeClr val="accent4">
-        <a:tint val="40000"/>
-        <a:alpha val="90000"/>
-      </a:schemeClr>
-      <a:schemeClr val="accent5">
-        <a:tint val="40000"/>
-        <a:alpha val="90000"/>
-      </a:schemeClr>
-      <a:schemeClr val="accent6">
-        <a:tint val="40000"/>
-        <a:alpha val="90000"/>
-      </a:schemeClr>
-    </dgm:linClrLst>
-    <dgm:effectClrLst/>
-    <dgm:txLinClrLst/>
-    <dgm:txFillClrLst meth="repeat">
-      <a:schemeClr val="dk1"/>
-    </dgm:txFillClrLst>
-    <dgm:txEffectClrLst/>
-  </dgm:styleLbl>
-  <dgm:styleLbl name="fgAcc0">
-    <dgm:fillClrLst meth="repeat">
-      <a:schemeClr val="lt1">
-        <a:alpha val="90000"/>
-      </a:schemeClr>
-    </dgm:fillClrLst>
-    <dgm:linClrLst>
-      <a:schemeClr val="accent1"/>
-    </dgm:linClrLst>
-    <dgm:effectClrLst/>
-    <dgm:txLinClrLst/>
-    <dgm:txFillClrLst meth="repeat">
-      <a:schemeClr val="dk1"/>
-    </dgm:txFillClrLst>
-    <dgm:txEffectClrLst/>
-  </dgm:styleLbl>
-  <dgm:styleLbl name="fgAcc2">
-    <dgm:fillClrLst meth="repeat">
-      <a:schemeClr val="lt1">
-        <a:alpha val="90000"/>
-      </a:schemeClr>
-    </dgm:fillClrLst>
-    <dgm:linClrLst>
-      <a:schemeClr val="accent2"/>
-    </dgm:linClrLst>
-    <dgm:effectClrLst/>
-    <dgm:txLinClrLst/>
-    <dgm:txFillClrLst meth="repeat">
-      <a:schemeClr val="dk1"/>
-    </dgm:txFillClrLst>
-    <dgm:txEffectClrLst/>
-  </dgm:styleLbl>
-  <dgm:styleLbl name="fgAcc3">
-    <dgm:fillClrLst meth="repeat">
-      <a:schemeClr val="lt1">
-        <a:alpha val="90000"/>
-      </a:schemeClr>
-    </dgm:fillClrLst>
-    <dgm:linClrLst>
-      <a:schemeClr val="accent3"/>
-    </dgm:linClrLst>
-    <dgm:effectClrLst/>
-    <dgm:txLinClrLst/>
-    <dgm:txFillClrLst meth="repeat">
-      <a:schemeClr val="dk1"/>
-    </dgm:txFillClrLst>
-    <dgm:txEffectClrLst/>
-  </dgm:styleLbl>
-  <dgm:styleLbl name="fgAcc4">
-    <dgm:fillClrLst meth="repeat">
-      <a:schemeClr val="lt1">
-        <a:alpha val="90000"/>
-      </a:schemeClr>
-    </dgm:fillClrLst>
-    <dgm:linClrLst>
-      <a:schemeClr val="accent4"/>
-    </dgm:linClrLst>
-    <dgm:effectClrLst/>
-    <dgm:txLinClrLst/>
-    <dgm:txFillClrLst meth="repeat">
-      <a:schemeClr val="dk1"/>
-    </dgm:txFillClrLst>
-    <dgm:txEffectClrLst/>
-  </dgm:styleLbl>
-  <dgm:styleLbl name="bgShp">
-    <dgm:fillClrLst meth="repeat">
-      <a:schemeClr val="accent2"/>
-      <a:schemeClr val="accent3"/>
-      <a:schemeClr val="accent4"/>
-      <a:schemeClr val="accent5"/>
-      <a:schemeClr val="accent6"/>
-    </dgm:fillClrLst>
-    <dgm:linClrLst meth="repeat">
-      <a:schemeClr val="lt1">
-        <a:alpha val="0"/>
-      </a:schemeClr>
-    </dgm:linClrLst>
-    <dgm:effectClrLst/>
-    <dgm:txLinClrLst/>
-    <dgm:txFillClrLst/>
-    <dgm:txEffectClrLst/>
-  </dgm:styleLbl>
-  <dgm:styleLbl name="dkBgShp">
-    <dgm:fillClrLst meth="repeat">
-      <a:schemeClr val="accent2">
-        <a:shade val="90000"/>
-      </a:schemeClr>
-    </dgm:fillClrLst>
-    <dgm:linClrLst meth="repeat">
-      <a:schemeClr val="dk1"/>
-    </dgm:linClrLst>
-    <dgm:effectClrLst/>
-    <dgm:txLinClrLst/>
-    <dgm:txFillClrLst meth="repeat">
-      <a:schemeClr val="lt1"/>
-    </dgm:txFillClrLst>
-    <dgm:txEffectClrLst/>
-  </dgm:styleLbl>
-  <dgm:styleLbl name="trBgShp">
-    <dgm:fillClrLst meth="repeat">
-      <a:schemeClr val="accent1">
-        <a:tint val="50000"/>
-        <a:alpha val="40000"/>
-      </a:schemeClr>
-    </dgm:fillClrLst>
-    <dgm:linClrLst meth="repeat">
-      <a:schemeClr val="accent2"/>
-    </dgm:linClrLst>
-    <dgm:effectClrLst/>
-    <dgm:txLinClrLst/>
-    <dgm:txFillClrLst meth="repeat">
-      <a:schemeClr val="lt1"/>
-    </dgm:txFillClrLst>
-    <dgm:txEffectClrLst/>
-  </dgm:styleLbl>
-  <dgm:styleLbl name="fgShp">
-    <dgm:fillClrLst meth="repeat">
-      <a:schemeClr val="accent2">
-        <a:tint val="40000"/>
-      </a:schemeClr>
-    </dgm:fillClrLst>
-    <dgm:linClrLst meth="repeat">
-      <a:schemeClr val="lt1"/>
-    </dgm:linClrLst>
-    <dgm:effectClrLst/>
-    <dgm:txLinClrLst/>
-    <dgm:txFillClrLst meth="repeat">
-      <a:schemeClr val="dk1"/>
-    </dgm:txFillClrLst>
-    <dgm:txEffectClrLst/>
-  </dgm:styleLbl>
-  <dgm:styleLbl name="revTx">
-    <dgm:fillClrLst meth="repeat">
-      <a:schemeClr val="lt1">
-        <a:alpha val="0"/>
-      </a:schemeClr>
-    </dgm:fillClrLst>
-    <dgm:linClrLst meth="repeat">
-      <a:schemeClr val="dk1">
-        <a:alpha val="0"/>
-      </a:schemeClr>
-    </dgm:linClrLst>
-    <dgm:effectClrLst/>
-    <dgm:txLinClrLst/>
-    <dgm:txFillClrLst meth="repeat">
-      <a:schemeClr val="tx1"/>
-    </dgm:txFillClrLst>
-    <dgm:txEffectClrLst/>
-  </dgm:styleLbl>
-</dgm:colorsDef>
-</file>
-
-<file path=ppt/diagrams/data1.xml><?xml version="1.0" encoding="utf-8"?>
-<dgm:dataModel xmlns:dgm="http://schemas.openxmlformats.org/drawingml/2006/diagram" xmlns:a="http://schemas.openxmlformats.org/drawingml/2006/main">
-  <dgm:ptLst>
-    <dgm:pt modelId="{B1E89D34-7BBE-4A76-8F3A-DDF4AEDF48FD}" type="doc">
-      <dgm:prSet loTypeId="urn:microsoft.com/office/officeart/2018/5/layout/IconLeafLabelList" loCatId="icon" qsTypeId="urn:microsoft.com/office/officeart/2005/8/quickstyle/simple1" qsCatId="simple" csTypeId="urn:microsoft.com/office/officeart/2018/5/colors/Iconchunking_neutralicon_colorful1" csCatId="colorful" phldr="1"/>
-      <dgm:spPr/>
-      <dgm:t>
-        <a:bodyPr/>
-        <a:lstStyle/>
-        <a:p>
-          <a:endParaRPr lang="en-US"/>
-        </a:p>
-      </dgm:t>
-    </dgm:pt>
-    <dgm:pt modelId="{B6611389-1017-4150-8024-C2BB6BB8DDE0}">
-      <dgm:prSet/>
-      <dgm:spPr/>
-      <dgm:t>
-        <a:bodyPr/>
-        <a:lstStyle/>
-        <a:p>
-          <a:pPr>
-            <a:lnSpc>
-              <a:spcPct val="100000"/>
-            </a:lnSpc>
-            <a:defRPr cap="all"/>
-          </a:pPr>
-          <a:r>
-            <a:rPr lang="es-CO" b="0" i="1"/>
-            <a:t>La usabilidad </a:t>
-          </a:r>
-          <a:endParaRPr lang="en-US"/>
-        </a:p>
-      </dgm:t>
-    </dgm:pt>
-    <dgm:pt modelId="{9C81701E-A8E7-4666-9F5E-878EDA7DC943}" type="parTrans" cxnId="{83ADF657-A1DD-4022-B4C4-0CA84FE4D771}">
-      <dgm:prSet/>
-      <dgm:spPr/>
-      <dgm:t>
-        <a:bodyPr/>
-        <a:lstStyle/>
-        <a:p>
-          <a:endParaRPr lang="en-US"/>
-        </a:p>
-      </dgm:t>
-    </dgm:pt>
-    <dgm:pt modelId="{287BEA01-5D6F-4F2D-8374-B6DE7F3DB266}" type="sibTrans" cxnId="{83ADF657-A1DD-4022-B4C4-0CA84FE4D771}">
-      <dgm:prSet/>
-      <dgm:spPr/>
-      <dgm:t>
-        <a:bodyPr/>
-        <a:lstStyle/>
-        <a:p>
-          <a:endParaRPr lang="en-US"/>
-        </a:p>
-      </dgm:t>
-    </dgm:pt>
-    <dgm:pt modelId="{A861AEA0-7549-4407-B4A3-0DB092676F04}">
-      <dgm:prSet/>
-      <dgm:spPr/>
-      <dgm:t>
-        <a:bodyPr/>
-        <a:lstStyle/>
-        <a:p>
-          <a:pPr>
-            <a:lnSpc>
-              <a:spcPct val="100000"/>
-            </a:lnSpc>
-            <a:defRPr cap="all"/>
-          </a:pPr>
-          <a:r>
-            <a:rPr lang="es-CO" b="0" i="1"/>
-            <a:t>Experiencia de Usuario (UX) </a:t>
-          </a:r>
-          <a:endParaRPr lang="en-US"/>
-        </a:p>
-      </dgm:t>
-    </dgm:pt>
-    <dgm:pt modelId="{5F441676-506D-40C6-8060-4A6DCF3F5E89}" type="parTrans" cxnId="{7AFD7F6C-7ECD-40F3-92FF-CBCDFF8D7D6C}">
-      <dgm:prSet/>
-      <dgm:spPr/>
-      <dgm:t>
-        <a:bodyPr/>
-        <a:lstStyle/>
-        <a:p>
-          <a:endParaRPr lang="en-US"/>
-        </a:p>
-      </dgm:t>
-    </dgm:pt>
-    <dgm:pt modelId="{6591CAEF-53DD-4076-ADC3-E3CE5BBD585A}" type="sibTrans" cxnId="{7AFD7F6C-7ECD-40F3-92FF-CBCDFF8D7D6C}">
-      <dgm:prSet/>
-      <dgm:spPr/>
-      <dgm:t>
-        <a:bodyPr/>
-        <a:lstStyle/>
-        <a:p>
-          <a:endParaRPr lang="en-US"/>
-        </a:p>
-      </dgm:t>
-    </dgm:pt>
-    <dgm:pt modelId="{ECFAAEE3-BAB1-479A-901B-FA804CB916C4}" type="pres">
-      <dgm:prSet presAssocID="{B1E89D34-7BBE-4A76-8F3A-DDF4AEDF48FD}" presName="root" presStyleCnt="0">
-        <dgm:presLayoutVars>
-          <dgm:dir/>
-          <dgm:resizeHandles val="exact"/>
-        </dgm:presLayoutVars>
-      </dgm:prSet>
-      <dgm:spPr/>
-    </dgm:pt>
-    <dgm:pt modelId="{B1365782-3781-4AD5-9C8B-FEA5B5BFD3D4}" type="pres">
-      <dgm:prSet presAssocID="{B6611389-1017-4150-8024-C2BB6BB8DDE0}" presName="compNode" presStyleCnt="0"/>
-      <dgm:spPr/>
-    </dgm:pt>
-    <dgm:pt modelId="{15055559-3E28-4BE2-8862-8338913C18D5}" type="pres">
-      <dgm:prSet presAssocID="{B6611389-1017-4150-8024-C2BB6BB8DDE0}" presName="iconBgRect" presStyleLbl="bgShp" presStyleIdx="0" presStyleCnt="2"/>
-      <dgm:spPr>
-        <a:prstGeom prst="round2DiagRect">
-          <a:avLst>
-            <a:gd name="adj1" fmla="val 29727"/>
-            <a:gd name="adj2" fmla="val 0"/>
-          </a:avLst>
-        </a:prstGeom>
-      </dgm:spPr>
-    </dgm:pt>
-    <dgm:pt modelId="{88A0BD18-5723-4292-9B6E-09FC7AFAD952}" type="pres">
-      <dgm:prSet presAssocID="{B6611389-1017-4150-8024-C2BB6BB8DDE0}" presName="iconRect" presStyleLbl="node1" presStyleIdx="0" presStyleCnt="2"/>
-      <dgm:spPr>
-        <a:blipFill>
-          <a:blip xmlns:r="http://schemas.openxmlformats.org/officeDocument/2006/relationships" r:embed="rId1">
-            <a:extLst>
-              <a:ext uri="{28A0092B-C50C-407E-A947-70E740481C1C}">
-                <a14:useLocalDpi xmlns:a14="http://schemas.microsoft.com/office/drawing/2010/main" val="0"/>
-              </a:ext>
-              <a:ext uri="{96DAC541-7B7A-43D3-8B79-37D633B846F1}">
-                <asvg:svgBlip xmlns:asvg="http://schemas.microsoft.com/office/drawing/2016/SVG/main" r:embed="rId2"/>
-              </a:ext>
-            </a:extLst>
-          </a:blip>
-          <a:stretch>
-            <a:fillRect/>
-          </a:stretch>
-        </a:blipFill>
-        <a:ln>
-          <a:noFill/>
-        </a:ln>
-      </dgm:spPr>
-      <dgm:extLst>
-        <a:ext uri="{E40237B7-FDA0-4F09-8148-C483321AD2D9}">
-          <dgm14:cNvPr xmlns:dgm14="http://schemas.microsoft.com/office/drawing/2010/diagram" id="0" name="" descr="Marca de verificación"/>
-        </a:ext>
-      </dgm:extLst>
-    </dgm:pt>
-    <dgm:pt modelId="{8D0A9AD2-E48F-44B1-9E9D-2530F8664F01}" type="pres">
-      <dgm:prSet presAssocID="{B6611389-1017-4150-8024-C2BB6BB8DDE0}" presName="spaceRect" presStyleCnt="0"/>
-      <dgm:spPr/>
-    </dgm:pt>
-    <dgm:pt modelId="{B7B89DBA-CC48-45AE-8268-DF553215D125}" type="pres">
-      <dgm:prSet presAssocID="{B6611389-1017-4150-8024-C2BB6BB8DDE0}" presName="textRect" presStyleLbl="revTx" presStyleIdx="0" presStyleCnt="2">
-        <dgm:presLayoutVars>
-          <dgm:chMax val="1"/>
-          <dgm:chPref val="1"/>
-        </dgm:presLayoutVars>
-      </dgm:prSet>
-      <dgm:spPr/>
-    </dgm:pt>
-    <dgm:pt modelId="{AD7EDB1C-4A08-4C30-B799-DCD463E02A0B}" type="pres">
-      <dgm:prSet presAssocID="{287BEA01-5D6F-4F2D-8374-B6DE7F3DB266}" presName="sibTrans" presStyleCnt="0"/>
-      <dgm:spPr/>
-    </dgm:pt>
-    <dgm:pt modelId="{2622261B-B134-423B-9BF5-9CAF3AFE7864}" type="pres">
-      <dgm:prSet presAssocID="{A861AEA0-7549-4407-B4A3-0DB092676F04}" presName="compNode" presStyleCnt="0"/>
-      <dgm:spPr/>
-    </dgm:pt>
-    <dgm:pt modelId="{B011FE9B-40C8-477E-A075-8E9B2DA585AA}" type="pres">
-      <dgm:prSet presAssocID="{A861AEA0-7549-4407-B4A3-0DB092676F04}" presName="iconBgRect" presStyleLbl="bgShp" presStyleIdx="1" presStyleCnt="2"/>
-      <dgm:spPr>
-        <a:prstGeom prst="round2DiagRect">
-          <a:avLst>
-            <a:gd name="adj1" fmla="val 29727"/>
-            <a:gd name="adj2" fmla="val 0"/>
-          </a:avLst>
-        </a:prstGeom>
-      </dgm:spPr>
-    </dgm:pt>
-    <dgm:pt modelId="{513262DD-3D98-4C16-A75B-1DF8EAC7E4A1}" type="pres">
-      <dgm:prSet presAssocID="{A861AEA0-7549-4407-B4A3-0DB092676F04}" presName="iconRect" presStyleLbl="node1" presStyleIdx="1" presStyleCnt="2"/>
-      <dgm:spPr>
-        <a:blipFill>
-          <a:blip xmlns:r="http://schemas.openxmlformats.org/officeDocument/2006/relationships" r:embed="rId3">
-            <a:extLst>
-              <a:ext uri="{28A0092B-C50C-407E-A947-70E740481C1C}">
-                <a14:useLocalDpi xmlns:a14="http://schemas.microsoft.com/office/drawing/2010/main" val="0"/>
-              </a:ext>
-              <a:ext uri="{96DAC541-7B7A-43D3-8B79-37D633B846F1}">
-                <asvg:svgBlip xmlns:asvg="http://schemas.microsoft.com/office/drawing/2016/SVG/main" r:embed="rId4"/>
-              </a:ext>
-            </a:extLst>
-          </a:blip>
-          <a:stretch>
-            <a:fillRect/>
-          </a:stretch>
-        </a:blipFill>
-        <a:ln>
-          <a:noFill/>
-        </a:ln>
-      </dgm:spPr>
-      <dgm:extLst>
-        <a:ext uri="{E40237B7-FDA0-4F09-8148-C483321AD2D9}">
-          <dgm14:cNvPr xmlns:dgm14="http://schemas.microsoft.com/office/drawing/2010/diagram" id="0" name="" descr="Robot"/>
-        </a:ext>
-      </dgm:extLst>
-    </dgm:pt>
-    <dgm:pt modelId="{277A8A70-DDC4-4AA8-B32F-A4C36BC26379}" type="pres">
-      <dgm:prSet presAssocID="{A861AEA0-7549-4407-B4A3-0DB092676F04}" presName="spaceRect" presStyleCnt="0"/>
-      <dgm:spPr/>
-    </dgm:pt>
-    <dgm:pt modelId="{B256E9AD-8F27-43A8-9697-8492DE5338CD}" type="pres">
-      <dgm:prSet presAssocID="{A861AEA0-7549-4407-B4A3-0DB092676F04}" presName="textRect" presStyleLbl="revTx" presStyleIdx="1" presStyleCnt="2">
-        <dgm:presLayoutVars>
-          <dgm:chMax val="1"/>
-          <dgm:chPref val="1"/>
-        </dgm:presLayoutVars>
-      </dgm:prSet>
-      <dgm:spPr/>
-    </dgm:pt>
-  </dgm:ptLst>
-  <dgm:cxnLst>
-    <dgm:cxn modelId="{824C4A1A-B50A-4AA9-8430-B62D62C866A7}" type="presOf" srcId="{A861AEA0-7549-4407-B4A3-0DB092676F04}" destId="{B256E9AD-8F27-43A8-9697-8492DE5338CD}" srcOrd="0" destOrd="0" presId="urn:microsoft.com/office/officeart/2018/5/layout/IconLeafLabelList"/>
-    <dgm:cxn modelId="{BBCB062F-72E8-4C67-AC78-02C2E0AC2D19}" type="presOf" srcId="{B1E89D34-7BBE-4A76-8F3A-DDF4AEDF48FD}" destId="{ECFAAEE3-BAB1-479A-901B-FA804CB916C4}" srcOrd="0" destOrd="0" presId="urn:microsoft.com/office/officeart/2018/5/layout/IconLeafLabelList"/>
-    <dgm:cxn modelId="{7AFD7F6C-7ECD-40F3-92FF-CBCDFF8D7D6C}" srcId="{B1E89D34-7BBE-4A76-8F3A-DDF4AEDF48FD}" destId="{A861AEA0-7549-4407-B4A3-0DB092676F04}" srcOrd="1" destOrd="0" parTransId="{5F441676-506D-40C6-8060-4A6DCF3F5E89}" sibTransId="{6591CAEF-53DD-4076-ADC3-E3CE5BBD585A}"/>
-    <dgm:cxn modelId="{83ADF657-A1DD-4022-B4C4-0CA84FE4D771}" srcId="{B1E89D34-7BBE-4A76-8F3A-DDF4AEDF48FD}" destId="{B6611389-1017-4150-8024-C2BB6BB8DDE0}" srcOrd="0" destOrd="0" parTransId="{9C81701E-A8E7-4666-9F5E-878EDA7DC943}" sibTransId="{287BEA01-5D6F-4F2D-8374-B6DE7F3DB266}"/>
-    <dgm:cxn modelId="{7C681EEE-5C74-422E-9240-020AB4F6C430}" type="presOf" srcId="{B6611389-1017-4150-8024-C2BB6BB8DDE0}" destId="{B7B89DBA-CC48-45AE-8268-DF553215D125}" srcOrd="0" destOrd="0" presId="urn:microsoft.com/office/officeart/2018/5/layout/IconLeafLabelList"/>
-    <dgm:cxn modelId="{56652FA4-5578-488E-B53C-FB86E29ED279}" type="presParOf" srcId="{ECFAAEE3-BAB1-479A-901B-FA804CB916C4}" destId="{B1365782-3781-4AD5-9C8B-FEA5B5BFD3D4}" srcOrd="0" destOrd="0" presId="urn:microsoft.com/office/officeart/2018/5/layout/IconLeafLabelList"/>
-    <dgm:cxn modelId="{3BB061D9-0AF8-4AB1-AB0B-C520D92FE5C0}" type="presParOf" srcId="{B1365782-3781-4AD5-9C8B-FEA5B5BFD3D4}" destId="{15055559-3E28-4BE2-8862-8338913C18D5}" srcOrd="0" destOrd="0" presId="urn:microsoft.com/office/officeart/2018/5/layout/IconLeafLabelList"/>
-    <dgm:cxn modelId="{B0E4B694-BB69-4C0E-B35E-FC4A9D890F9E}" type="presParOf" srcId="{B1365782-3781-4AD5-9C8B-FEA5B5BFD3D4}" destId="{88A0BD18-5723-4292-9B6E-09FC7AFAD952}" srcOrd="1" destOrd="0" presId="urn:microsoft.com/office/officeart/2018/5/layout/IconLeafLabelList"/>
-    <dgm:cxn modelId="{144E2D3A-941D-4910-91AB-747051B8E454}" type="presParOf" srcId="{B1365782-3781-4AD5-9C8B-FEA5B5BFD3D4}" destId="{8D0A9AD2-E48F-44B1-9E9D-2530F8664F01}" srcOrd="2" destOrd="0" presId="urn:microsoft.com/office/officeart/2018/5/layout/IconLeafLabelList"/>
-    <dgm:cxn modelId="{9AC9B74A-CA17-4CCE-83F8-B10334987C29}" type="presParOf" srcId="{B1365782-3781-4AD5-9C8B-FEA5B5BFD3D4}" destId="{B7B89DBA-CC48-45AE-8268-DF553215D125}" srcOrd="3" destOrd="0" presId="urn:microsoft.com/office/officeart/2018/5/layout/IconLeafLabelList"/>
-    <dgm:cxn modelId="{D922C8BF-5052-4EEE-830C-6310BC4E7180}" type="presParOf" srcId="{ECFAAEE3-BAB1-479A-901B-FA804CB916C4}" destId="{AD7EDB1C-4A08-4C30-B799-DCD463E02A0B}" srcOrd="1" destOrd="0" presId="urn:microsoft.com/office/officeart/2018/5/layout/IconLeafLabelList"/>
-    <dgm:cxn modelId="{9E8FFB41-0F19-4281-84B0-88E040FD8805}" type="presParOf" srcId="{ECFAAEE3-BAB1-479A-901B-FA804CB916C4}" destId="{2622261B-B134-423B-9BF5-9CAF3AFE7864}" srcOrd="2" destOrd="0" presId="urn:microsoft.com/office/officeart/2018/5/layout/IconLeafLabelList"/>
-    <dgm:cxn modelId="{1739ABC3-33BA-462E-B43B-914E1B9E935F}" type="presParOf" srcId="{2622261B-B134-423B-9BF5-9CAF3AFE7864}" destId="{B011FE9B-40C8-477E-A075-8E9B2DA585AA}" srcOrd="0" destOrd="0" presId="urn:microsoft.com/office/officeart/2018/5/layout/IconLeafLabelList"/>
-    <dgm:cxn modelId="{80EC75FA-B415-490D-9DDF-2E60BE7448CB}" type="presParOf" srcId="{2622261B-B134-423B-9BF5-9CAF3AFE7864}" destId="{513262DD-3D98-4C16-A75B-1DF8EAC7E4A1}" srcOrd="1" destOrd="0" presId="urn:microsoft.com/office/officeart/2018/5/layout/IconLeafLabelList"/>
-    <dgm:cxn modelId="{5E57DD6A-6649-44BF-BD07-9BB8883AE277}" type="presParOf" srcId="{2622261B-B134-423B-9BF5-9CAF3AFE7864}" destId="{277A8A70-DDC4-4AA8-B32F-A4C36BC26379}" srcOrd="2" destOrd="0" presId="urn:microsoft.com/office/officeart/2018/5/layout/IconLeafLabelList"/>
-    <dgm:cxn modelId="{ED8490E1-FFF6-473C-8730-3CC8CBC13181}" type="presParOf" srcId="{2622261B-B134-423B-9BF5-9CAF3AFE7864}" destId="{B256E9AD-8F27-43A8-9697-8492DE5338CD}" srcOrd="3" destOrd="0" presId="urn:microsoft.com/office/officeart/2018/5/layout/IconLeafLabelList"/>
-  </dgm:cxnLst>
-  <dgm:bg/>
-  <dgm:whole/>
-  <dgm:extLst>
-    <a:ext uri="http://schemas.microsoft.com/office/drawing/2008/diagram">
-      <dsp:dataModelExt xmlns:dsp="http://schemas.microsoft.com/office/drawing/2008/diagram" relId="rId6" minVer="http://schemas.openxmlformats.org/drawingml/2006/diagram"/>
-    </a:ext>
-  </dgm:extLst>
-</dgm:dataModel>
-</file>
-
-<file path=ppt/diagrams/drawing1.xml><?xml version="1.0" encoding="utf-8"?>
-<dsp:drawing xmlns:dgm="http://schemas.openxmlformats.org/drawingml/2006/diagram" xmlns:dsp="http://schemas.microsoft.com/office/drawing/2008/diagram" xmlns:a="http://schemas.openxmlformats.org/drawingml/2006/main">
-  <dsp:spTree>
-    <dsp:nvGrpSpPr>
-      <dsp:cNvPr id="0" name=""/>
-      <dsp:cNvGrpSpPr/>
-    </dsp:nvGrpSpPr>
-    <dsp:grpSpPr/>
-    <dsp:sp modelId="{15055559-3E28-4BE2-8862-8338913C18D5}">
-      <dsp:nvSpPr>
-        <dsp:cNvPr id="0" name=""/>
-        <dsp:cNvSpPr/>
-      </dsp:nvSpPr>
-      <dsp:spPr>
-        <a:xfrm>
-          <a:off x="2044800" y="280418"/>
-          <a:ext cx="2196000" cy="2196000"/>
-        </a:xfrm>
-        <a:prstGeom prst="round2DiagRect">
-          <a:avLst>
-            <a:gd name="adj1" fmla="val 29727"/>
-            <a:gd name="adj2" fmla="val 0"/>
-          </a:avLst>
-        </a:prstGeom>
-        <a:solidFill>
-          <a:schemeClr val="accent2">
-            <a:hueOff val="0"/>
-            <a:satOff val="0"/>
-            <a:lumOff val="0"/>
-            <a:alphaOff val="0"/>
-          </a:schemeClr>
-        </a:solidFill>
-        <a:ln>
-          <a:noFill/>
-        </a:ln>
-        <a:effectLst/>
-      </dsp:spPr>
-      <dsp:style>
-        <a:lnRef idx="0">
-          <a:scrgbClr r="0" g="0" b="0"/>
-        </a:lnRef>
-        <a:fillRef idx="1">
-          <a:scrgbClr r="0" g="0" b="0"/>
-        </a:fillRef>
-        <a:effectRef idx="0">
-          <a:scrgbClr r="0" g="0" b="0"/>
-        </a:effectRef>
-        <a:fontRef idx="minor"/>
-      </dsp:style>
-    </dsp:sp>
-    <dsp:sp modelId="{88A0BD18-5723-4292-9B6E-09FC7AFAD952}">
-      <dsp:nvSpPr>
-        <dsp:cNvPr id="0" name=""/>
-        <dsp:cNvSpPr/>
-      </dsp:nvSpPr>
-      <dsp:spPr>
-        <a:xfrm>
-          <a:off x="2512800" y="748418"/>
-          <a:ext cx="1260000" cy="1260000"/>
-        </a:xfrm>
-        <a:prstGeom prst="rect">
-          <a:avLst/>
-        </a:prstGeom>
-        <a:blipFill>
-          <a:blip xmlns:r="http://schemas.openxmlformats.org/officeDocument/2006/relationships" r:embed="rId1">
-            <a:extLst>
-              <a:ext uri="{28A0092B-C50C-407E-A947-70E740481C1C}">
-                <a14:useLocalDpi xmlns:a14="http://schemas.microsoft.com/office/drawing/2010/main" val="0"/>
-              </a:ext>
-              <a:ext uri="{96DAC541-7B7A-43D3-8B79-37D633B846F1}">
-                <asvg:svgBlip xmlns:asvg="http://schemas.microsoft.com/office/drawing/2016/SVG/main" r:embed="rId2"/>
-              </a:ext>
-            </a:extLst>
-          </a:blip>
-          <a:stretch>
-            <a:fillRect/>
-          </a:stretch>
-        </a:blipFill>
-        <a:ln w="12700" cap="flat" cmpd="sng" algn="ctr">
-          <a:noFill/>
-          <a:prstDash val="solid"/>
-          <a:miter lim="800000"/>
-        </a:ln>
-        <a:effectLst/>
-      </dsp:spPr>
-      <dsp:style>
-        <a:lnRef idx="2">
-          <a:scrgbClr r="0" g="0" b="0"/>
-        </a:lnRef>
-        <a:fillRef idx="1">
-          <a:scrgbClr r="0" g="0" b="0"/>
-        </a:fillRef>
-        <a:effectRef idx="0">
-          <a:scrgbClr r="0" g="0" b="0"/>
-        </a:effectRef>
-        <a:fontRef idx="minor">
-          <a:schemeClr val="lt1"/>
-        </a:fontRef>
-      </dsp:style>
-    </dsp:sp>
-    <dsp:sp modelId="{B7B89DBA-CC48-45AE-8268-DF553215D125}">
-      <dsp:nvSpPr>
-        <dsp:cNvPr id="0" name=""/>
-        <dsp:cNvSpPr/>
-      </dsp:nvSpPr>
-      <dsp:spPr>
-        <a:xfrm>
-          <a:off x="1342800" y="3160418"/>
-          <a:ext cx="3600000" cy="720000"/>
-        </a:xfrm>
-        <a:prstGeom prst="rect">
-          <a:avLst/>
-        </a:prstGeom>
-        <a:noFill/>
-        <a:ln>
-          <a:noFill/>
-        </a:ln>
-        <a:effectLst/>
-      </dsp:spPr>
-      <dsp:style>
-        <a:lnRef idx="0">
-          <a:scrgbClr r="0" g="0" b="0"/>
-        </a:lnRef>
-        <a:fillRef idx="0">
-          <a:scrgbClr r="0" g="0" b="0"/>
-        </a:fillRef>
-        <a:effectRef idx="0">
-          <a:scrgbClr r="0" g="0" b="0"/>
-        </a:effectRef>
-        <a:fontRef idx="minor"/>
-      </dsp:style>
-      <dsp:txBody>
-        <a:bodyPr spcFirstLastPara="0" vert="horz" wrap="square" lIns="0" tIns="0" rIns="0" bIns="0" numCol="1" spcCol="1270" anchor="t" anchorCtr="0">
-          <a:noAutofit/>
-        </a:bodyPr>
-        <a:lstStyle/>
-        <a:p>
-          <a:pPr marL="0" lvl="0" indent="0" algn="ctr" defTabSz="1022350">
-            <a:lnSpc>
-              <a:spcPct val="100000"/>
-            </a:lnSpc>
-            <a:spcBef>
-              <a:spcPct val="0"/>
-            </a:spcBef>
-            <a:spcAft>
-              <a:spcPct val="35000"/>
-            </a:spcAft>
-            <a:buNone/>
-            <a:defRPr cap="all"/>
-          </a:pPr>
-          <a:r>
-            <a:rPr lang="es-CO" sz="2300" b="0" i="1" kern="1200"/>
-            <a:t>La usabilidad </a:t>
-          </a:r>
-          <a:endParaRPr lang="en-US" sz="2300" kern="1200"/>
-        </a:p>
-      </dsp:txBody>
-      <dsp:txXfrm>
-        <a:off x="1342800" y="3160418"/>
-        <a:ext cx="3600000" cy="720000"/>
-      </dsp:txXfrm>
-    </dsp:sp>
-    <dsp:sp modelId="{B011FE9B-40C8-477E-A075-8E9B2DA585AA}">
-      <dsp:nvSpPr>
-        <dsp:cNvPr id="0" name=""/>
-        <dsp:cNvSpPr/>
-      </dsp:nvSpPr>
-      <dsp:spPr>
-        <a:xfrm>
-          <a:off x="6274800" y="280418"/>
-          <a:ext cx="2196000" cy="2196000"/>
-        </a:xfrm>
-        <a:prstGeom prst="round2DiagRect">
-          <a:avLst>
-            <a:gd name="adj1" fmla="val 29727"/>
-            <a:gd name="adj2" fmla="val 0"/>
-          </a:avLst>
-        </a:prstGeom>
-        <a:solidFill>
-          <a:schemeClr val="accent3">
-            <a:hueOff val="0"/>
-            <a:satOff val="0"/>
-            <a:lumOff val="0"/>
-            <a:alphaOff val="0"/>
-          </a:schemeClr>
-        </a:solidFill>
-        <a:ln>
-          <a:noFill/>
-        </a:ln>
-        <a:effectLst/>
-      </dsp:spPr>
-      <dsp:style>
-        <a:lnRef idx="0">
-          <a:scrgbClr r="0" g="0" b="0"/>
-        </a:lnRef>
-        <a:fillRef idx="1">
-          <a:scrgbClr r="0" g="0" b="0"/>
-        </a:fillRef>
-        <a:effectRef idx="0">
-          <a:scrgbClr r="0" g="0" b="0"/>
-        </a:effectRef>
-        <a:fontRef idx="minor"/>
-      </dsp:style>
-    </dsp:sp>
-    <dsp:sp modelId="{513262DD-3D98-4C16-A75B-1DF8EAC7E4A1}">
-      <dsp:nvSpPr>
-        <dsp:cNvPr id="0" name=""/>
-        <dsp:cNvSpPr/>
-      </dsp:nvSpPr>
-      <dsp:spPr>
-        <a:xfrm>
-          <a:off x="6742800" y="748418"/>
-          <a:ext cx="1260000" cy="1260000"/>
-        </a:xfrm>
-        <a:prstGeom prst="rect">
-          <a:avLst/>
-        </a:prstGeom>
-        <a:blipFill>
-          <a:blip xmlns:r="http://schemas.openxmlformats.org/officeDocument/2006/relationships" r:embed="rId3">
-            <a:extLst>
-              <a:ext uri="{28A0092B-C50C-407E-A947-70E740481C1C}">
-                <a14:useLocalDpi xmlns:a14="http://schemas.microsoft.com/office/drawing/2010/main" val="0"/>
-              </a:ext>
-              <a:ext uri="{96DAC541-7B7A-43D3-8B79-37D633B846F1}">
-                <asvg:svgBlip xmlns:asvg="http://schemas.microsoft.com/office/drawing/2016/SVG/main" r:embed="rId4"/>
-              </a:ext>
-            </a:extLst>
-          </a:blip>
-          <a:stretch>
-            <a:fillRect/>
-          </a:stretch>
-        </a:blipFill>
-        <a:ln w="12700" cap="flat" cmpd="sng" algn="ctr">
-          <a:noFill/>
-          <a:prstDash val="solid"/>
-          <a:miter lim="800000"/>
-        </a:ln>
-        <a:effectLst/>
-      </dsp:spPr>
-      <dsp:style>
-        <a:lnRef idx="2">
-          <a:scrgbClr r="0" g="0" b="0"/>
-        </a:lnRef>
-        <a:fillRef idx="1">
-          <a:scrgbClr r="0" g="0" b="0"/>
-        </a:fillRef>
-        <a:effectRef idx="0">
-          <a:scrgbClr r="0" g="0" b="0"/>
-        </a:effectRef>
-        <a:fontRef idx="minor">
-          <a:schemeClr val="lt1"/>
-        </a:fontRef>
-      </dsp:style>
-    </dsp:sp>
-    <dsp:sp modelId="{B256E9AD-8F27-43A8-9697-8492DE5338CD}">
-      <dsp:nvSpPr>
-        <dsp:cNvPr id="0" name=""/>
-        <dsp:cNvSpPr/>
-      </dsp:nvSpPr>
-      <dsp:spPr>
-        <a:xfrm>
-          <a:off x="5572800" y="3160418"/>
-          <a:ext cx="3600000" cy="720000"/>
-        </a:xfrm>
-        <a:prstGeom prst="rect">
-          <a:avLst/>
-        </a:prstGeom>
-        <a:noFill/>
-        <a:ln>
-          <a:noFill/>
-        </a:ln>
-        <a:effectLst/>
-      </dsp:spPr>
-      <dsp:style>
-        <a:lnRef idx="0">
-          <a:scrgbClr r="0" g="0" b="0"/>
-        </a:lnRef>
-        <a:fillRef idx="0">
-          <a:scrgbClr r="0" g="0" b="0"/>
-        </a:fillRef>
-        <a:effectRef idx="0">
-          <a:scrgbClr r="0" g="0" b="0"/>
-        </a:effectRef>
-        <a:fontRef idx="minor"/>
-      </dsp:style>
-      <dsp:txBody>
-        <a:bodyPr spcFirstLastPara="0" vert="horz" wrap="square" lIns="0" tIns="0" rIns="0" bIns="0" numCol="1" spcCol="1270" anchor="t" anchorCtr="0">
-          <a:noAutofit/>
-        </a:bodyPr>
-        <a:lstStyle/>
-        <a:p>
-          <a:pPr marL="0" lvl="0" indent="0" algn="ctr" defTabSz="1022350">
-            <a:lnSpc>
-              <a:spcPct val="100000"/>
-            </a:lnSpc>
-            <a:spcBef>
-              <a:spcPct val="0"/>
-            </a:spcBef>
-            <a:spcAft>
-              <a:spcPct val="35000"/>
-            </a:spcAft>
-            <a:buNone/>
-            <a:defRPr cap="all"/>
-          </a:pPr>
-          <a:r>
-            <a:rPr lang="es-CO" sz="2300" b="0" i="1" kern="1200"/>
-            <a:t>Experiencia de Usuario (UX) </a:t>
-          </a:r>
-          <a:endParaRPr lang="en-US" sz="2300" kern="1200"/>
-        </a:p>
-      </dsp:txBody>
-      <dsp:txXfrm>
-        <a:off x="5572800" y="3160418"/>
-        <a:ext cx="3600000" cy="720000"/>
-      </dsp:txXfrm>
-    </dsp:sp>
-  </dsp:spTree>
-</dsp:drawing>
-</file>
-
-<file path=ppt/diagrams/layout1.xml><?xml version="1.0" encoding="utf-8"?>
-<dgm:layoutDef xmlns:dgm="http://schemas.openxmlformats.org/drawingml/2006/diagram" xmlns:a="http://schemas.openxmlformats.org/drawingml/2006/main" uniqueId="urn:microsoft.com/office/officeart/2018/5/layout/IconLeafLabelList">
-  <dgm:title val="Icon Leaf Label List"/>
-  <dgm:desc val="Use to show non-sequential or grouped chunks of information accompanied by a related visuals. Works best with icons or small pictures with short text captions."/>
-  <dgm:catLst>
-    <dgm:cat type="icon" pri="500"/>
-  </dgm:catLst>
-  <dgm:sampData useDef="1">
-    <dgm:dataModel>
-      <dgm:ptLst/>
-      <dgm:bg/>
-      <dgm:whole/>
-    </dgm:dataModel>
-  </dgm:sampData>
-  <dgm:styleData useDef="1">
-    <dgm:dataModel>
-      <dgm:ptLst/>
-      <dgm:bg/>
-      <dgm:whole/>
-    </dgm:dataModel>
-  </dgm:styleData>
-  <dgm:clrData useDef="1">
-    <dgm:dataModel>
-      <dgm:ptLst/>
-      <dgm:bg/>
-      <dgm:whole/>
-    </dgm:dataModel>
-  </dgm:clrData>
-  <dgm:layoutNode name="root">
-    <dgm:varLst>
-      <dgm:dir/>
-      <dgm:resizeHandles val="exact"/>
-    </dgm:varLst>
-    <dgm:choose name="Name0">
-      <dgm:if name="Name1" axis="self" func="var" arg="dir" op="equ" val="norm">
-        <dgm:alg type="snake">
-          <dgm:param type="grDir" val="tL"/>
-          <dgm:param type="flowDir" val="row"/>
-          <dgm:param type="contDir" val="sameDir"/>
-          <dgm:param type="off" val="ctr"/>
-          <dgm:param type="vertAlign" val="mid"/>
-          <dgm:param type="horzAlign" val="ctr"/>
-        </dgm:alg>
-      </dgm:if>
-      <dgm:else name="Name2">
-        <dgm:alg type="snake">
-          <dgm:param type="grDir" val="tR"/>
-          <dgm:param type="flowDir" val="row"/>
-          <dgm:param type="contDir" val="sameDir"/>
-          <dgm:param type="off" val="ctr"/>
-          <dgm:param type="vertAlign" val="mid"/>
-          <dgm:param type="horzAlign" val="ctr"/>
-        </dgm:alg>
-      </dgm:else>
-    </dgm:choose>
-    <dgm:shape xmlns:r="http://schemas.openxmlformats.org/officeDocument/2006/relationships" r:blip="">
-      <dgm:adjLst/>
-    </dgm:shape>
-    <dgm:presOf/>
-    <dgm:choose name="Name3">
-      <dgm:if name="Name4" axis="ch" ptType="node" func="cnt" op="lte" val="2">
-        <dgm:constrLst>
-          <dgm:constr type="h" for="ch" forName="compNode" refType="h" fact="0.4"/>
-          <dgm:constr type="w" for="ch" forName="compNode" val="100"/>
-          <dgm:constr type="w" for="ch" forName="sibTrans" refType="w" refFor="ch" refForName="compNode" fact="0.175"/>
-          <dgm:constr type="sp" refType="w" refFor="ch" refForName="compNode" op="equ" fact="0.25"/>
-          <dgm:constr type="primFontSz" for="des" ptType="node" op="equ" val="44"/>
-          <dgm:constr type="h" for="des" forName="compNode" op="equ"/>
-          <dgm:constr type="h" for="des" forName="textRect" op="equ"/>
-        </dgm:constrLst>
-      </dgm:if>
-      <dgm:if name="Name5" axis="ch" ptType="node" func="cnt" op="lte" val="3">
-        <dgm:constrLst>
-          <dgm:constr type="h" for="ch" forName="compNode" refType="h" fact="0.4"/>
-          <dgm:constr type="w" for="ch" forName="compNode" val="100"/>
-          <dgm:constr type="w" for="ch" forName="sibTrans" refType="w" refFor="ch" refForName="compNode" fact="0.175"/>
-          <dgm:constr type="sp" refType="w" refFor="ch" refForName="compNode" op="equ" fact="0.25"/>
-          <dgm:constr type="primFontSz" for="des" ptType="node" op="equ" val="40"/>
-          <dgm:constr type="h" for="des" forName="compNode" op="equ"/>
-          <dgm:constr type="h" for="des" forName="textRect" op="equ"/>
-        </dgm:constrLst>
-      </dgm:if>
-      <dgm:if name="Name6" axis="ch" ptType="node" func="cnt" op="lte" val="4">
-        <dgm:constrLst>
-          <dgm:constr type="h" for="ch" forName="compNode" refType="h" fact="0.4"/>
-          <dgm:constr type="w" for="ch" forName="compNode" refType="w"/>
-          <dgm:constr type="w" for="ch" forName="sibTrans" refType="w" refFor="ch" refForName="compNode" fact="0.175"/>
-          <dgm:constr type="sp" refType="w" refFor="ch" refForName="compNode" op="equ" fact="0.25"/>
-          <dgm:constr type="primFontSz" for="des" ptType="node" op="equ" val="32"/>
-          <dgm:constr type="h" for="des" forName="compNode" op="equ"/>
-          <dgm:constr type="h" for="des" forName="textRect" op="equ"/>
-        </dgm:constrLst>
-      </dgm:if>
-      <dgm:else name="Name7">
-        <dgm:constrLst>
-          <dgm:constr type="h" for="ch" forName="compNode" refType="h" fact="0.4"/>
-          <dgm:constr type="w" for="ch" forName="compNode" refType="w"/>
-          <dgm:constr type="w" for="ch" forName="sibTrans" refType="w" refFor="ch" refForName="compNode" fact="0.175"/>
-          <dgm:constr type="sp" refType="w" refFor="ch" refForName="compNode" op="equ" fact="0.25"/>
-          <dgm:constr type="primFontSz" for="des" ptType="node" op="equ" val="24"/>
-          <dgm:constr type="h" for="des" forName="compNode" op="equ"/>
-          <dgm:constr type="h" for="des" forName="textRect" op="equ"/>
-        </dgm:constrLst>
-      </dgm:else>
-    </dgm:choose>
-    <dgm:ruleLst>
-      <dgm:rule type="w" for="ch" forName="compNode" val="50" fact="NaN" max="NaN"/>
-    </dgm:ruleLst>
-    <dgm:forEach name="Name8" axis="ch" ptType="node">
-      <dgm:layoutNode name="compNode">
-        <dgm:alg type="composite"/>
-        <dgm:shape xmlns:r="http://schemas.openxmlformats.org/officeDocument/2006/relationships" r:blip="">
-          <dgm:adjLst/>
-        </dgm:shape>
-        <dgm:presOf axis="self"/>
-        <dgm:constrLst>
-          <dgm:constr type="w" for="ch" forName="iconBgRect" refType="w" fact="0.61"/>
-          <dgm:constr type="h" for="ch" forName="iconBgRect" refType="w" refFor="ch" refForName="iconBgRect"/>
-          <dgm:constr type="t" for="ch" forName="iconBgRect"/>
-          <dgm:constr type="ctrX" for="ch" forName="iconBgRect" refType="w" fact="0.5"/>
-          <dgm:constr type="w" for="ch" forName="iconRect" refType="w" fact="0.35"/>
-          <dgm:constr type="h" for="ch" forName="iconRect" refType="w" refFor="ch" refForName="iconRect"/>
-          <dgm:constr type="ctrX" for="ch" forName="iconRect" refType="ctrX" refFor="ch" refForName="iconBgRect"/>
-          <dgm:constr type="ctrY" for="ch" forName="iconRect" refType="ctrY" refFor="ch" refForName="iconBgRect"/>
-          <dgm:constr type="h" for="ch" forName="spaceRect" refType="w" fact="0.19"/>
-          <dgm:constr type="w" for="ch" forName="spaceRect" refType="w"/>
-          <dgm:constr type="l" for="ch" forName="spaceRect"/>
-          <dgm:constr type="t" for="ch" forName="spaceRect" refType="b" refFor="ch" refForName="iconBgRect"/>
-          <dgm:constr type="h" for="ch" forName="textRect" val="20"/>
-          <dgm:constr type="w" for="ch" forName="textRect" refType="w"/>
-          <dgm:constr type="l" for="ch" forName="textRect"/>
-          <dgm:constr type="t" for="ch" forName="textRect" refType="b" refFor="ch" refForName="spaceRect"/>
-        </dgm:constrLst>
-        <dgm:ruleLst>
-          <dgm:rule type="h" val="INF" fact="NaN" max="NaN"/>
-        </dgm:ruleLst>
-        <dgm:layoutNode name="iconBgRect" styleLbl="bgShp">
-          <dgm:alg type="sp"/>
-          <dgm:shape xmlns:r="http://schemas.openxmlformats.org/officeDocument/2006/relationships" type="round2DiagRect" r:blip="">
-            <dgm:adjLst/>
-            <dgm:extLst>
-              <a:ext uri="{B698B0E9-8C71-41B9-8309-B3DCBF30829C}">
-                <dgm1612:spPr xmlns:dgm1612="http://schemas.microsoft.com/office/drawing/2016/12/diagram">
-                  <a:prstGeom prst="round2DiagRect">
-                    <a:avLst>
-                      <a:gd name="adj1" fmla="val 29727"/>
-                      <a:gd name="adj2" fmla="val 0"/>
-                    </a:avLst>
-                  </a:prstGeom>
-                </dgm1612:spPr>
-              </a:ext>
-            </dgm:extLst>
-          </dgm:shape>
-          <dgm:presOf/>
-          <dgm:constrLst/>
-          <dgm:ruleLst/>
-        </dgm:layoutNode>
-        <dgm:layoutNode name="iconRect" styleLbl="node1">
-          <dgm:alg type="sp"/>
-          <dgm:shape xmlns:r="http://schemas.openxmlformats.org/officeDocument/2006/relationships" type="rect" r:blip="" blipPhldr="1">
-            <dgm:adjLst/>
-          </dgm:shape>
-          <dgm:presOf/>
-          <dgm:constrLst/>
-          <dgm:ruleLst/>
-        </dgm:layoutNode>
-        <dgm:layoutNode name="spaceRect">
-          <dgm:alg type="sp"/>
-          <dgm:shape xmlns:r="http://schemas.openxmlformats.org/officeDocument/2006/relationships" r:blip="">
-            <dgm:adjLst/>
-          </dgm:shape>
-          <dgm:presOf/>
-          <dgm:constrLst/>
-          <dgm:ruleLst/>
-        </dgm:layoutNode>
-        <dgm:layoutNode name="textRect" styleLbl="revTx">
-          <dgm:varLst>
-            <dgm:chMax val="1"/>
-            <dgm:chPref val="1"/>
-          </dgm:varLst>
-          <dgm:alg type="tx">
-            <dgm:param type="txAnchorVert" val="t"/>
-          </dgm:alg>
-          <dgm:shape xmlns:r="http://schemas.openxmlformats.org/officeDocument/2006/relationships" type="rect" r:blip="">
-            <dgm:adjLst/>
-          </dgm:shape>
-          <dgm:presOf axis="self" ptType="node"/>
-          <dgm:constrLst>
-            <dgm:constr type="lMarg"/>
-            <dgm:constr type="rMarg"/>
-            <dgm:constr type="tMarg"/>
-            <dgm:constr type="bMarg"/>
-          </dgm:constrLst>
-          <dgm:ruleLst>
-            <dgm:rule type="primFontSz" val="11" fact="NaN" max="NaN"/>
-            <dgm:rule type="h" val="INF" fact="NaN" max="NaN"/>
-          </dgm:ruleLst>
-        </dgm:layoutNode>
-      </dgm:layoutNode>
-      <dgm:forEach name="Name9" axis="followSib" ptType="sibTrans" cnt="1">
-        <dgm:layoutNode name="sibTrans">
-          <dgm:alg type="sp"/>
-          <dgm:shape xmlns:r="http://schemas.openxmlformats.org/officeDocument/2006/relationships" r:blip="">
-            <dgm:adjLst/>
-          </dgm:shape>
-          <dgm:presOf axis="self"/>
-          <dgm:constrLst/>
-          <dgm:ruleLst/>
-        </dgm:layoutNode>
-      </dgm:forEach>
-    </dgm:forEach>
-  </dgm:layoutNode>
-  <dgm:extLst>
-    <a:ext uri="{68A01E43-0DF5-4B5B-8FA6-DAF915123BFB}">
-      <dgm1612:lstStyle xmlns:dgm1612="http://schemas.microsoft.com/office/drawing/2016/12/diagram">
-        <a:lvl1pPr>
-          <a:lnSpc>
-            <a:spcPct val="100000"/>
-          </a:lnSpc>
-          <a:defRPr cap="all"/>
-        </a:lvl1pPr>
-      </dgm1612:lstStyle>
-    </a:ext>
-  </dgm:extLst>
-</dgm:layoutDef>
-</file>
-
-<file path=ppt/diagrams/quickStyle1.xml><?xml version="1.0" encoding="utf-8"?>
-<dgm:styleDef xmlns:dgm="http://schemas.openxmlformats.org/drawingml/2006/diagram" xmlns:a="http://schemas.openxmlformats.org/drawingml/2006/main" uniqueId="urn:microsoft.com/office/officeart/2005/8/quickstyle/simple1">
-  <dgm:title val=""/>
-  <dgm:desc val=""/>
-  <dgm:catLst>
-    <dgm:cat type="simple" pri="10100"/>
-  </dgm:catLst>
-  <dgm:scene3d>
-    <a:camera prst="orthographicFront"/>
-    <a:lightRig rig="threePt" dir="t"/>
-  </dgm:scene3d>
-  <dgm:styleLbl name="node0">
-    <dgm:scene3d>
-      <a:camera prst="orthographicFront"/>
-      <a:lightRig rig="threePt" dir="t"/>
-    </dgm:scene3d>
-    <dgm:sp3d/>
-    <dgm:txPr/>
-    <dgm:style>
-      <a:lnRef idx="2">
-        <a:scrgbClr r="0" g="0" b="0"/>
-      </a:lnRef>
-      <a:fillRef idx="1">
-        <a:scrgbClr r="0" g="0" b="0"/>
-      </a:fillRef>
-      <a:effectRef idx="0">
-        <a:scrgbClr r="0" g="0" b="0"/>
-      </a:effectRef>
-      <a:fontRef idx="minor">
-        <a:schemeClr val="lt1"/>
-      </a:fontRef>
-    </dgm:style>
-  </dgm:styleLbl>
-  <dgm:styleLbl name="lnNode1">
-    <dgm:scene3d>
-      <a:camera prst="orthographicFront"/>
-      <a:lightRig rig="threePt" dir="t"/>
-    </dgm:scene3d>
-    <dgm:sp3d/>
-    <dgm:txPr/>
-    <dgm:style>
-      <a:lnRef idx="2">
-        <a:scrgbClr r="0" g="0" b="0"/>
-      </a:lnRef>
-      <a:fillRef idx="1">
-        <a:scrgbClr r="0" g="0" b="0"/>
-      </a:fillRef>
-      <a:effectRef idx="0">
-        <a:scrgbClr r="0" g="0" b="0"/>
-      </a:effectRef>
-      <a:fontRef idx="minor">
-        <a:schemeClr val="lt1"/>
-      </a:fontRef>
-    </dgm:style>
-  </dgm:styleLbl>
-  <dgm:styleLbl name="vennNode1">
-    <dgm:scene3d>
-      <a:camera prst="orthographicFront"/>
-      <a:lightRig rig="threePt" dir="t"/>
-    </dgm:scene3d>
-    <dgm:sp3d/>
-    <dgm:txPr/>
-    <dgm:style>
-      <a:lnRef idx="2">
-        <a:scrgbClr r="0" g="0" b="0"/>
-      </a:lnRef>
-      <a:fillRef idx="1">
-        <a:scrgbClr r="0" g="0" b="0"/>
-      </a:fillRef>
-      <a:effectRef idx="0">
-        <a:scrgbClr r="0" g="0" b="0"/>
-      </a:effectRef>
-      <a:fontRef idx="minor">
-        <a:schemeClr val="tx1"/>
-      </a:fontRef>
-    </dgm:style>
-  </dgm:styleLbl>
-  <dgm:styleLbl name="alignNode1">
-    <dgm:scene3d>
-      <a:camera prst="orthographicFront"/>
-      <a:lightRig rig="threePt" dir="t"/>
-    </dgm:scene3d>
-    <dgm:sp3d/>
-    <dgm:txPr/>
-    <dgm:style>
-      <a:lnRef idx="2">
-        <a:scrgbClr r="0" g="0" b="0"/>
-      </a:lnRef>
-      <a:fillRef idx="1">
-        <a:scrgbClr r="0" g="0" b="0"/>
-      </a:fillRef>
-      <a:effectRef idx="0">
-        <a:scrgbClr r="0" g="0" b="0"/>
-      </a:effectRef>
-      <a:fontRef idx="minor">
-        <a:schemeClr val="lt1"/>
-      </a:fontRef>
-    </dgm:style>
-  </dgm:styleLbl>
-  <dgm:styleLbl name="node1">
-    <dgm:scene3d>
-      <a:camera prst="orthographicFront"/>
-      <a:lightRig rig="threePt" dir="t"/>
-    </dgm:scene3d>
-    <dgm:sp3d/>
-    <dgm:txPr/>
-    <dgm:style>
-      <a:lnRef idx="2">
-        <a:scrgbClr r="0" g="0" b="0"/>
-      </a:lnRef>
-      <a:fillRef idx="1">
-        <a:scrgbClr r="0" g="0" b="0"/>
-      </a:fillRef>
-      <a:effectRef idx="0">
-        <a:scrgbClr r="0" g="0" b="0"/>
-      </a:effectRef>
-      <a:fontRef idx="minor">
-        <a:schemeClr val="lt1"/>
-      </a:fontRef>
-    </dgm:style>
-  </dgm:styleLbl>
-  <dgm:styleLbl name="node2">
-    <dgm:scene3d>
-      <a:camera prst="orthographicFront"/>
-      <a:lightRig rig="threePt" dir="t"/>
-    </dgm:scene3d>
-    <dgm:sp3d/>
-    <dgm:txPr/>
-    <dgm:style>
-      <a:lnRef idx="2">
-        <a:scrgbClr r="0" g="0" b="0"/>
-      </a:lnRef>
-      <a:fillRef idx="1">
-        <a:scrgbClr r="0" g="0" b="0"/>
-      </a:fillRef>
-      <a:effectRef idx="0">
-        <a:scrgbClr r="0" g="0" b="0"/>
-      </a:effectRef>
-      <a:fontRef idx="minor">
-        <a:schemeClr val="lt1"/>
-      </a:fontRef>
-    </dgm:style>
-  </dgm:styleLbl>
-  <dgm:styleLbl name="node3">
-    <dgm:scene3d>
-      <a:camera prst="orthographicFront"/>
-      <a:lightRig rig="threePt" dir="t"/>
-    </dgm:scene3d>
-    <dgm:sp3d/>
-    <dgm:txPr/>
-    <dgm:style>
-      <a:lnRef idx="2">
-        <a:scrgbClr r="0" g="0" b="0"/>
-      </a:lnRef>
-      <a:fillRef idx="1">
-        <a:scrgbClr r="0" g="0" b="0"/>
-      </a:fillRef>
-      <a:effectRef idx="0">
-        <a:scrgbClr r="0" g="0" b="0"/>
-      </a:effectRef>
-      <a:fontRef idx="minor">
-        <a:schemeClr val="lt1"/>
-      </a:fontRef>
-    </dgm:style>
-  </dgm:styleLbl>
-  <dgm:styleLbl name="node4">
-    <dgm:scene3d>
-      <a:camera prst="orthographicFront"/>
-      <a:lightRig rig="threePt" dir="t"/>
-    </dgm:scene3d>
-    <dgm:sp3d/>
-    <dgm:txPr/>
-    <dgm:style>
-      <a:lnRef idx="2">
-        <a:scrgbClr r="0" g="0" b="0"/>
-      </a:lnRef>
-      <a:fillRef idx="1">
-        <a:scrgbClr r="0" g="0" b="0"/>
-      </a:fillRef>
-      <a:effectRef idx="0">
-        <a:scrgbClr r="0" g="0" b="0"/>
-      </a:effectRef>
-      <a:fontRef idx="minor">
-        <a:schemeClr val="lt1"/>
-      </a:fontRef>
-    </dgm:style>
-  </dgm:styleLbl>
-  <dgm:styleLbl name="fgImgPlace1">
-    <dgm:scene3d>
-      <a:camera prst="orthographicFront"/>
-      <a:lightRig rig="threePt" dir="t"/>
-    </dgm:scene3d>
-    <dgm:sp3d/>
-    <dgm:txPr/>
-    <dgm:style>
-      <a:lnRef idx="2">
-        <a:scrgbClr r="0" g="0" b="0"/>
-      </a:lnRef>
-      <a:fillRef idx="1">
-        <a:scrgbClr r="0" g="0" b="0"/>
-      </a:fillRef>
-      <a:effectRef idx="0">
-        <a:scrgbClr r="0" g="0" b="0"/>
-      </a:effectRef>
-      <a:fontRef idx="minor"/>
-    </dgm:style>
-  </dgm:styleLbl>
-  <dgm:styleLbl name="alignImgPlace1">
-    <dgm:scene3d>
-      <a:camera prst="orthographicFront"/>
-      <a:lightRig rig="threePt" dir="t"/>
-    </dgm:scene3d>
-    <dgm:sp3d/>
-    <dgm:txPr/>
-    <dgm:style>
-      <a:lnRef idx="2">
-        <a:scrgbClr r="0" g="0" b="0"/>
-      </a:lnRef>
-      <a:fillRef idx="1">
-        <a:scrgbClr r="0" g="0" b="0"/>
-      </a:fillRef>
-      <a:effectRef idx="0">
-        <a:scrgbClr r="0" g="0" b="0"/>
-      </a:effectRef>
-      <a:fontRef idx="minor"/>
-    </dgm:style>
-  </dgm:styleLbl>
-  <dgm:styleLbl name="bgImgPlace1">
-    <dgm:scene3d>
-      <a:camera prst="orthographicFront"/>
-      <a:lightRig rig="threePt" dir="t"/>
-    </dgm:scene3d>
-    <dgm:sp3d/>
-    <dgm:txPr/>
-    <dgm:style>
-      <a:lnRef idx="2">
-        <a:scrgbClr r="0" g="0" b="0"/>
-      </a:lnRef>
-      <a:fillRef idx="1">
-        <a:scrgbClr r="0" g="0" b="0"/>
-      </a:fillRef>
-      <a:effectRef idx="0">
-        <a:scrgbClr r="0" g="0" b="0"/>
-      </a:effectRef>
-      <a:fontRef idx="minor"/>
-    </dgm:style>
-  </dgm:styleLbl>
-  <dgm:styleLbl name="sibTrans2D1">
-    <dgm:scene3d>
-      <a:camera prst="orthographicFront"/>
-      <a:lightRig rig="threePt" dir="t"/>
-    </dgm:scene3d>
-    <dgm:sp3d/>
-    <dgm:txPr/>
-    <dgm:style>
-      <a:lnRef idx="0">
-        <a:scrgbClr r="0" g="0" b="0"/>
-      </a:lnRef>
-      <a:fillRef idx="1">
-        <a:scrgbClr r="0" g="0" b="0"/>
-      </a:fillRef>
-      <a:effectRef idx="0">
-        <a:scrgbClr r="0" g="0" b="0"/>
-      </a:effectRef>
-      <a:fontRef idx="minor">
-        <a:schemeClr val="lt1"/>
-      </a:fontRef>
-    </dgm:style>
-  </dgm:styleLbl>
-  <dgm:styleLbl name="fgSibTrans2D1">
-    <dgm:scene3d>
-      <a:camera prst="orthographicFront"/>
-      <a:lightRig rig="threePt" dir="t"/>
-    </dgm:scene3d>
-    <dgm:sp3d/>
-    <dgm:txPr/>
-    <dgm:style>
-      <a:lnRef idx="0">
-        <a:scrgbClr r="0" g="0" b="0"/>
-      </a:lnRef>
-      <a:fillRef idx="1">
-        <a:scrgbClr r="0" g="0" b="0"/>
-      </a:fillRef>
-      <a:effectRef idx="0">
-        <a:scrgbClr r="0" g="0" b="0"/>
-      </a:effectRef>
-      <a:fontRef idx="minor">
-        <a:schemeClr val="lt1"/>
-      </a:fontRef>
-    </dgm:style>
-  </dgm:styleLbl>
-  <dgm:styleLbl name="bgSibTrans2D1">
-    <dgm:scene3d>
-      <a:camera prst="orthographicFront"/>
-      <a:lightRig rig="threePt" dir="t"/>
-    </dgm:scene3d>
-    <dgm:sp3d/>
-    <dgm:txPr/>
-    <dgm:style>
-      <a:lnRef idx="0">
-        <a:scrgbClr r="0" g="0" b="0"/>
-      </a:lnRef>
-      <a:fillRef idx="1">
-        <a:scrgbClr r="0" g="0" b="0"/>
-      </a:fillRef>
-      <a:effectRef idx="0">
-        <a:scrgbClr r="0" g="0" b="0"/>
-      </a:effectRef>
-      <a:fontRef idx="minor">
-        <a:schemeClr val="lt1"/>
-      </a:fontRef>
-    </dgm:style>
-  </dgm:styleLbl>
-  <dgm:styleLbl name="sibTrans1D1">
-    <dgm:scene3d>
-      <a:camera prst="orthographicFront"/>
-      <a:lightRig rig="threePt" dir="t"/>
-    </dgm:scene3d>
-    <dgm:sp3d/>
-    <dgm:txPr/>
-    <dgm:style>
-      <a:lnRef idx="1">
-        <a:scrgbClr r="0" g="0" b="0"/>
-      </a:lnRef>
-      <a:fillRef idx="0">
-        <a:scrgbClr r="0" g="0" b="0"/>
-      </a:fillRef>
-      <a:effectRef idx="0">
-        <a:scrgbClr r="0" g="0" b="0"/>
-      </a:effectRef>
-      <a:fontRef idx="minor"/>
-    </dgm:style>
-  </dgm:styleLbl>
-  <dgm:styleLbl name="callout">
-    <dgm:scene3d>
-      <a:camera prst="orthographicFront"/>
-      <a:lightRig rig="threePt" dir="t"/>
-    </dgm:scene3d>
-    <dgm:sp3d/>
-    <dgm:txPr/>
-    <dgm:style>
-      <a:lnRef idx="2">
-        <a:scrgbClr r="0" g="0" b="0"/>
-      </a:lnRef>
-      <a:fillRef idx="1">
-        <a:scrgbClr r="0" g="0" b="0"/>
-      </a:fillRef>
-      <a:effectRef idx="0">
-        <a:scrgbClr r="0" g="0" b="0"/>
-      </a:effectRef>
-      <a:fontRef idx="minor"/>
-    </dgm:style>
-  </dgm:styleLbl>
-  <dgm:styleLbl name="asst0">
-    <dgm:scene3d>
-      <a:camera prst="orthographicFront"/>
-      <a:lightRig rig="threePt" dir="t"/>
-    </dgm:scene3d>
-    <dgm:sp3d/>
-    <dgm:txPr/>
-    <dgm:style>
-      <a:lnRef idx="2">
-        <a:scrgbClr r="0" g="0" b="0"/>
-      </a:lnRef>
-      <a:fillRef idx="1">
-        <a:scrgbClr r="0" g="0" b="0"/>
-      </a:fillRef>
-      <a:effectRef idx="0">
-        <a:scrgbClr r="0" g="0" b="0"/>
-      </a:effectRef>
-      <a:fontRef idx="minor">
-        <a:schemeClr val="lt1"/>
-      </a:fontRef>
-    </dgm:style>
-  </dgm:styleLbl>
-  <dgm:styleLbl name="asst1">
-    <dgm:scene3d>
-      <a:camera prst="orthographicFront"/>
-      <a:lightRig rig="threePt" dir="t"/>
-    </dgm:scene3d>
-    <dgm:sp3d/>
-    <dgm:txPr/>
-    <dgm:style>
-      <a:lnRef idx="2">
-        <a:scrgbClr r="0" g="0" b="0"/>
-      </a:lnRef>
-      <a:fillRef idx="1">
-        <a:scrgbClr r="0" g="0" b="0"/>
-      </a:fillRef>
-      <a:effectRef idx="0">
-        <a:scrgbClr r="0" g="0" b="0"/>
-      </a:effectRef>
-      <a:fontRef idx="minor">
-        <a:schemeClr val="lt1"/>
-      </a:fontRef>
-    </dgm:style>
-  </dgm:styleLbl>
-  <dgm:styleLbl name="asst2">
-    <dgm:scene3d>
-      <a:camera prst="orthographicFront"/>
-      <a:lightRig rig="threePt" dir="t"/>
-    </dgm:scene3d>
-    <dgm:sp3d/>
-    <dgm:txPr/>
-    <dgm:style>
-      <a:lnRef idx="2">
-        <a:scrgbClr r="0" g="0" b="0"/>
-      </a:lnRef>
-      <a:fillRef idx="1">
-        <a:scrgbClr r="0" g="0" b="0"/>
-      </a:fillRef>
-      <a:effectRef idx="0">
-        <a:scrgbClr r="0" g="0" b="0"/>
-      </a:effectRef>
-      <a:fontRef idx="minor">
-        <a:schemeClr val="lt1"/>
-      </a:fontRef>
-    </dgm:style>
-  </dgm:styleLbl>
-  <dgm:styleLbl name="asst3">
-    <dgm:scene3d>
-      <a:camera prst="orthographicFront"/>
-      <a:lightRig rig="threePt" dir="t"/>
-    </dgm:scene3d>
-    <dgm:sp3d/>
-    <dgm:txPr/>
-    <dgm:style>
-      <a:lnRef idx="2">
-        <a:scrgbClr r="0" g="0" b="0"/>
-      </a:lnRef>
-      <a:fillRef idx="1">
-        <a:scrgbClr r="0" g="0" b="0"/>
-      </a:fillRef>
-      <a:effectRef idx="0">
-        <a:scrgbClr r="0" g="0" b="0"/>
-      </a:effectRef>
-      <a:fontRef idx="minor">
-        <a:schemeClr val="lt1"/>
-      </a:fontRef>
-    </dgm:style>
-  </dgm:styleLbl>
-  <dgm:styleLbl name="asst4">
-    <dgm:scene3d>
-      <a:camera prst="orthographicFront"/>
-      <a:lightRig rig="threePt" dir="t"/>
-    </dgm:scene3d>
-    <dgm:sp3d/>
-    <dgm:txPr/>
-    <dgm:style>
-      <a:lnRef idx="2">
-        <a:scrgbClr r="0" g="0" b="0"/>
-      </a:lnRef>
-      <a:fillRef idx="1">
-        <a:scrgbClr r="0" g="0" b="0"/>
-      </a:fillRef>
-      <a:effectRef idx="0">
-        <a:scrgbClr r="0" g="0" b="0"/>
-      </a:effectRef>
-      <a:fontRef idx="minor">
-        <a:schemeClr val="lt1"/>
-      </a:fontRef>
-    </dgm:style>
-  </dgm:styleLbl>
-  <dgm:styleLbl name="parChTrans2D1">
-    <dgm:scene3d>
-      <a:camera prst="orthographicFront"/>
-      <a:lightRig rig="threePt" dir="t"/>
-    </dgm:scene3d>
-    <dgm:sp3d/>
-    <dgm:txPr/>
-    <dgm:style>
-      <a:lnRef idx="2">
-        <a:scrgbClr r="0" g="0" b="0"/>
-      </a:lnRef>
-      <a:fillRef idx="1">
-        <a:scrgbClr r="0" g="0" b="0"/>
-      </a:fillRef>
-      <a:effectRef idx="0">
-        <a:scrgbClr r="0" g="0" b="0"/>
-      </a:effectRef>
-      <a:fontRef idx="minor">
-        <a:schemeClr val="lt1"/>
-      </a:fontRef>
-    </dgm:style>
-  </dgm:styleLbl>
-  <dgm:styleLbl name="parChTrans2D2">
-    <dgm:scene3d>
-      <a:camera prst="orthographicFront"/>
-      <a:lightRig rig="threePt" dir="t"/>
-    </dgm:scene3d>
-    <dgm:sp3d/>
-    <dgm:txPr/>
-    <dgm:style>
-      <a:lnRef idx="2">
-        <a:scrgbClr r="0" g="0" b="0"/>
-      </a:lnRef>
-      <a:fillRef idx="1">
-        <a:scrgbClr r="0" g="0" b="0"/>
-      </a:fillRef>
-      <a:effectRef idx="0">
-        <a:scrgbClr r="0" g="0" b="0"/>
-      </a:effectRef>
-      <a:fontRef idx="minor">
-        <a:schemeClr val="lt1"/>
-      </a:fontRef>
-    </dgm:style>
-  </dgm:styleLbl>
-  <dgm:styleLbl name="parChTrans2D3">
-    <dgm:scene3d>
-      <a:camera prst="orthographicFront"/>
-      <a:lightRig rig="threePt" dir="t"/>
-    </dgm:scene3d>
-    <dgm:sp3d/>
-    <dgm:txPr/>
-    <dgm:style>
-      <a:lnRef idx="2">
-        <a:scrgbClr r="0" g="0" b="0"/>
-      </a:lnRef>
-      <a:fillRef idx="1">
-        <a:scrgbClr r="0" g="0" b="0"/>
-      </a:fillRef>
-      <a:effectRef idx="0">
-        <a:scrgbClr r="0" g="0" b="0"/>
-      </a:effectRef>
-      <a:fontRef idx="minor">
-        <a:schemeClr val="lt1"/>
-      </a:fontRef>
-    </dgm:style>
-  </dgm:styleLbl>
-  <dgm:styleLbl name="parChTrans2D4">
-    <dgm:scene3d>
-      <a:camera prst="orthographicFront"/>
-      <a:lightRig rig="threePt" dir="t"/>
-    </dgm:scene3d>
-    <dgm:sp3d/>
-    <dgm:txPr/>
-    <dgm:style>
-      <a:lnRef idx="2">
-        <a:scrgbClr r="0" g="0" b="0"/>
-      </a:lnRef>
-      <a:fillRef idx="1">
-        <a:scrgbClr r="0" g="0" b="0"/>
-      </a:fillRef>
-      <a:effectRef idx="0">
-        <a:scrgbClr r="0" g="0" b="0"/>
-      </a:effectRef>
-      <a:fontRef idx="minor">
-        <a:schemeClr val="lt1"/>
-      </a:fontRef>
-    </dgm:style>
-  </dgm:styleLbl>
-  <dgm:styleLbl name="parChTrans1D1">
-    <dgm:scene3d>
-      <a:camera prst="orthographicFront"/>
-      <a:lightRig rig="threePt" dir="t"/>
-    </dgm:scene3d>
-    <dgm:sp3d/>
-    <dgm:txPr/>
-    <dgm:style>
-      <a:lnRef idx="2">
-        <a:scrgbClr r="0" g="0" b="0"/>
-      </a:lnRef>
-      <a:fillRef idx="0">
-        <a:scrgbClr r="0" g="0" b="0"/>
-      </a:fillRef>
-      <a:effectRef idx="0">
-        <a:scrgbClr r="0" g="0" b="0"/>
-      </a:effectRef>
-      <a:fontRef idx="minor"/>
-    </dgm:style>
-  </dgm:styleLbl>
-  <dgm:styleLbl name="parChTrans1D2">
-    <dgm:scene3d>
-      <a:camera prst="orthographicFront"/>
-      <a:lightRig rig="threePt" dir="t"/>
-    </dgm:scene3d>
-    <dgm:sp3d/>
-    <dgm:txPr/>
-    <dgm:style>
-      <a:lnRef idx="2">
-        <a:scrgbClr r="0" g="0" b="0"/>
-      </a:lnRef>
-      <a:fillRef idx="0">
-        <a:scrgbClr r="0" g="0" b="0"/>
-      </a:fillRef>
-      <a:effectRef idx="0">
-        <a:scrgbClr r="0" g="0" b="0"/>
-      </a:effectRef>
-      <a:fontRef idx="minor"/>
-    </dgm:style>
-  </dgm:styleLbl>
-  <dgm:styleLbl name="parChTrans1D3">
-    <dgm:scene3d>
-      <a:camera prst="orthographicFront"/>
-      <a:lightRig rig="threePt" dir="t"/>
-    </dgm:scene3d>
-    <dgm:sp3d/>
-    <dgm:txPr/>
-    <dgm:style>
-      <a:lnRef idx="2">
-        <a:scrgbClr r="0" g="0" b="0"/>
-      </a:lnRef>
-      <a:fillRef idx="0">
-        <a:scrgbClr r="0" g="0" b="0"/>
-      </a:fillRef>
-      <a:effectRef idx="0">
-        <a:scrgbClr r="0" g="0" b="0"/>
-      </a:effectRef>
-      <a:fontRef idx="minor"/>
-    </dgm:style>
-  </dgm:styleLbl>
-  <dgm:styleLbl name="parChTrans1D4">
-    <dgm:scene3d>
-      <a:camera prst="orthographicFront"/>
-      <a:lightRig rig="threePt" dir="t"/>
-    </dgm:scene3d>
-    <dgm:sp3d/>
-    <dgm:txPr/>
-    <dgm:style>
-      <a:lnRef idx="2">
-        <a:scrgbClr r="0" g="0" b="0"/>
-      </a:lnRef>
-      <a:fillRef idx="0">
-        <a:scrgbClr r="0" g="0" b="0"/>
-      </a:fillRef>
-      <a:effectRef idx="0">
-        <a:scrgbClr r="0" g="0" b="0"/>
-      </a:effectRef>
-      <a:fontRef idx="minor"/>
-    </dgm:style>
-  </dgm:styleLbl>
-  <dgm:styleLbl name="fgAcc1">
-    <dgm:scene3d>
-      <a:camera prst="orthographicFront"/>
-      <a:lightRig rig="threePt" dir="t"/>
-    </dgm:scene3d>
-    <dgm:sp3d/>
-    <dgm:txPr/>
-    <dgm:style>
-      <a:lnRef idx="2">
-        <a:scrgbClr r="0" g="0" b="0"/>
-      </a:lnRef>
-      <a:fillRef idx="1">
-        <a:scrgbClr r="0" g="0" b="0"/>
-      </a:fillRef>
-      <a:effectRef idx="0">
-        <a:scrgbClr r="0" g="0" b="0"/>
-      </a:effectRef>
-      <a:fontRef idx="minor"/>
-    </dgm:style>
-  </dgm:styleLbl>
-  <dgm:styleLbl name="conFgAcc1">
-    <dgm:scene3d>
-      <a:camera prst="orthographicFront"/>
-      <a:lightRig rig="threePt" dir="t"/>
-    </dgm:scene3d>
-    <dgm:sp3d/>
-    <dgm:txPr/>
-    <dgm:style>
-      <a:lnRef idx="2">
-        <a:scrgbClr r="0" g="0" b="0"/>
-      </a:lnRef>
-      <a:fillRef idx="1">
-        <a:scrgbClr r="0" g="0" b="0"/>
-      </a:fillRef>
-      <a:effectRef idx="0">
-        <a:scrgbClr r="0" g="0" b="0"/>
-      </a:effectRef>
-      <a:fontRef idx="minor"/>
-    </dgm:style>
-  </dgm:styleLbl>
-  <dgm:styleLbl name="alignAcc1">
-    <dgm:scene3d>
-      <a:camera prst="orthographicFront"/>
-      <a:lightRig rig="threePt" dir="t"/>
-    </dgm:scene3d>
-    <dgm:sp3d/>
-    <dgm:txPr/>
-    <dgm:style>
-      <a:lnRef idx="2">
-        <a:scrgbClr r="0" g="0" b="0"/>
-      </a:lnRef>
-      <a:fillRef idx="1">
-        <a:scrgbClr r="0" g="0" b="0"/>
-      </a:fillRef>
-      <a:effectRef idx="0">
-        <a:scrgbClr r="0" g="0" b="0"/>
-      </a:effectRef>
-      <a:fontRef idx="minor"/>
-    </dgm:style>
-  </dgm:styleLbl>
-  <dgm:styleLbl name="trAlignAcc1">
-    <dgm:scene3d>
-      <a:camera prst="orthographicFront"/>
-      <a:lightRig rig="threePt" dir="t"/>
-    </dgm:scene3d>
-    <dgm:sp3d/>
-    <dgm:txPr/>
-    <dgm:style>
-      <a:lnRef idx="1">
-        <a:scrgbClr r="0" g="0" b="0"/>
-      </a:lnRef>
-      <a:fillRef idx="1">
-        <a:scrgbClr r="0" g="0" b="0"/>
-      </a:fillRef>
-      <a:effectRef idx="0">
-        <a:scrgbClr r="0" g="0" b="0"/>
-      </a:effectRef>
-      <a:fontRef idx="minor"/>
-    </dgm:style>
-  </dgm:styleLbl>
-  <dgm:styleLbl name="bgAcc1">
-    <dgm:scene3d>
-      <a:camera prst="orthographicFront"/>
-      <a:lightRig rig="threePt" dir="t"/>
-    </dgm:scene3d>
-    <dgm:sp3d/>
-    <dgm:txPr/>
-    <dgm:style>
-      <a:lnRef idx="2">
-        <a:scrgbClr r="0" g="0" b="0"/>
-      </a:lnRef>
-      <a:fillRef idx="1">
-        <a:scrgbClr r="0" g="0" b="0"/>
-      </a:fillRef>
-      <a:effectRef idx="0">
-        <a:scrgbClr r="0" g="0" b="0"/>
-      </a:effectRef>
-      <a:fontRef idx="minor"/>
-    </dgm:style>
-  </dgm:styleLbl>
-  <dgm:styleLbl name="solidFgAcc1">
-    <dgm:scene3d>
-      <a:camera prst="orthographicFront"/>
-      <a:lightRig rig="threePt" dir="t"/>
-    </dgm:scene3d>
-    <dgm:sp3d/>
-    <dgm:txPr/>
-    <dgm:style>
-      <a:lnRef idx="2">
-        <a:scrgbClr r="0" g="0" b="0"/>
-      </a:lnRef>
-      <a:fillRef idx="1">
-        <a:scrgbClr r="0" g="0" b="0"/>
-      </a:fillRef>
-      <a:effectRef idx="0">
-        <a:scrgbClr r="0" g="0" b="0"/>
-      </a:effectRef>
-      <a:fontRef idx="minor"/>
-    </dgm:style>
-  </dgm:styleLbl>
-  <dgm:styleLbl name="solidAlignAcc1">
-    <dgm:scene3d>
-      <a:camera prst="orthographicFront"/>
-      <a:lightRig rig="threePt" dir="t"/>
-    </dgm:scene3d>
-    <dgm:sp3d/>
-    <dgm:txPr/>
-    <dgm:style>
-      <a:lnRef idx="2">
-        <a:scrgbClr r="0" g="0" b="0"/>
-      </a:lnRef>
-      <a:fillRef idx="1">
-        <a:scrgbClr r="0" g="0" b="0"/>
-      </a:fillRef>
-      <a:effectRef idx="0">
-        <a:scrgbClr r="0" g="0" b="0"/>
-      </a:effectRef>
-      <a:fontRef idx="minor"/>
-    </dgm:style>
-  </dgm:styleLbl>
-  <dgm:styleLbl name="solidBgAcc1">
-    <dgm:scene3d>
-      <a:camera prst="orthographicFront"/>
-      <a:lightRig rig="threePt" dir="t"/>
-    </dgm:scene3d>
-    <dgm:sp3d/>
-    <dgm:txPr/>
-    <dgm:style>
-      <a:lnRef idx="2">
-        <a:scrgbClr r="0" g="0" b="0"/>
-      </a:lnRef>
-      <a:fillRef idx="1">
-        <a:scrgbClr r="0" g="0" b="0"/>
-      </a:fillRef>
-      <a:effectRef idx="0">
-        <a:scrgbClr r="0" g="0" b="0"/>
-      </a:effectRef>
-      <a:fontRef idx="minor"/>
-    </dgm:style>
-  </dgm:styleLbl>
-  <dgm:styleLbl name="fgAccFollowNode1">
-    <dgm:scene3d>
-      <a:camera prst="orthographicFront"/>
-      <a:lightRig rig="threePt" dir="t"/>
-    </dgm:scene3d>
-    <dgm:sp3d/>
-    <dgm:txPr/>
-    <dgm:style>
-      <a:lnRef idx="2">
-        <a:scrgbClr r="0" g="0" b="0"/>
-      </a:lnRef>
-      <a:fillRef idx="1">
-        <a:scrgbClr r="0" g="0" b="0"/>
-      </a:fillRef>
-      <a:effectRef idx="0">
-        <a:scrgbClr r="0" g="0" b="0"/>
-      </a:effectRef>
-      <a:fontRef idx="minor"/>
-    </dgm:style>
-  </dgm:styleLbl>
-  <dgm:styleLbl name="alignAccFollowNode1">
-    <dgm:scene3d>
-      <a:camera prst="orthographicFront"/>
-      <a:lightRig rig="threePt" dir="t"/>
-    </dgm:scene3d>
-    <dgm:sp3d/>
-    <dgm:txPr/>
-    <dgm:style>
-      <a:lnRef idx="2">
-        <a:scrgbClr r="0" g="0" b="0"/>
-      </a:lnRef>
-      <a:fillRef idx="1">
-        <a:scrgbClr r="0" g="0" b="0"/>
-      </a:fillRef>
-      <a:effectRef idx="0">
-        <a:scrgbClr r="0" g="0" b="0"/>
-      </a:effectRef>
-      <a:fontRef idx="minor"/>
-    </dgm:style>
-  </dgm:styleLbl>
-  <dgm:styleLbl name="bgAccFollowNode1">
-    <dgm:scene3d>
-      <a:camera prst="orthographicFront"/>
-      <a:lightRig rig="threePt" dir="t"/>
-    </dgm:scene3d>
-    <dgm:sp3d/>
-    <dgm:txPr/>
-    <dgm:style>
-      <a:lnRef idx="2">
-        <a:scrgbClr r="0" g="0" b="0"/>
-      </a:lnRef>
-      <a:fillRef idx="1">
-        <a:scrgbClr r="0" g="0" b="0"/>
-      </a:fillRef>
-      <a:effectRef idx="0">
-        <a:scrgbClr r="0" g="0" b="0"/>
-      </a:effectRef>
-      <a:fontRef idx="minor"/>
-    </dgm:style>
-  </dgm:styleLbl>
-  <dgm:styleLbl name="fgAcc0">
-    <dgm:scene3d>
-      <a:camera prst="orthographicFront"/>
-      <a:lightRig rig="threePt" dir="t"/>
-    </dgm:scene3d>
-    <dgm:sp3d/>
-    <dgm:txPr/>
-    <dgm:style>
-      <a:lnRef idx="2">
-        <a:scrgbClr r="0" g="0" b="0"/>
-      </a:lnRef>
-      <a:fillRef idx="1">
-        <a:scrgbClr r="0" g="0" b="0"/>
-      </a:fillRef>
-      <a:effectRef idx="0">
-        <a:scrgbClr r="0" g="0" b="0"/>
-      </a:effectRef>
-      <a:fontRef idx="minor"/>
-    </dgm:style>
-  </dgm:styleLbl>
-  <dgm:styleLbl name="fgAcc2">
-    <dgm:scene3d>
-      <a:camera prst="orthographicFront"/>
-      <a:lightRig rig="threePt" dir="t"/>
-    </dgm:scene3d>
-    <dgm:sp3d/>
-    <dgm:txPr/>
-    <dgm:style>
-      <a:lnRef idx="2">
-        <a:scrgbClr r="0" g="0" b="0"/>
-      </a:lnRef>
-      <a:fillRef idx="1">
-        <a:scrgbClr r="0" g="0" b="0"/>
-      </a:fillRef>
-      <a:effectRef idx="0">
-        <a:scrgbClr r="0" g="0" b="0"/>
-      </a:effectRef>
-      <a:fontRef idx="minor"/>
-    </dgm:style>
-  </dgm:styleLbl>
-  <dgm:styleLbl name="fgAcc3">
-    <dgm:scene3d>
-      <a:camera prst="orthographicFront"/>
-      <a:lightRig rig="threePt" dir="t"/>
-    </dgm:scene3d>
-    <dgm:sp3d/>
-    <dgm:txPr/>
-    <dgm:style>
-      <a:lnRef idx="2">
-        <a:scrgbClr r="0" g="0" b="0"/>
-      </a:lnRef>
-      <a:fillRef idx="1">
-        <a:scrgbClr r="0" g="0" b="0"/>
-      </a:fillRef>
-      <a:effectRef idx="0">
-        <a:scrgbClr r="0" g="0" b="0"/>
-      </a:effectRef>
-      <a:fontRef idx="minor"/>
-    </dgm:style>
-  </dgm:styleLbl>
-  <dgm:styleLbl name="fgAcc4">
-    <dgm:scene3d>
-      <a:camera prst="orthographicFront"/>
-      <a:lightRig rig="threePt" dir="t"/>
-    </dgm:scene3d>
-    <dgm:sp3d/>
-    <dgm:txPr/>
-    <dgm:style>
-      <a:lnRef idx="2">
-        <a:scrgbClr r="0" g="0" b="0"/>
-      </a:lnRef>
-      <a:fillRef idx="1">
-        <a:scrgbClr r="0" g="0" b="0"/>
-      </a:fillRef>
-      <a:effectRef idx="0">
-        <a:scrgbClr r="0" g="0" b="0"/>
-      </a:effectRef>
-      <a:fontRef idx="minor"/>
-    </dgm:style>
-  </dgm:styleLbl>
-  <dgm:styleLbl name="bgShp">
-    <dgm:scene3d>
-      <a:camera prst="orthographicFront"/>
-      <a:lightRig rig="threePt" dir="t"/>
-    </dgm:scene3d>
-    <dgm:sp3d/>
-    <dgm:txPr/>
-    <dgm:style>
-      <a:lnRef idx="0">
-        <a:scrgbClr r="0" g="0" b="0"/>
-      </a:lnRef>
-      <a:fillRef idx="1">
-        <a:scrgbClr r="0" g="0" b="0"/>
-      </a:fillRef>
-      <a:effectRef idx="0">
-        <a:scrgbClr r="0" g="0" b="0"/>
-      </a:effectRef>
-      <a:fontRef idx="minor"/>
-    </dgm:style>
-  </dgm:styleLbl>
-  <dgm:styleLbl name="dkBgShp">
-    <dgm:scene3d>
-      <a:camera prst="orthographicFront"/>
-      <a:lightRig rig="threePt" dir="t"/>
-    </dgm:scene3d>
-    <dgm:sp3d/>
-    <dgm:txPr/>
-    <dgm:style>
-      <a:lnRef idx="0">
-        <a:scrgbClr r="0" g="0" b="0"/>
-      </a:lnRef>
-      <a:fillRef idx="1">
-        <a:scrgbClr r="0" g="0" b="0"/>
-      </a:fillRef>
-      <a:effectRef idx="0">
-        <a:scrgbClr r="0" g="0" b="0"/>
-      </a:effectRef>
-      <a:fontRef idx="minor"/>
-    </dgm:style>
-  </dgm:styleLbl>
-  <dgm:styleLbl name="trBgShp">
-    <dgm:scene3d>
-      <a:camera prst="orthographicFront"/>
-      <a:lightRig rig="threePt" dir="t"/>
-    </dgm:scene3d>
-    <dgm:sp3d/>
-    <dgm:txPr/>
-    <dgm:style>
-      <a:lnRef idx="0">
-        <a:scrgbClr r="0" g="0" b="0"/>
-      </a:lnRef>
-      <a:fillRef idx="1">
-        <a:scrgbClr r="0" g="0" b="0"/>
-      </a:fillRef>
-      <a:effectRef idx="0">
-        <a:scrgbClr r="0" g="0" b="0"/>
-      </a:effectRef>
-      <a:fontRef idx="minor"/>
-    </dgm:style>
-  </dgm:styleLbl>
-  <dgm:styleLbl name="fgShp">
-    <dgm:scene3d>
-      <a:camera prst="orthographicFront"/>
-      <a:lightRig rig="threePt" dir="t"/>
-    </dgm:scene3d>
-    <dgm:sp3d/>
-    <dgm:txPr/>
-    <dgm:style>
-      <a:lnRef idx="2">
-        <a:scrgbClr r="0" g="0" b="0"/>
-      </a:lnRef>
-      <a:fillRef idx="1">
-        <a:scrgbClr r="0" g="0" b="0"/>
-      </a:fillRef>
-      <a:effectRef idx="0">
-        <a:scrgbClr r="0" g="0" b="0"/>
-      </a:effectRef>
-      <a:fontRef idx="minor"/>
-    </dgm:style>
-  </dgm:styleLbl>
-  <dgm:styleLbl name="revTx">
-    <dgm:scene3d>
-      <a:camera prst="orthographicFront"/>
-      <a:lightRig rig="threePt" dir="t"/>
-    </dgm:scene3d>
-    <dgm:sp3d/>
-    <dgm:txPr/>
-    <dgm:style>
-      <a:lnRef idx="0">
-        <a:scrgbClr r="0" g="0" b="0"/>
-      </a:lnRef>
-      <a:fillRef idx="0">
-        <a:scrgbClr r="0" g="0" b="0"/>
-      </a:fillRef>
-      <a:effectRef idx="0">
-        <a:scrgbClr r="0" g="0" b="0"/>
-      </a:effectRef>
-      <a:fontRef idx="minor"/>
-    </dgm:style>
-  </dgm:styleLbl>
-</dgm:styleDef>
 </file>
 
 <file path=ppt/slideLayouts/slideLayout1.xml><?xml version="1.0" encoding="utf-8"?>
@@ -17155,488 +14397,6 @@
       </p:grpSpPr>
       <p:sp>
         <p:nvSpPr>
-          <p:cNvPr id="4" name="Título 1">
-            <a:extLst>
-              <a:ext uri="{FF2B5EF4-FFF2-40B4-BE49-F238E27FC236}">
-                <a16:creationId xmlns:a16="http://schemas.microsoft.com/office/drawing/2014/main" id="{4A70FBBF-6280-476B-BEB6-140ADEBC943A}"/>
-              </a:ext>
-            </a:extLst>
-          </p:cNvPr>
-          <p:cNvSpPr txBox="1">
-            <a:spLocks/>
-          </p:cNvSpPr>
-          <p:nvPr/>
-        </p:nvSpPr>
-        <p:spPr>
-          <a:xfrm>
-            <a:off x="838200" y="313882"/>
-            <a:ext cx="10515600" cy="1325563"/>
-          </a:xfrm>
-          <a:prstGeom prst="rect">
-            <a:avLst/>
-          </a:prstGeom>
-        </p:spPr>
-        <p:txBody>
-          <a:bodyPr vert="horz" lIns="91440" tIns="45720" rIns="91440" bIns="45720" rtlCol="0" anchor="ctr">
-            <a:normAutofit/>
-          </a:bodyPr>
-          <a:lstStyle>
-            <a:lvl1pPr algn="l" defTabSz="914400" rtl="0" eaLnBrk="1" latinLnBrk="0" hangingPunct="1">
-              <a:lnSpc>
-                <a:spcPct val="90000"/>
-              </a:lnSpc>
-              <a:spcBef>
-                <a:spcPct val="0"/>
-              </a:spcBef>
-              <a:buNone/>
-              <a:defRPr sz="4000" i="1" kern="1200">
-                <a:solidFill>
-                  <a:schemeClr val="tx1"/>
-                </a:solidFill>
-                <a:latin typeface="+mj-lt"/>
-                <a:ea typeface="+mj-ea"/>
-                <a:cs typeface="+mj-cs"/>
-              </a:defRPr>
-            </a:lvl1pPr>
-          </a:lstStyle>
-          <a:p>
-            <a:r>
-              <a:rPr lang="es-CO" b="1" dirty="0">
-                <a:solidFill>
-                  <a:srgbClr val="24292E"/>
-                </a:solidFill>
-                <a:latin typeface="-apple-system"/>
-              </a:rPr>
-              <a:t>Diagrama de despliegue</a:t>
-            </a:r>
-            <a:endParaRPr lang="es-CO" b="1" i="0" dirty="0">
-              <a:solidFill>
-                <a:srgbClr val="24292E"/>
-              </a:solidFill>
-              <a:latin typeface="-apple-system"/>
-            </a:endParaRPr>
-          </a:p>
-        </p:txBody>
-      </p:sp>
-      <p:pic>
-        <p:nvPicPr>
-          <p:cNvPr id="2" name="Imagen 1">
-            <a:extLst>
-              <a:ext uri="{FF2B5EF4-FFF2-40B4-BE49-F238E27FC236}">
-                <a16:creationId xmlns:a16="http://schemas.microsoft.com/office/drawing/2014/main" id="{6B9FD2A0-3259-447A-A6F9-66DEA0500292}"/>
-              </a:ext>
-            </a:extLst>
-          </p:cNvPr>
-          <p:cNvPicPr>
-            <a:picLocks noChangeAspect="1"/>
-          </p:cNvPicPr>
-          <p:nvPr/>
-        </p:nvPicPr>
-        <p:blipFill>
-          <a:blip r:embed="rId2"/>
-          <a:stretch>
-            <a:fillRect/>
-          </a:stretch>
-        </p:blipFill>
-        <p:spPr>
-          <a:xfrm>
-            <a:off x="2276668" y="1336891"/>
-            <a:ext cx="7107311" cy="5381150"/>
-          </a:xfrm>
-          <a:prstGeom prst="rect">
-            <a:avLst/>
-          </a:prstGeom>
-        </p:spPr>
-      </p:pic>
-      <p:sp>
-        <p:nvSpPr>
-          <p:cNvPr id="3" name="CuadroTexto 2">
-            <a:extLst>
-              <a:ext uri="{FF2B5EF4-FFF2-40B4-BE49-F238E27FC236}">
-                <a16:creationId xmlns:a16="http://schemas.microsoft.com/office/drawing/2014/main" id="{CB4EEE1B-871B-4121-AE56-6570544D978A}"/>
-              </a:ext>
-            </a:extLst>
-          </p:cNvPr>
-          <p:cNvSpPr txBox="1"/>
-          <p:nvPr/>
-        </p:nvSpPr>
-        <p:spPr>
-          <a:xfrm>
-            <a:off x="5318449" y="2239347"/>
-            <a:ext cx="1138335" cy="261610"/>
-          </a:xfrm>
-          <a:prstGeom prst="rect">
-            <a:avLst/>
-          </a:prstGeom>
-          <a:noFill/>
-        </p:spPr>
-        <p:txBody>
-          <a:bodyPr wrap="square" rtlCol="0">
-            <a:spAutoFit/>
-          </a:bodyPr>
-          <a:lstStyle/>
-          <a:p>
-            <a:r>
-              <a:rPr lang="es-MX" sz="1100" dirty="0"/>
-              <a:t>&lt;&lt;</a:t>
-            </a:r>
-            <a:r>
-              <a:rPr lang="es-MX" sz="1100" dirty="0" err="1"/>
-              <a:t>protocol</a:t>
-            </a:r>
-            <a:r>
-              <a:rPr lang="es-MX" sz="1100" dirty="0"/>
-              <a:t>&gt;&gt;</a:t>
-            </a:r>
-            <a:endParaRPr lang="es-CO" sz="1100" dirty="0"/>
-          </a:p>
-        </p:txBody>
-      </p:sp>
-      <p:sp>
-        <p:nvSpPr>
-          <p:cNvPr id="5" name="CuadroTexto 4">
-            <a:extLst>
-              <a:ext uri="{FF2B5EF4-FFF2-40B4-BE49-F238E27FC236}">
-                <a16:creationId xmlns:a16="http://schemas.microsoft.com/office/drawing/2014/main" id="{E24FB7D9-1343-4900-8019-EC6C483388F6}"/>
-              </a:ext>
-            </a:extLst>
-          </p:cNvPr>
-          <p:cNvSpPr txBox="1"/>
-          <p:nvPr/>
-        </p:nvSpPr>
-        <p:spPr>
-          <a:xfrm>
-            <a:off x="5452673" y="2662454"/>
-            <a:ext cx="1138335" cy="261610"/>
-          </a:xfrm>
-          <a:prstGeom prst="rect">
-            <a:avLst/>
-          </a:prstGeom>
-          <a:noFill/>
-        </p:spPr>
-        <p:txBody>
-          <a:bodyPr wrap="square" rtlCol="0">
-            <a:spAutoFit/>
-          </a:bodyPr>
-          <a:lstStyle/>
-          <a:p>
-            <a:r>
-              <a:rPr lang="es-MX" sz="1100" dirty="0"/>
-              <a:t>HTTP:8080</a:t>
-            </a:r>
-            <a:endParaRPr lang="es-CO" sz="1100" dirty="0"/>
-          </a:p>
-        </p:txBody>
-      </p:sp>
-      <p:sp>
-        <p:nvSpPr>
-          <p:cNvPr id="9" name="CuadroTexto 8">
-            <a:extLst>
-              <a:ext uri="{FF2B5EF4-FFF2-40B4-BE49-F238E27FC236}">
-                <a16:creationId xmlns:a16="http://schemas.microsoft.com/office/drawing/2014/main" id="{20107866-B5B3-43C4-AE94-F27B52D21EF2}"/>
-              </a:ext>
-            </a:extLst>
-          </p:cNvPr>
-          <p:cNvSpPr txBox="1"/>
-          <p:nvPr/>
-        </p:nvSpPr>
-        <p:spPr>
-          <a:xfrm>
-            <a:off x="6885850" y="4203769"/>
-            <a:ext cx="1138335" cy="261610"/>
-          </a:xfrm>
-          <a:prstGeom prst="rect">
-            <a:avLst/>
-          </a:prstGeom>
-          <a:noFill/>
-        </p:spPr>
-        <p:txBody>
-          <a:bodyPr wrap="square" rtlCol="0">
-            <a:spAutoFit/>
-          </a:bodyPr>
-          <a:lstStyle/>
-          <a:p>
-            <a:r>
-              <a:rPr lang="es-MX" sz="1100" dirty="0"/>
-              <a:t>&lt;&lt;</a:t>
-            </a:r>
-            <a:r>
-              <a:rPr lang="es-MX" sz="1100" dirty="0" err="1"/>
-              <a:t>protocol</a:t>
-            </a:r>
-            <a:r>
-              <a:rPr lang="es-MX" sz="1100" dirty="0"/>
-              <a:t>&gt;&gt;</a:t>
-            </a:r>
-            <a:endParaRPr lang="es-CO" sz="1100" dirty="0"/>
-          </a:p>
-        </p:txBody>
-      </p:sp>
-      <p:sp>
-        <p:nvSpPr>
-          <p:cNvPr id="11" name="CuadroTexto 10">
-            <a:extLst>
-              <a:ext uri="{FF2B5EF4-FFF2-40B4-BE49-F238E27FC236}">
-                <a16:creationId xmlns:a16="http://schemas.microsoft.com/office/drawing/2014/main" id="{B88684C4-EAAE-4E34-809B-5D19A74AD07D}"/>
-              </a:ext>
-            </a:extLst>
-          </p:cNvPr>
-          <p:cNvSpPr txBox="1"/>
-          <p:nvPr/>
-        </p:nvSpPr>
-        <p:spPr>
-          <a:xfrm>
-            <a:off x="8024185" y="4203769"/>
-            <a:ext cx="1138335" cy="261610"/>
-          </a:xfrm>
-          <a:prstGeom prst="rect">
-            <a:avLst/>
-          </a:prstGeom>
-          <a:noFill/>
-        </p:spPr>
-        <p:txBody>
-          <a:bodyPr wrap="square" rtlCol="0">
-            <a:spAutoFit/>
-          </a:bodyPr>
-          <a:lstStyle/>
-          <a:p>
-            <a:r>
-              <a:rPr lang="es-MX" sz="1100" dirty="0"/>
-              <a:t>HTTP:80</a:t>
-            </a:r>
-            <a:endParaRPr lang="es-CO" sz="1100" dirty="0"/>
-          </a:p>
-        </p:txBody>
-      </p:sp>
-      <p:sp>
-        <p:nvSpPr>
-          <p:cNvPr id="13" name="CuadroTexto 12">
-            <a:extLst>
-              <a:ext uri="{FF2B5EF4-FFF2-40B4-BE49-F238E27FC236}">
-                <a16:creationId xmlns:a16="http://schemas.microsoft.com/office/drawing/2014/main" id="{937199CA-6262-426E-9F37-2299BD42C3CA}"/>
-              </a:ext>
-            </a:extLst>
-          </p:cNvPr>
-          <p:cNvSpPr txBox="1"/>
-          <p:nvPr/>
-        </p:nvSpPr>
-        <p:spPr>
-          <a:xfrm>
-            <a:off x="3683994" y="4078285"/>
-            <a:ext cx="1138335" cy="261610"/>
-          </a:xfrm>
-          <a:prstGeom prst="rect">
-            <a:avLst/>
-          </a:prstGeom>
-          <a:noFill/>
-        </p:spPr>
-        <p:txBody>
-          <a:bodyPr wrap="square" rtlCol="0">
-            <a:spAutoFit/>
-          </a:bodyPr>
-          <a:lstStyle/>
-          <a:p>
-            <a:r>
-              <a:rPr lang="es-MX" sz="1100" dirty="0"/>
-              <a:t>Port: 5432</a:t>
-            </a:r>
-            <a:endParaRPr lang="es-CO" sz="1100" dirty="0"/>
-          </a:p>
-        </p:txBody>
-      </p:sp>
-      <p:sp>
-        <p:nvSpPr>
-          <p:cNvPr id="15" name="CuadroTexto 14">
-            <a:extLst>
-              <a:ext uri="{FF2B5EF4-FFF2-40B4-BE49-F238E27FC236}">
-                <a16:creationId xmlns:a16="http://schemas.microsoft.com/office/drawing/2014/main" id="{5F9E0C64-61AE-4526-B34E-E9FD99EB7638}"/>
-              </a:ext>
-            </a:extLst>
-          </p:cNvPr>
-          <p:cNvSpPr txBox="1"/>
-          <p:nvPr/>
-        </p:nvSpPr>
-        <p:spPr>
-          <a:xfrm>
-            <a:off x="2808021" y="4078285"/>
-            <a:ext cx="1138335" cy="261610"/>
-          </a:xfrm>
-          <a:prstGeom prst="rect">
-            <a:avLst/>
-          </a:prstGeom>
-          <a:noFill/>
-        </p:spPr>
-        <p:txBody>
-          <a:bodyPr wrap="square" rtlCol="0">
-            <a:spAutoFit/>
-          </a:bodyPr>
-          <a:lstStyle/>
-          <a:p>
-            <a:r>
-              <a:rPr lang="es-MX" sz="1100" dirty="0"/>
-              <a:t>&lt;&lt;JDBC&gt;&gt;</a:t>
-            </a:r>
-            <a:endParaRPr lang="es-CO" sz="1100" dirty="0"/>
-          </a:p>
-        </p:txBody>
-      </p:sp>
-    </p:spTree>
-    <p:extLst>
-      <p:ext uri="{BB962C8B-B14F-4D97-AF65-F5344CB8AC3E}">
-        <p14:creationId xmlns:p14="http://schemas.microsoft.com/office/powerpoint/2010/main" val="3999526091"/>
-      </p:ext>
-    </p:extLst>
-  </p:cSld>
-  <p:clrMapOvr>
-    <a:masterClrMapping/>
-  </p:clrMapOvr>
-</p:sld>
-</file>
-
-<file path=ppt/slides/slide11.xml><?xml version="1.0" encoding="utf-8"?>
-<p:sld xmlns:a="http://schemas.openxmlformats.org/drawingml/2006/main" xmlns:r="http://schemas.openxmlformats.org/officeDocument/2006/relationships" xmlns:p="http://schemas.openxmlformats.org/presentationml/2006/main">
-  <p:cSld>
-    <p:spTree>
-      <p:nvGrpSpPr>
-        <p:cNvPr id="1" name=""/>
-        <p:cNvGrpSpPr/>
-        <p:nvPr/>
-      </p:nvGrpSpPr>
-      <p:grpSpPr>
-        <a:xfrm>
-          <a:off x="0" y="0"/>
-          <a:ext cx="0" cy="0"/>
-          <a:chOff x="0" y="0"/>
-          <a:chExt cx="0" cy="0"/>
-        </a:xfrm>
-      </p:grpSpPr>
-      <p:sp>
-        <p:nvSpPr>
-          <p:cNvPr id="4" name="Título 1">
-            <a:extLst>
-              <a:ext uri="{FF2B5EF4-FFF2-40B4-BE49-F238E27FC236}">
-                <a16:creationId xmlns:a16="http://schemas.microsoft.com/office/drawing/2014/main" id="{4A70FBBF-6280-476B-BEB6-140ADEBC943A}"/>
-              </a:ext>
-            </a:extLst>
-          </p:cNvPr>
-          <p:cNvSpPr txBox="1">
-            <a:spLocks/>
-          </p:cNvSpPr>
-          <p:nvPr/>
-        </p:nvSpPr>
-        <p:spPr>
-          <a:xfrm>
-            <a:off x="838200" y="313882"/>
-            <a:ext cx="10515600" cy="1325563"/>
-          </a:xfrm>
-          <a:prstGeom prst="rect">
-            <a:avLst/>
-          </a:prstGeom>
-        </p:spPr>
-        <p:txBody>
-          <a:bodyPr vert="horz" lIns="91440" tIns="45720" rIns="91440" bIns="45720" rtlCol="0" anchor="ctr">
-            <a:normAutofit/>
-          </a:bodyPr>
-          <a:lstStyle>
-            <a:lvl1pPr algn="l" defTabSz="914400" rtl="0" eaLnBrk="1" latinLnBrk="0" hangingPunct="1">
-              <a:lnSpc>
-                <a:spcPct val="90000"/>
-              </a:lnSpc>
-              <a:spcBef>
-                <a:spcPct val="0"/>
-              </a:spcBef>
-              <a:buNone/>
-              <a:defRPr sz="4000" i="1" kern="1200">
-                <a:solidFill>
-                  <a:schemeClr val="tx1"/>
-                </a:solidFill>
-                <a:latin typeface="+mj-lt"/>
-                <a:ea typeface="+mj-ea"/>
-                <a:cs typeface="+mj-cs"/>
-              </a:defRPr>
-            </a:lvl1pPr>
-          </a:lstStyle>
-          <a:p>
-            <a:r>
-              <a:rPr lang="es-CO" b="1">
-                <a:solidFill>
-                  <a:srgbClr val="24292E"/>
-                </a:solidFill>
-                <a:latin typeface="-apple-system"/>
-              </a:rPr>
-              <a:t>Test Coverage</a:t>
-            </a:r>
-            <a:endParaRPr lang="es-CO" b="1" i="0" dirty="0">
-              <a:solidFill>
-                <a:srgbClr val="24292E"/>
-              </a:solidFill>
-              <a:latin typeface="-apple-system"/>
-            </a:endParaRPr>
-          </a:p>
-        </p:txBody>
-      </p:sp>
-      <p:pic>
-        <p:nvPicPr>
-          <p:cNvPr id="6" name="Imagen 5">
-            <a:extLst>
-              <a:ext uri="{FF2B5EF4-FFF2-40B4-BE49-F238E27FC236}">
-                <a16:creationId xmlns:a16="http://schemas.microsoft.com/office/drawing/2014/main" id="{F3FFF914-E25D-4A23-8226-EAFE461E0284}"/>
-              </a:ext>
-            </a:extLst>
-          </p:cNvPr>
-          <p:cNvPicPr>
-            <a:picLocks noChangeAspect="1"/>
-          </p:cNvPicPr>
-          <p:nvPr/>
-        </p:nvPicPr>
-        <p:blipFill>
-          <a:blip r:embed="rId2"/>
-          <a:stretch>
-            <a:fillRect/>
-          </a:stretch>
-        </p:blipFill>
-        <p:spPr>
-          <a:xfrm>
-            <a:off x="1271587" y="2609850"/>
-            <a:ext cx="9648825" cy="1638300"/>
-          </a:xfrm>
-          <a:prstGeom prst="rect">
-            <a:avLst/>
-          </a:prstGeom>
-        </p:spPr>
-      </p:pic>
-    </p:spTree>
-    <p:extLst>
-      <p:ext uri="{BB962C8B-B14F-4D97-AF65-F5344CB8AC3E}">
-        <p14:creationId xmlns:p14="http://schemas.microsoft.com/office/powerpoint/2010/main" val="2250830390"/>
-      </p:ext>
-    </p:extLst>
-  </p:cSld>
-  <p:clrMapOvr>
-    <a:masterClrMapping/>
-  </p:clrMapOvr>
-</p:sld>
-</file>
-
-<file path=ppt/slides/slide12.xml><?xml version="1.0" encoding="utf-8"?>
-<p:sld xmlns:a="http://schemas.openxmlformats.org/drawingml/2006/main" xmlns:r="http://schemas.openxmlformats.org/officeDocument/2006/relationships" xmlns:p="http://schemas.openxmlformats.org/presentationml/2006/main">
-  <p:cSld>
-    <p:spTree>
-      <p:nvGrpSpPr>
-        <p:cNvPr id="1" name=""/>
-        <p:cNvGrpSpPr/>
-        <p:nvPr/>
-      </p:nvGrpSpPr>
-      <p:grpSpPr>
-        <a:xfrm>
-          <a:off x="0" y="0"/>
-          <a:ext cx="0" cy="0"/>
-          <a:chOff x="0" y="0"/>
-          <a:chExt cx="0" cy="0"/>
-        </a:xfrm>
-      </p:grpSpPr>
-      <p:sp>
-        <p:nvSpPr>
           <p:cNvPr id="2" name="Título 1">
             <a:extLst>
               <a:ext uri="{FF2B5EF4-FFF2-40B4-BE49-F238E27FC236}">
@@ -17743,7 +14503,7 @@
 </p:sld>
 </file>
 
-<file path=ppt/slides/slide13.xml><?xml version="1.0" encoding="utf-8"?>
+<file path=ppt/slides/slide11.xml><?xml version="1.0" encoding="utf-8"?>
 <p:sld xmlns:a="http://schemas.openxmlformats.org/drawingml/2006/main" xmlns:r="http://schemas.openxmlformats.org/officeDocument/2006/relationships" xmlns:p="http://schemas.openxmlformats.org/presentationml/2006/main">
   <p:cSld>
     <p:bg>
@@ -21479,806 +18239,6 @@
 <file path=ppt/slides/slide3.xml><?xml version="1.0" encoding="utf-8"?>
 <p:sld xmlns:a="http://schemas.openxmlformats.org/drawingml/2006/main" xmlns:r="http://schemas.openxmlformats.org/officeDocument/2006/relationships" xmlns:p="http://schemas.openxmlformats.org/presentationml/2006/main">
   <p:cSld>
-    <p:bg>
-      <p:bgPr>
-        <a:solidFill>
-          <a:schemeClr val="bg1"/>
-        </a:solidFill>
-        <a:effectLst/>
-      </p:bgPr>
-    </p:bg>
-    <p:spTree>
-      <p:nvGrpSpPr>
-        <p:cNvPr id="1" name=""/>
-        <p:cNvGrpSpPr/>
-        <p:nvPr/>
-      </p:nvGrpSpPr>
-      <p:grpSpPr>
-        <a:xfrm>
-          <a:off x="0" y="0"/>
-          <a:ext cx="0" cy="0"/>
-          <a:chOff x="0" y="0"/>
-          <a:chExt cx="0" cy="0"/>
-        </a:xfrm>
-      </p:grpSpPr>
-      <p:sp useBgFill="1">
-        <p:nvSpPr>
-          <p:cNvPr id="9" name="Rectangle 8">
-            <a:extLst>
-              <a:ext uri="{FF2B5EF4-FFF2-40B4-BE49-F238E27FC236}">
-                <a16:creationId xmlns:a16="http://schemas.microsoft.com/office/drawing/2014/main" id="{388F20F8-60BF-42FE-A252-DFD5A74451CA}"/>
-              </a:ext>
-              <a:ext uri="{C183D7F6-B498-43B3-948B-1728B52AA6E4}">
-                <adec:decorative xmlns:adec="http://schemas.microsoft.com/office/drawing/2017/decorative" val="1"/>
-              </a:ext>
-            </a:extLst>
-          </p:cNvPr>
-          <p:cNvSpPr>
-            <a:spLocks noGrp="1" noRot="1" noChangeAspect="1" noMove="1" noResize="1" noEditPoints="1" noAdjustHandles="1" noChangeArrowheads="1" noChangeShapeType="1" noTextEdit="1"/>
-          </p:cNvSpPr>
-          <p:nvPr>
-            <p:extLst>
-              <p:ext uri="{386F3935-93C4-4BCD-93E2-E3B085C9AB24}">
-                <p16:designElem xmlns:p16="http://schemas.microsoft.com/office/powerpoint/2015/main" val="1"/>
-              </p:ext>
-            </p:extLst>
-          </p:nvPr>
-        </p:nvSpPr>
-        <p:spPr>
-          <a:xfrm>
-            <a:off x="0" y="0"/>
-            <a:ext cx="12188952" cy="6858000"/>
-          </a:xfrm>
-          <a:prstGeom prst="rect">
-            <a:avLst/>
-          </a:prstGeom>
-          <a:ln>
-            <a:noFill/>
-          </a:ln>
-        </p:spPr>
-        <p:style>
-          <a:lnRef idx="2">
-            <a:schemeClr val="accent1">
-              <a:shade val="50000"/>
-            </a:schemeClr>
-          </a:lnRef>
-          <a:fillRef idx="1">
-            <a:schemeClr val="accent1"/>
-          </a:fillRef>
-          <a:effectRef idx="0">
-            <a:schemeClr val="accent1"/>
-          </a:effectRef>
-          <a:fontRef idx="minor">
-            <a:schemeClr val="lt1"/>
-          </a:fontRef>
-        </p:style>
-        <p:txBody>
-          <a:bodyPr rtlCol="0" anchor="ctr"/>
-          <a:lstStyle/>
-          <a:p>
-            <a:pPr algn="ctr"/>
-            <a:endParaRPr lang="en-US"/>
-          </a:p>
-        </p:txBody>
-      </p:sp>
-      <p:sp>
-        <p:nvSpPr>
-          <p:cNvPr id="11" name="Freeform: Shape 10">
-            <a:extLst>
-              <a:ext uri="{FF2B5EF4-FFF2-40B4-BE49-F238E27FC236}">
-                <a16:creationId xmlns:a16="http://schemas.microsoft.com/office/drawing/2014/main" id="{98A68847-134F-4AF1-B1C6-332344C9C90D}"/>
-              </a:ext>
-              <a:ext uri="{C183D7F6-B498-43B3-948B-1728B52AA6E4}">
-                <adec:decorative xmlns:adec="http://schemas.microsoft.com/office/drawing/2017/decorative" val="1"/>
-              </a:ext>
-            </a:extLst>
-          </p:cNvPr>
-          <p:cNvSpPr>
-            <a:spLocks noGrp="1" noRot="1" noChangeAspect="1" noMove="1" noResize="1" noEditPoints="1" noAdjustHandles="1" noChangeArrowheads="1" noChangeShapeType="1" noTextEdit="1"/>
-          </p:cNvSpPr>
-          <p:nvPr>
-            <p:extLst>
-              <p:ext uri="{386F3935-93C4-4BCD-93E2-E3B085C9AB24}">
-                <p16:designElem xmlns:p16="http://schemas.microsoft.com/office/powerpoint/2015/main" val="1"/>
-              </p:ext>
-            </p:extLst>
-          </p:nvPr>
-        </p:nvSpPr>
-        <p:spPr>
-          <a:xfrm flipH="1">
-            <a:off x="1" y="315111"/>
-            <a:ext cx="3021543" cy="1435442"/>
-          </a:xfrm>
-          <a:custGeom>
-            <a:avLst/>
-            <a:gdLst>
-              <a:gd name="connsiteX0" fmla="*/ 3021543 w 3021543"/>
-              <a:gd name="connsiteY0" fmla="*/ 0 h 1435442"/>
-              <a:gd name="connsiteX1" fmla="*/ 2963800 w 3021543"/>
-              <a:gd name="connsiteY1" fmla="*/ 7242 h 1435442"/>
-              <a:gd name="connsiteX2" fmla="*/ 2793803 w 3021543"/>
-              <a:gd name="connsiteY2" fmla="*/ 24082 h 1435442"/>
-              <a:gd name="connsiteX3" fmla="*/ 2414348 w 3021543"/>
-              <a:gd name="connsiteY3" fmla="*/ 29696 h 1435442"/>
-              <a:gd name="connsiteX4" fmla="*/ 2091558 w 3021543"/>
-              <a:gd name="connsiteY4" fmla="*/ 27450 h 1435442"/>
-              <a:gd name="connsiteX5" fmla="*/ 1645319 w 3021543"/>
-              <a:gd name="connsiteY5" fmla="*/ 28573 h 1435442"/>
-              <a:gd name="connsiteX6" fmla="*/ 1243602 w 3021543"/>
-              <a:gd name="connsiteY6" fmla="*/ 60008 h 1435442"/>
-              <a:gd name="connsiteX7" fmla="*/ 753851 w 3021543"/>
-              <a:gd name="connsiteY7" fmla="*/ 57763 h 1435442"/>
-              <a:gd name="connsiteX8" fmla="*/ 465465 w 3021543"/>
-              <a:gd name="connsiteY8" fmla="*/ 116142 h 1435442"/>
-              <a:gd name="connsiteX9" fmla="*/ 546416 w 3021543"/>
-              <a:gd name="connsiteY9" fmla="*/ 136351 h 1435442"/>
-              <a:gd name="connsiteX10" fmla="*/ 689091 w 3021543"/>
-              <a:gd name="connsiteY10" fmla="*/ 180136 h 1435442"/>
-              <a:gd name="connsiteX11" fmla="*/ 704269 w 3021543"/>
-              <a:gd name="connsiteY11" fmla="*/ 208203 h 1435442"/>
-              <a:gd name="connsiteX12" fmla="*/ 683020 w 3021543"/>
-              <a:gd name="connsiteY12" fmla="*/ 221675 h 1435442"/>
-              <a:gd name="connsiteX13" fmla="*/ 621295 w 3021543"/>
-              <a:gd name="connsiteY13" fmla="*/ 247496 h 1435442"/>
-              <a:gd name="connsiteX14" fmla="*/ 848968 w 3021543"/>
-              <a:gd name="connsiteY14" fmla="*/ 285668 h 1435442"/>
-              <a:gd name="connsiteX15" fmla="*/ 768018 w 3021543"/>
-              <a:gd name="connsiteY15" fmla="*/ 309244 h 1435442"/>
-              <a:gd name="connsiteX16" fmla="*/ 684032 w 3021543"/>
-              <a:gd name="connsiteY16" fmla="*/ 326085 h 1435442"/>
-              <a:gd name="connsiteX17" fmla="*/ 592962 w 3021543"/>
-              <a:gd name="connsiteY17" fmla="*/ 338434 h 1435442"/>
-              <a:gd name="connsiteX18" fmla="*/ 509988 w 3021543"/>
-              <a:gd name="connsiteY18" fmla="*/ 363133 h 1435442"/>
-              <a:gd name="connsiteX19" fmla="*/ 726531 w 3021543"/>
-              <a:gd name="connsiteY19" fmla="*/ 373237 h 1435442"/>
-              <a:gd name="connsiteX20" fmla="*/ 614212 w 3021543"/>
-              <a:gd name="connsiteY20" fmla="*/ 395691 h 1435442"/>
-              <a:gd name="connsiteX21" fmla="*/ 522131 w 3021543"/>
-              <a:gd name="connsiteY21" fmla="*/ 424881 h 1435442"/>
-              <a:gd name="connsiteX22" fmla="*/ 457370 w 3021543"/>
-              <a:gd name="connsiteY22" fmla="*/ 438353 h 1435442"/>
-              <a:gd name="connsiteX23" fmla="*/ 388562 w 3021543"/>
-              <a:gd name="connsiteY23" fmla="*/ 441721 h 1435442"/>
-              <a:gd name="connsiteX24" fmla="*/ 372372 w 3021543"/>
-              <a:gd name="connsiteY24" fmla="*/ 463052 h 1435442"/>
-              <a:gd name="connsiteX25" fmla="*/ 393622 w 3021543"/>
-              <a:gd name="connsiteY25" fmla="*/ 485506 h 1435442"/>
-              <a:gd name="connsiteX26" fmla="*/ 426002 w 3021543"/>
-              <a:gd name="connsiteY26" fmla="*/ 487751 h 1435442"/>
-              <a:gd name="connsiteX27" fmla="*/ 619271 w 3021543"/>
-              <a:gd name="connsiteY27" fmla="*/ 493365 h 1435442"/>
-              <a:gd name="connsiteX28" fmla="*/ 0 w 3021543"/>
-              <a:gd name="connsiteY28" fmla="*/ 542762 h 1435442"/>
-              <a:gd name="connsiteX29" fmla="*/ 83986 w 3021543"/>
-              <a:gd name="connsiteY29" fmla="*/ 573075 h 1435442"/>
-              <a:gd name="connsiteX30" fmla="*/ 112319 w 3021543"/>
-              <a:gd name="connsiteY30" fmla="*/ 656154 h 1435442"/>
-              <a:gd name="connsiteX31" fmla="*/ 215531 w 3021543"/>
-              <a:gd name="connsiteY31" fmla="*/ 703306 h 1435442"/>
-              <a:gd name="connsiteX32" fmla="*/ 282315 w 3021543"/>
-              <a:gd name="connsiteY32" fmla="*/ 720147 h 1435442"/>
-              <a:gd name="connsiteX33" fmla="*/ 435109 w 3021543"/>
-              <a:gd name="connsiteY33" fmla="*/ 744846 h 1435442"/>
-              <a:gd name="connsiteX34" fmla="*/ 457370 w 3021543"/>
-              <a:gd name="connsiteY34" fmla="*/ 785263 h 1435442"/>
-              <a:gd name="connsiteX35" fmla="*/ 476596 w 3021543"/>
-              <a:gd name="connsiteY35" fmla="*/ 830170 h 1435442"/>
-              <a:gd name="connsiteX36" fmla="*/ 517071 w 3021543"/>
-              <a:gd name="connsiteY36" fmla="*/ 859360 h 1435442"/>
-              <a:gd name="connsiteX37" fmla="*/ 202377 w 3021543"/>
-              <a:gd name="connsiteY37" fmla="*/ 854869 h 1435442"/>
-              <a:gd name="connsiteX38" fmla="*/ 557546 w 3021543"/>
-              <a:gd name="connsiteY38" fmla="*/ 949175 h 1435442"/>
-              <a:gd name="connsiteX39" fmla="*/ 526178 w 3021543"/>
-              <a:gd name="connsiteY39" fmla="*/ 986223 h 1435442"/>
-              <a:gd name="connsiteX40" fmla="*/ 720459 w 3021543"/>
-              <a:gd name="connsiteY40" fmla="*/ 1036744 h 1435442"/>
-              <a:gd name="connsiteX41" fmla="*/ 616236 w 3021543"/>
-              <a:gd name="connsiteY41" fmla="*/ 1042357 h 1435442"/>
-              <a:gd name="connsiteX42" fmla="*/ 1222353 w 3021543"/>
-              <a:gd name="connsiteY42" fmla="*/ 1253422 h 1435442"/>
-              <a:gd name="connsiteX43" fmla="*/ 2087511 w 3021543"/>
-              <a:gd name="connsiteY43" fmla="*/ 1406107 h 1435442"/>
-              <a:gd name="connsiteX44" fmla="*/ 2425479 w 3021543"/>
-              <a:gd name="connsiteY44" fmla="*/ 1435297 h 1435442"/>
-              <a:gd name="connsiteX45" fmla="*/ 2809994 w 3021543"/>
-              <a:gd name="connsiteY45" fmla="*/ 1426315 h 1435442"/>
-              <a:gd name="connsiteX46" fmla="*/ 2953618 w 3021543"/>
-              <a:gd name="connsiteY46" fmla="*/ 1417071 h 1435442"/>
-              <a:gd name="connsiteX47" fmla="*/ 3021543 w 3021543"/>
-              <a:gd name="connsiteY47" fmla="*/ 1407897 h 1435442"/>
-            </a:gdLst>
-            <a:ahLst/>
-            <a:cxnLst>
-              <a:cxn ang="0">
-                <a:pos x="connsiteX0" y="connsiteY0"/>
-              </a:cxn>
-              <a:cxn ang="0">
-                <a:pos x="connsiteX1" y="connsiteY1"/>
-              </a:cxn>
-              <a:cxn ang="0">
-                <a:pos x="connsiteX2" y="connsiteY2"/>
-              </a:cxn>
-              <a:cxn ang="0">
-                <a:pos x="connsiteX3" y="connsiteY3"/>
-              </a:cxn>
-              <a:cxn ang="0">
-                <a:pos x="connsiteX4" y="connsiteY4"/>
-              </a:cxn>
-              <a:cxn ang="0">
-                <a:pos x="connsiteX5" y="connsiteY5"/>
-              </a:cxn>
-              <a:cxn ang="0">
-                <a:pos x="connsiteX6" y="connsiteY6"/>
-              </a:cxn>
-              <a:cxn ang="0">
-                <a:pos x="connsiteX7" y="connsiteY7"/>
-              </a:cxn>
-              <a:cxn ang="0">
-                <a:pos x="connsiteX8" y="connsiteY8"/>
-              </a:cxn>
-              <a:cxn ang="0">
-                <a:pos x="connsiteX9" y="connsiteY9"/>
-              </a:cxn>
-              <a:cxn ang="0">
-                <a:pos x="connsiteX10" y="connsiteY10"/>
-              </a:cxn>
-              <a:cxn ang="0">
-                <a:pos x="connsiteX11" y="connsiteY11"/>
-              </a:cxn>
-              <a:cxn ang="0">
-                <a:pos x="connsiteX12" y="connsiteY12"/>
-              </a:cxn>
-              <a:cxn ang="0">
-                <a:pos x="connsiteX13" y="connsiteY13"/>
-              </a:cxn>
-              <a:cxn ang="0">
-                <a:pos x="connsiteX14" y="connsiteY14"/>
-              </a:cxn>
-              <a:cxn ang="0">
-                <a:pos x="connsiteX15" y="connsiteY15"/>
-              </a:cxn>
-              <a:cxn ang="0">
-                <a:pos x="connsiteX16" y="connsiteY16"/>
-              </a:cxn>
-              <a:cxn ang="0">
-                <a:pos x="connsiteX17" y="connsiteY17"/>
-              </a:cxn>
-              <a:cxn ang="0">
-                <a:pos x="connsiteX18" y="connsiteY18"/>
-              </a:cxn>
-              <a:cxn ang="0">
-                <a:pos x="connsiteX19" y="connsiteY19"/>
-              </a:cxn>
-              <a:cxn ang="0">
-                <a:pos x="connsiteX20" y="connsiteY20"/>
-              </a:cxn>
-              <a:cxn ang="0">
-                <a:pos x="connsiteX21" y="connsiteY21"/>
-              </a:cxn>
-              <a:cxn ang="0">
-                <a:pos x="connsiteX22" y="connsiteY22"/>
-              </a:cxn>
-              <a:cxn ang="0">
-                <a:pos x="connsiteX23" y="connsiteY23"/>
-              </a:cxn>
-              <a:cxn ang="0">
-                <a:pos x="connsiteX24" y="connsiteY24"/>
-              </a:cxn>
-              <a:cxn ang="0">
-                <a:pos x="connsiteX25" y="connsiteY25"/>
-              </a:cxn>
-              <a:cxn ang="0">
-                <a:pos x="connsiteX26" y="connsiteY26"/>
-              </a:cxn>
-              <a:cxn ang="0">
-                <a:pos x="connsiteX27" y="connsiteY27"/>
-              </a:cxn>
-              <a:cxn ang="0">
-                <a:pos x="connsiteX28" y="connsiteY28"/>
-              </a:cxn>
-              <a:cxn ang="0">
-                <a:pos x="connsiteX29" y="connsiteY29"/>
-              </a:cxn>
-              <a:cxn ang="0">
-                <a:pos x="connsiteX30" y="connsiteY30"/>
-              </a:cxn>
-              <a:cxn ang="0">
-                <a:pos x="connsiteX31" y="connsiteY31"/>
-              </a:cxn>
-              <a:cxn ang="0">
-                <a:pos x="connsiteX32" y="connsiteY32"/>
-              </a:cxn>
-              <a:cxn ang="0">
-                <a:pos x="connsiteX33" y="connsiteY33"/>
-              </a:cxn>
-              <a:cxn ang="0">
-                <a:pos x="connsiteX34" y="connsiteY34"/>
-              </a:cxn>
-              <a:cxn ang="0">
-                <a:pos x="connsiteX35" y="connsiteY35"/>
-              </a:cxn>
-              <a:cxn ang="0">
-                <a:pos x="connsiteX36" y="connsiteY36"/>
-              </a:cxn>
-              <a:cxn ang="0">
-                <a:pos x="connsiteX37" y="connsiteY37"/>
-              </a:cxn>
-              <a:cxn ang="0">
-                <a:pos x="connsiteX38" y="connsiteY38"/>
-              </a:cxn>
-              <a:cxn ang="0">
-                <a:pos x="connsiteX39" y="connsiteY39"/>
-              </a:cxn>
-              <a:cxn ang="0">
-                <a:pos x="connsiteX40" y="connsiteY40"/>
-              </a:cxn>
-              <a:cxn ang="0">
-                <a:pos x="connsiteX41" y="connsiteY41"/>
-              </a:cxn>
-              <a:cxn ang="0">
-                <a:pos x="connsiteX42" y="connsiteY42"/>
-              </a:cxn>
-              <a:cxn ang="0">
-                <a:pos x="connsiteX43" y="connsiteY43"/>
-              </a:cxn>
-              <a:cxn ang="0">
-                <a:pos x="connsiteX44" y="connsiteY44"/>
-              </a:cxn>
-              <a:cxn ang="0">
-                <a:pos x="connsiteX45" y="connsiteY45"/>
-              </a:cxn>
-              <a:cxn ang="0">
-                <a:pos x="connsiteX46" y="connsiteY46"/>
-              </a:cxn>
-              <a:cxn ang="0">
-                <a:pos x="connsiteX47" y="connsiteY47"/>
-              </a:cxn>
-            </a:cxnLst>
-            <a:rect l="l" t="t" r="r" b="b"/>
-            <a:pathLst>
-              <a:path w="3021543" h="1435442">
-                <a:moveTo>
-                  <a:pt x="3021543" y="0"/>
-                </a:moveTo>
-                <a:lnTo>
-                  <a:pt x="2963800" y="7242"/>
-                </a:lnTo>
-                <a:cubicBezTo>
-                  <a:pt x="2907134" y="13978"/>
-                  <a:pt x="2850469" y="22960"/>
-                  <a:pt x="2793803" y="24082"/>
-                </a:cubicBezTo>
-                <a:cubicBezTo>
-                  <a:pt x="2667318" y="27450"/>
-                  <a:pt x="2539821" y="19592"/>
-                  <a:pt x="2414348" y="29696"/>
-                </a:cubicBezTo>
-                <a:cubicBezTo>
-                  <a:pt x="2307089" y="38677"/>
-                  <a:pt x="2198818" y="28573"/>
-                  <a:pt x="2091558" y="27450"/>
-                </a:cubicBezTo>
-                <a:cubicBezTo>
-                  <a:pt x="1942812" y="26328"/>
-                  <a:pt x="1793053" y="18469"/>
-                  <a:pt x="1645319" y="28573"/>
-                </a:cubicBezTo>
-                <a:cubicBezTo>
-                  <a:pt x="1510738" y="36432"/>
-                  <a:pt x="1376158" y="38677"/>
-                  <a:pt x="1243602" y="60008"/>
-                </a:cubicBezTo>
-                <a:cubicBezTo>
-                  <a:pt x="1079677" y="71235"/>
-                  <a:pt x="916765" y="64499"/>
-                  <a:pt x="753851" y="57763"/>
-                </a:cubicBezTo>
-                <a:cubicBezTo>
-                  <a:pt x="653675" y="53272"/>
-                  <a:pt x="554511" y="38677"/>
-                  <a:pt x="465465" y="116142"/>
-                </a:cubicBezTo>
-                <a:cubicBezTo>
-                  <a:pt x="489751" y="134105"/>
-                  <a:pt x="519095" y="130737"/>
-                  <a:pt x="546416" y="136351"/>
-                </a:cubicBezTo>
-                <a:cubicBezTo>
-                  <a:pt x="594986" y="147578"/>
-                  <a:pt x="643557" y="158804"/>
-                  <a:pt x="689091" y="180136"/>
-                </a:cubicBezTo>
-                <a:cubicBezTo>
-                  <a:pt x="699210" y="184626"/>
-                  <a:pt x="708317" y="193608"/>
-                  <a:pt x="704269" y="208203"/>
-                </a:cubicBezTo>
-                <a:cubicBezTo>
-                  <a:pt x="701234" y="219430"/>
-                  <a:pt x="691115" y="219430"/>
-                  <a:pt x="683020" y="221675"/>
-                </a:cubicBezTo>
-                <a:cubicBezTo>
-                  <a:pt x="664806" y="228411"/>
-                  <a:pt x="642545" y="223920"/>
-                  <a:pt x="621295" y="247496"/>
-                </a:cubicBezTo>
-                <a:cubicBezTo>
-                  <a:pt x="702245" y="259846"/>
-                  <a:pt x="780160" y="236270"/>
-                  <a:pt x="848968" y="285668"/>
-                </a:cubicBezTo>
-                <a:cubicBezTo>
-                  <a:pt x="823671" y="310367"/>
-                  <a:pt x="795339" y="304753"/>
-                  <a:pt x="768018" y="309244"/>
-                </a:cubicBezTo>
-                <a:cubicBezTo>
-                  <a:pt x="739685" y="313735"/>
-                  <a:pt x="712365" y="321594"/>
-                  <a:pt x="684032" y="326085"/>
-                </a:cubicBezTo>
-                <a:cubicBezTo>
-                  <a:pt x="653675" y="331698"/>
-                  <a:pt x="623319" y="332821"/>
-                  <a:pt x="592962" y="338434"/>
-                </a:cubicBezTo>
-                <a:cubicBezTo>
-                  <a:pt x="567666" y="342925"/>
-                  <a:pt x="540345" y="335066"/>
-                  <a:pt x="509988" y="363133"/>
-                </a:cubicBezTo>
-                <a:cubicBezTo>
-                  <a:pt x="584867" y="383342"/>
-                  <a:pt x="652663" y="353029"/>
-                  <a:pt x="726531" y="373237"/>
-                </a:cubicBezTo>
-                <a:cubicBezTo>
-                  <a:pt x="683020" y="391200"/>
-                  <a:pt x="647604" y="385587"/>
-                  <a:pt x="614212" y="395691"/>
-                </a:cubicBezTo>
-                <a:cubicBezTo>
-                  <a:pt x="583855" y="405795"/>
-                  <a:pt x="547428" y="394568"/>
-                  <a:pt x="522131" y="424881"/>
-                </a:cubicBezTo>
-                <a:cubicBezTo>
-                  <a:pt x="502905" y="448457"/>
-                  <a:pt x="482668" y="451825"/>
-                  <a:pt x="457370" y="438353"/>
-                </a:cubicBezTo>
-                <a:cubicBezTo>
-                  <a:pt x="435109" y="426003"/>
-                  <a:pt x="410824" y="429371"/>
-                  <a:pt x="388562" y="441721"/>
-                </a:cubicBezTo>
-                <a:cubicBezTo>
-                  <a:pt x="380468" y="446212"/>
-                  <a:pt x="372372" y="451825"/>
-                  <a:pt x="372372" y="463052"/>
-                </a:cubicBezTo>
-                <a:cubicBezTo>
-                  <a:pt x="372372" y="478770"/>
-                  <a:pt x="382491" y="483260"/>
-                  <a:pt x="393622" y="485506"/>
-                </a:cubicBezTo>
-                <a:cubicBezTo>
-                  <a:pt x="403741" y="487751"/>
-                  <a:pt x="415883" y="489997"/>
-                  <a:pt x="426002" y="487751"/>
-                </a:cubicBezTo>
-                <a:cubicBezTo>
-                  <a:pt x="490762" y="475402"/>
-                  <a:pt x="554511" y="495610"/>
-                  <a:pt x="619271" y="493365"/>
-                </a:cubicBezTo>
-                <a:cubicBezTo>
-                  <a:pt x="415883" y="541640"/>
-                  <a:pt x="210471" y="525922"/>
-                  <a:pt x="0" y="542762"/>
-                </a:cubicBezTo>
-                <a:cubicBezTo>
-                  <a:pt x="27321" y="576443"/>
-                  <a:pt x="62737" y="548376"/>
-                  <a:pt x="83986" y="573075"/>
-                </a:cubicBezTo>
-                <a:cubicBezTo>
-                  <a:pt x="63748" y="624719"/>
-                  <a:pt x="71844" y="652785"/>
-                  <a:pt x="112319" y="656154"/>
-                </a:cubicBezTo>
-                <a:cubicBezTo>
-                  <a:pt x="151782" y="659522"/>
-                  <a:pt x="194281" y="641559"/>
-                  <a:pt x="215531" y="703306"/>
-                </a:cubicBezTo>
-                <a:cubicBezTo>
-                  <a:pt x="221602" y="722392"/>
-                  <a:pt x="259042" y="716779"/>
-                  <a:pt x="282315" y="720147"/>
-                </a:cubicBezTo>
-                <a:cubicBezTo>
-                  <a:pt x="332909" y="728005"/>
-                  <a:pt x="386539" y="720147"/>
-                  <a:pt x="435109" y="744846"/>
-                </a:cubicBezTo>
-                <a:cubicBezTo>
-                  <a:pt x="454335" y="753827"/>
-                  <a:pt x="467489" y="760563"/>
-                  <a:pt x="457370" y="785263"/>
-                </a:cubicBezTo>
-                <a:cubicBezTo>
-                  <a:pt x="447252" y="811084"/>
-                  <a:pt x="460406" y="820066"/>
-                  <a:pt x="476596" y="830170"/>
-                </a:cubicBezTo>
-                <a:cubicBezTo>
-                  <a:pt x="488739" y="838028"/>
-                  <a:pt x="506953" y="835783"/>
-                  <a:pt x="517071" y="859360"/>
-                </a:cubicBezTo>
-                <a:cubicBezTo>
-                  <a:pt x="410824" y="855992"/>
-                  <a:pt x="307612" y="836906"/>
-                  <a:pt x="202377" y="854869"/>
-                </a:cubicBezTo>
-                <a:cubicBezTo>
-                  <a:pt x="317731" y="899776"/>
-                  <a:pt x="444216" y="897531"/>
-                  <a:pt x="557546" y="949175"/>
-                </a:cubicBezTo>
-                <a:cubicBezTo>
-                  <a:pt x="553499" y="967137"/>
-                  <a:pt x="527190" y="959278"/>
-                  <a:pt x="526178" y="986223"/>
-                </a:cubicBezTo>
-                <a:cubicBezTo>
-                  <a:pt x="585879" y="1014290"/>
-                  <a:pt x="657723" y="995204"/>
-                  <a:pt x="720459" y="1036744"/>
-                </a:cubicBezTo>
-                <a:cubicBezTo>
-                  <a:pt x="684032" y="1055829"/>
-                  <a:pt x="650640" y="1024394"/>
-                  <a:pt x="616236" y="1042357"/>
-                </a:cubicBezTo>
-                <a:cubicBezTo>
-                  <a:pt x="627367" y="1069302"/>
-                  <a:pt x="1131283" y="1235459"/>
-                  <a:pt x="1222353" y="1253422"/>
-                </a:cubicBezTo>
-                <a:cubicBezTo>
-                  <a:pt x="1407527" y="1290470"/>
-                  <a:pt x="1940788" y="1384776"/>
-                  <a:pt x="2087511" y="1406107"/>
-                </a:cubicBezTo>
-                <a:cubicBezTo>
-                  <a:pt x="2200841" y="1421824"/>
-                  <a:pt x="2313160" y="1434174"/>
-                  <a:pt x="2425479" y="1435297"/>
-                </a:cubicBezTo>
-                <a:cubicBezTo>
-                  <a:pt x="2553988" y="1436419"/>
-                  <a:pt x="2681485" y="1430806"/>
-                  <a:pt x="2809994" y="1426315"/>
-                </a:cubicBezTo>
-                <a:cubicBezTo>
-                  <a:pt x="2858058" y="1424631"/>
-                  <a:pt x="2905933" y="1421684"/>
-                  <a:pt x="2953618" y="1417071"/>
-                </a:cubicBezTo>
-                <a:lnTo>
-                  <a:pt x="3021543" y="1407897"/>
-                </a:lnTo>
-                <a:close/>
-              </a:path>
-            </a:pathLst>
-          </a:custGeom>
-          <a:solidFill>
-            <a:schemeClr val="accent1">
-              <a:alpha val="20000"/>
-            </a:schemeClr>
-          </a:solidFill>
-          <a:ln w="32707" cap="flat">
-            <a:noFill/>
-            <a:prstDash val="solid"/>
-            <a:miter/>
-          </a:ln>
-        </p:spPr>
-        <p:txBody>
-          <a:bodyPr wrap="square" rtlCol="0" anchor="ctr">
-            <a:noAutofit/>
-          </a:bodyPr>
-          <a:lstStyle/>
-          <a:p>
-            <a:endParaRPr lang="en-US"/>
-          </a:p>
-        </p:txBody>
-      </p:sp>
-      <p:sp>
-        <p:nvSpPr>
-          <p:cNvPr id="2" name="Título 1">
-            <a:extLst>
-              <a:ext uri="{FF2B5EF4-FFF2-40B4-BE49-F238E27FC236}">
-                <a16:creationId xmlns:a16="http://schemas.microsoft.com/office/drawing/2014/main" id="{726B366D-8A82-4CB9-8DF7-BACAC2C07245}"/>
-              </a:ext>
-            </a:extLst>
-          </p:cNvPr>
-          <p:cNvSpPr>
-            <a:spLocks noGrp="1"/>
-          </p:cNvSpPr>
-          <p:nvPr>
-            <p:ph type="title"/>
-          </p:nvPr>
-        </p:nvSpPr>
-        <p:spPr>
-          <a:xfrm>
-            <a:off x="838200" y="365125"/>
-            <a:ext cx="10515600" cy="1325563"/>
-          </a:xfrm>
-        </p:spPr>
-        <p:txBody>
-          <a:bodyPr>
-            <a:normAutofit/>
-          </a:bodyPr>
-          <a:lstStyle/>
-          <a:p>
-            <a:r>
-              <a:rPr lang="es-CO" b="1" i="1">
-                <a:effectLst/>
-                <a:latin typeface="-apple-system"/>
-              </a:rPr>
-              <a:t>Valores agregados y diferenciadores de la aplicación</a:t>
-            </a:r>
-            <a:endParaRPr lang="es-CO" dirty="0"/>
-          </a:p>
-        </p:txBody>
-      </p:sp>
-      <p:graphicFrame>
-        <p:nvGraphicFramePr>
-          <p:cNvPr id="5" name="Marcador de contenido 2">
-            <a:extLst>
-              <a:ext uri="{FF2B5EF4-FFF2-40B4-BE49-F238E27FC236}">
-                <a16:creationId xmlns:a16="http://schemas.microsoft.com/office/drawing/2014/main" id="{5C13D3AF-FA6C-47E9-9F47-7C51CAA391E9}"/>
-              </a:ext>
-            </a:extLst>
-          </p:cNvPr>
-          <p:cNvGraphicFramePr>
-            <a:graphicFrameLocks noGrp="1"/>
-          </p:cNvGraphicFramePr>
-          <p:nvPr>
-            <p:ph idx="1"/>
-            <p:extLst>
-              <p:ext uri="{D42A27DB-BD31-4B8C-83A1-F6EECF244321}">
-                <p14:modId xmlns:p14="http://schemas.microsoft.com/office/powerpoint/2010/main" val="641996968"/>
-              </p:ext>
-            </p:extLst>
-          </p:nvPr>
-        </p:nvGraphicFramePr>
-        <p:xfrm>
-          <a:off x="838200" y="2011363"/>
-          <a:ext cx="10515600" cy="4160837"/>
-        </p:xfrm>
-        <a:graphic>
-          <a:graphicData uri="http://schemas.openxmlformats.org/drawingml/2006/diagram">
-            <dgm:relIds xmlns:dgm="http://schemas.openxmlformats.org/drawingml/2006/diagram" xmlns:r="http://schemas.openxmlformats.org/officeDocument/2006/relationships" r:dm="rId2" r:lo="rId3" r:qs="rId4" r:cs="rId5"/>
-          </a:graphicData>
-        </a:graphic>
-      </p:graphicFrame>
-    </p:spTree>
-    <p:extLst>
-      <p:ext uri="{BB962C8B-B14F-4D97-AF65-F5344CB8AC3E}">
-        <p14:creationId xmlns:p14="http://schemas.microsoft.com/office/powerpoint/2010/main" val="1652918174"/>
-      </p:ext>
-    </p:extLst>
-  </p:cSld>
-  <p:clrMapOvr>
-    <a:masterClrMapping/>
-  </p:clrMapOvr>
-</p:sld>
-</file>
-
-<file path=ppt/slides/slide4.xml><?xml version="1.0" encoding="utf-8"?>
-<p:sld xmlns:a="http://schemas.openxmlformats.org/drawingml/2006/main" xmlns:r="http://schemas.openxmlformats.org/officeDocument/2006/relationships" xmlns:p="http://schemas.openxmlformats.org/presentationml/2006/main">
-  <p:cSld>
-    <p:spTree>
-      <p:nvGrpSpPr>
-        <p:cNvPr id="1" name=""/>
-        <p:cNvGrpSpPr/>
-        <p:nvPr/>
-      </p:nvGrpSpPr>
-      <p:grpSpPr>
-        <a:xfrm>
-          <a:off x="0" y="0"/>
-          <a:ext cx="0" cy="0"/>
-          <a:chOff x="0" y="0"/>
-          <a:chExt cx="0" cy="0"/>
-        </a:xfrm>
-      </p:grpSpPr>
-      <p:sp>
-        <p:nvSpPr>
-          <p:cNvPr id="2" name="Título 1">
-            <a:extLst>
-              <a:ext uri="{FF2B5EF4-FFF2-40B4-BE49-F238E27FC236}">
-                <a16:creationId xmlns:a16="http://schemas.microsoft.com/office/drawing/2014/main" id="{B44E00A9-DB0D-48FE-8BEA-9C78BAC56E03}"/>
-              </a:ext>
-            </a:extLst>
-          </p:cNvPr>
-          <p:cNvSpPr>
-            <a:spLocks noGrp="1"/>
-          </p:cNvSpPr>
-          <p:nvPr>
-            <p:ph type="title"/>
-          </p:nvPr>
-        </p:nvSpPr>
-        <p:spPr/>
-        <p:txBody>
-          <a:bodyPr/>
-          <a:lstStyle/>
-          <a:p>
-            <a:r>
-              <a:rPr lang="es-CO" b="1" i="1" dirty="0">
-                <a:solidFill>
-                  <a:srgbClr val="24292E"/>
-                </a:solidFill>
-                <a:effectLst/>
-                <a:latin typeface="-apple-system"/>
-              </a:rPr>
-              <a:t>Mockups</a:t>
-            </a:r>
-            <a:endParaRPr lang="es-CO" dirty="0"/>
-          </a:p>
-        </p:txBody>
-      </p:sp>
-      <p:pic>
-        <p:nvPicPr>
-          <p:cNvPr id="4" name="Imagen 3">
-            <a:extLst>
-              <a:ext uri="{FF2B5EF4-FFF2-40B4-BE49-F238E27FC236}">
-                <a16:creationId xmlns:a16="http://schemas.microsoft.com/office/drawing/2014/main" id="{2126ABB3-295A-458F-A08D-F19FF67C6E94}"/>
-              </a:ext>
-            </a:extLst>
-          </p:cNvPr>
-          <p:cNvPicPr>
-            <a:picLocks noChangeAspect="1"/>
-          </p:cNvPicPr>
-          <p:nvPr/>
-        </p:nvPicPr>
-        <p:blipFill>
-          <a:blip r:embed="rId2"/>
-          <a:stretch>
-            <a:fillRect/>
-          </a:stretch>
-        </p:blipFill>
-        <p:spPr>
-          <a:xfrm>
-            <a:off x="2499810" y="1341170"/>
-            <a:ext cx="7663919" cy="5359668"/>
-          </a:xfrm>
-          <a:prstGeom prst="rect">
-            <a:avLst/>
-          </a:prstGeom>
-        </p:spPr>
-      </p:pic>
-    </p:spTree>
-    <p:extLst>
-      <p:ext uri="{BB962C8B-B14F-4D97-AF65-F5344CB8AC3E}">
-        <p14:creationId xmlns:p14="http://schemas.microsoft.com/office/powerpoint/2010/main" val="2777361648"/>
-      </p:ext>
-    </p:extLst>
-  </p:cSld>
-  <p:clrMapOvr>
-    <a:masterClrMapping/>
-  </p:clrMapOvr>
-</p:sld>
-</file>
-
-<file path=ppt/slides/slide5.xml><?xml version="1.0" encoding="utf-8"?>
-<p:sld xmlns:a="http://schemas.openxmlformats.org/drawingml/2006/main" xmlns:r="http://schemas.openxmlformats.org/officeDocument/2006/relationships" xmlns:p="http://schemas.openxmlformats.org/presentationml/2006/main">
-  <p:cSld>
     <p:spTree>
       <p:nvGrpSpPr>
         <p:cNvPr id="1" name=""/>
@@ -22419,7 +18379,7 @@
 </p:sld>
 </file>
 
-<file path=ppt/slides/slide6.xml><?xml version="1.0" encoding="utf-8"?>
+<file path=ppt/slides/slide4.xml><?xml version="1.0" encoding="utf-8"?>
 <p:sld xmlns:a="http://schemas.openxmlformats.org/drawingml/2006/main" xmlns:r="http://schemas.openxmlformats.org/officeDocument/2006/relationships" xmlns:p="http://schemas.openxmlformats.org/presentationml/2006/main">
   <p:cSld>
     <p:spTree>
@@ -22556,7 +18516,7 @@
 </p:sld>
 </file>
 
-<file path=ppt/slides/slide7.xml><?xml version="1.0" encoding="utf-8"?>
+<file path=ppt/slides/slide5.xml><?xml version="1.0" encoding="utf-8"?>
 <p:sld xmlns:a="http://schemas.openxmlformats.org/drawingml/2006/main" xmlns:r="http://schemas.openxmlformats.org/officeDocument/2006/relationships" xmlns:p="http://schemas.openxmlformats.org/presentationml/2006/main">
   <p:cSld>
     <p:spTree>
@@ -22664,7 +18624,7 @@
 </p:sld>
 </file>
 
-<file path=ppt/slides/slide8.xml><?xml version="1.0" encoding="utf-8"?>
+<file path=ppt/slides/slide6.xml><?xml version="1.0" encoding="utf-8"?>
 <p:sld xmlns:a="http://schemas.openxmlformats.org/drawingml/2006/main" xmlns:r="http://schemas.openxmlformats.org/officeDocument/2006/relationships" xmlns:p="http://schemas.openxmlformats.org/presentationml/2006/main">
   <p:cSld>
     <p:spTree>
@@ -22765,7 +18725,7 @@
 </p:sld>
 </file>
 
-<file path=ppt/slides/slide9.xml><?xml version="1.0" encoding="utf-8"?>
+<file path=ppt/slides/slide7.xml><?xml version="1.0" encoding="utf-8"?>
 <p:sld xmlns:a="http://schemas.openxmlformats.org/drawingml/2006/main" xmlns:r="http://schemas.openxmlformats.org/officeDocument/2006/relationships" xmlns:p="http://schemas.openxmlformats.org/presentationml/2006/main">
   <p:cSld>
     <p:spTree>
@@ -22881,6 +18841,488 @@
     <p:extLst>
       <p:ext uri="{BB962C8B-B14F-4D97-AF65-F5344CB8AC3E}">
         <p14:creationId xmlns:p14="http://schemas.microsoft.com/office/powerpoint/2010/main" val="2364458723"/>
+      </p:ext>
+    </p:extLst>
+  </p:cSld>
+  <p:clrMapOvr>
+    <a:masterClrMapping/>
+  </p:clrMapOvr>
+</p:sld>
+</file>
+
+<file path=ppt/slides/slide8.xml><?xml version="1.0" encoding="utf-8"?>
+<p:sld xmlns:a="http://schemas.openxmlformats.org/drawingml/2006/main" xmlns:r="http://schemas.openxmlformats.org/officeDocument/2006/relationships" xmlns:p="http://schemas.openxmlformats.org/presentationml/2006/main">
+  <p:cSld>
+    <p:spTree>
+      <p:nvGrpSpPr>
+        <p:cNvPr id="1" name=""/>
+        <p:cNvGrpSpPr/>
+        <p:nvPr/>
+      </p:nvGrpSpPr>
+      <p:grpSpPr>
+        <a:xfrm>
+          <a:off x="0" y="0"/>
+          <a:ext cx="0" cy="0"/>
+          <a:chOff x="0" y="0"/>
+          <a:chExt cx="0" cy="0"/>
+        </a:xfrm>
+      </p:grpSpPr>
+      <p:sp>
+        <p:nvSpPr>
+          <p:cNvPr id="4" name="Título 1">
+            <a:extLst>
+              <a:ext uri="{FF2B5EF4-FFF2-40B4-BE49-F238E27FC236}">
+                <a16:creationId xmlns:a16="http://schemas.microsoft.com/office/drawing/2014/main" id="{4A70FBBF-6280-476B-BEB6-140ADEBC943A}"/>
+              </a:ext>
+            </a:extLst>
+          </p:cNvPr>
+          <p:cNvSpPr txBox="1">
+            <a:spLocks/>
+          </p:cNvSpPr>
+          <p:nvPr/>
+        </p:nvSpPr>
+        <p:spPr>
+          <a:xfrm>
+            <a:off x="838200" y="313882"/>
+            <a:ext cx="10515600" cy="1325563"/>
+          </a:xfrm>
+          <a:prstGeom prst="rect">
+            <a:avLst/>
+          </a:prstGeom>
+        </p:spPr>
+        <p:txBody>
+          <a:bodyPr vert="horz" lIns="91440" tIns="45720" rIns="91440" bIns="45720" rtlCol="0" anchor="ctr">
+            <a:normAutofit/>
+          </a:bodyPr>
+          <a:lstStyle>
+            <a:lvl1pPr algn="l" defTabSz="914400" rtl="0" eaLnBrk="1" latinLnBrk="0" hangingPunct="1">
+              <a:lnSpc>
+                <a:spcPct val="90000"/>
+              </a:lnSpc>
+              <a:spcBef>
+                <a:spcPct val="0"/>
+              </a:spcBef>
+              <a:buNone/>
+              <a:defRPr sz="4000" i="1" kern="1200">
+                <a:solidFill>
+                  <a:schemeClr val="tx1"/>
+                </a:solidFill>
+                <a:latin typeface="+mj-lt"/>
+                <a:ea typeface="+mj-ea"/>
+                <a:cs typeface="+mj-cs"/>
+              </a:defRPr>
+            </a:lvl1pPr>
+          </a:lstStyle>
+          <a:p>
+            <a:r>
+              <a:rPr lang="es-CO" b="1" dirty="0">
+                <a:solidFill>
+                  <a:srgbClr val="24292E"/>
+                </a:solidFill>
+                <a:latin typeface="-apple-system"/>
+              </a:rPr>
+              <a:t>Diagrama de despliegue</a:t>
+            </a:r>
+            <a:endParaRPr lang="es-CO" b="1" i="0" dirty="0">
+              <a:solidFill>
+                <a:srgbClr val="24292E"/>
+              </a:solidFill>
+              <a:latin typeface="-apple-system"/>
+            </a:endParaRPr>
+          </a:p>
+        </p:txBody>
+      </p:sp>
+      <p:pic>
+        <p:nvPicPr>
+          <p:cNvPr id="2" name="Imagen 1">
+            <a:extLst>
+              <a:ext uri="{FF2B5EF4-FFF2-40B4-BE49-F238E27FC236}">
+                <a16:creationId xmlns:a16="http://schemas.microsoft.com/office/drawing/2014/main" id="{6B9FD2A0-3259-447A-A6F9-66DEA0500292}"/>
+              </a:ext>
+            </a:extLst>
+          </p:cNvPr>
+          <p:cNvPicPr>
+            <a:picLocks noChangeAspect="1"/>
+          </p:cNvPicPr>
+          <p:nvPr/>
+        </p:nvPicPr>
+        <p:blipFill>
+          <a:blip r:embed="rId2"/>
+          <a:stretch>
+            <a:fillRect/>
+          </a:stretch>
+        </p:blipFill>
+        <p:spPr>
+          <a:xfrm>
+            <a:off x="2276668" y="1336891"/>
+            <a:ext cx="7107311" cy="5381150"/>
+          </a:xfrm>
+          <a:prstGeom prst="rect">
+            <a:avLst/>
+          </a:prstGeom>
+        </p:spPr>
+      </p:pic>
+      <p:sp>
+        <p:nvSpPr>
+          <p:cNvPr id="3" name="CuadroTexto 2">
+            <a:extLst>
+              <a:ext uri="{FF2B5EF4-FFF2-40B4-BE49-F238E27FC236}">
+                <a16:creationId xmlns:a16="http://schemas.microsoft.com/office/drawing/2014/main" id="{CB4EEE1B-871B-4121-AE56-6570544D978A}"/>
+              </a:ext>
+            </a:extLst>
+          </p:cNvPr>
+          <p:cNvSpPr txBox="1"/>
+          <p:nvPr/>
+        </p:nvSpPr>
+        <p:spPr>
+          <a:xfrm>
+            <a:off x="5318449" y="2239347"/>
+            <a:ext cx="1138335" cy="261610"/>
+          </a:xfrm>
+          <a:prstGeom prst="rect">
+            <a:avLst/>
+          </a:prstGeom>
+          <a:noFill/>
+        </p:spPr>
+        <p:txBody>
+          <a:bodyPr wrap="square" rtlCol="0">
+            <a:spAutoFit/>
+          </a:bodyPr>
+          <a:lstStyle/>
+          <a:p>
+            <a:r>
+              <a:rPr lang="es-MX" sz="1100" dirty="0"/>
+              <a:t>&lt;&lt;</a:t>
+            </a:r>
+            <a:r>
+              <a:rPr lang="es-MX" sz="1100" dirty="0" err="1"/>
+              <a:t>protocol</a:t>
+            </a:r>
+            <a:r>
+              <a:rPr lang="es-MX" sz="1100" dirty="0"/>
+              <a:t>&gt;&gt;</a:t>
+            </a:r>
+            <a:endParaRPr lang="es-CO" sz="1100" dirty="0"/>
+          </a:p>
+        </p:txBody>
+      </p:sp>
+      <p:sp>
+        <p:nvSpPr>
+          <p:cNvPr id="5" name="CuadroTexto 4">
+            <a:extLst>
+              <a:ext uri="{FF2B5EF4-FFF2-40B4-BE49-F238E27FC236}">
+                <a16:creationId xmlns:a16="http://schemas.microsoft.com/office/drawing/2014/main" id="{E24FB7D9-1343-4900-8019-EC6C483388F6}"/>
+              </a:ext>
+            </a:extLst>
+          </p:cNvPr>
+          <p:cNvSpPr txBox="1"/>
+          <p:nvPr/>
+        </p:nvSpPr>
+        <p:spPr>
+          <a:xfrm>
+            <a:off x="5452673" y="2662454"/>
+            <a:ext cx="1138335" cy="261610"/>
+          </a:xfrm>
+          <a:prstGeom prst="rect">
+            <a:avLst/>
+          </a:prstGeom>
+          <a:noFill/>
+        </p:spPr>
+        <p:txBody>
+          <a:bodyPr wrap="square" rtlCol="0">
+            <a:spAutoFit/>
+          </a:bodyPr>
+          <a:lstStyle/>
+          <a:p>
+            <a:r>
+              <a:rPr lang="es-MX" sz="1100" dirty="0"/>
+              <a:t>HTTP:8080</a:t>
+            </a:r>
+            <a:endParaRPr lang="es-CO" sz="1100" dirty="0"/>
+          </a:p>
+        </p:txBody>
+      </p:sp>
+      <p:sp>
+        <p:nvSpPr>
+          <p:cNvPr id="9" name="CuadroTexto 8">
+            <a:extLst>
+              <a:ext uri="{FF2B5EF4-FFF2-40B4-BE49-F238E27FC236}">
+                <a16:creationId xmlns:a16="http://schemas.microsoft.com/office/drawing/2014/main" id="{20107866-B5B3-43C4-AE94-F27B52D21EF2}"/>
+              </a:ext>
+            </a:extLst>
+          </p:cNvPr>
+          <p:cNvSpPr txBox="1"/>
+          <p:nvPr/>
+        </p:nvSpPr>
+        <p:spPr>
+          <a:xfrm>
+            <a:off x="6885850" y="4203769"/>
+            <a:ext cx="1138335" cy="261610"/>
+          </a:xfrm>
+          <a:prstGeom prst="rect">
+            <a:avLst/>
+          </a:prstGeom>
+          <a:noFill/>
+        </p:spPr>
+        <p:txBody>
+          <a:bodyPr wrap="square" rtlCol="0">
+            <a:spAutoFit/>
+          </a:bodyPr>
+          <a:lstStyle/>
+          <a:p>
+            <a:r>
+              <a:rPr lang="es-MX" sz="1100" dirty="0"/>
+              <a:t>&lt;&lt;</a:t>
+            </a:r>
+            <a:r>
+              <a:rPr lang="es-MX" sz="1100" dirty="0" err="1"/>
+              <a:t>protocol</a:t>
+            </a:r>
+            <a:r>
+              <a:rPr lang="es-MX" sz="1100" dirty="0"/>
+              <a:t>&gt;&gt;</a:t>
+            </a:r>
+            <a:endParaRPr lang="es-CO" sz="1100" dirty="0"/>
+          </a:p>
+        </p:txBody>
+      </p:sp>
+      <p:sp>
+        <p:nvSpPr>
+          <p:cNvPr id="11" name="CuadroTexto 10">
+            <a:extLst>
+              <a:ext uri="{FF2B5EF4-FFF2-40B4-BE49-F238E27FC236}">
+                <a16:creationId xmlns:a16="http://schemas.microsoft.com/office/drawing/2014/main" id="{B88684C4-EAAE-4E34-809B-5D19A74AD07D}"/>
+              </a:ext>
+            </a:extLst>
+          </p:cNvPr>
+          <p:cNvSpPr txBox="1"/>
+          <p:nvPr/>
+        </p:nvSpPr>
+        <p:spPr>
+          <a:xfrm>
+            <a:off x="8024185" y="4203769"/>
+            <a:ext cx="1138335" cy="261610"/>
+          </a:xfrm>
+          <a:prstGeom prst="rect">
+            <a:avLst/>
+          </a:prstGeom>
+          <a:noFill/>
+        </p:spPr>
+        <p:txBody>
+          <a:bodyPr wrap="square" rtlCol="0">
+            <a:spAutoFit/>
+          </a:bodyPr>
+          <a:lstStyle/>
+          <a:p>
+            <a:r>
+              <a:rPr lang="es-MX" sz="1100" dirty="0"/>
+              <a:t>HTTP:80</a:t>
+            </a:r>
+            <a:endParaRPr lang="es-CO" sz="1100" dirty="0"/>
+          </a:p>
+        </p:txBody>
+      </p:sp>
+      <p:sp>
+        <p:nvSpPr>
+          <p:cNvPr id="13" name="CuadroTexto 12">
+            <a:extLst>
+              <a:ext uri="{FF2B5EF4-FFF2-40B4-BE49-F238E27FC236}">
+                <a16:creationId xmlns:a16="http://schemas.microsoft.com/office/drawing/2014/main" id="{937199CA-6262-426E-9F37-2299BD42C3CA}"/>
+              </a:ext>
+            </a:extLst>
+          </p:cNvPr>
+          <p:cNvSpPr txBox="1"/>
+          <p:nvPr/>
+        </p:nvSpPr>
+        <p:spPr>
+          <a:xfrm>
+            <a:off x="3683994" y="4078285"/>
+            <a:ext cx="1138335" cy="261610"/>
+          </a:xfrm>
+          <a:prstGeom prst="rect">
+            <a:avLst/>
+          </a:prstGeom>
+          <a:noFill/>
+        </p:spPr>
+        <p:txBody>
+          <a:bodyPr wrap="square" rtlCol="0">
+            <a:spAutoFit/>
+          </a:bodyPr>
+          <a:lstStyle/>
+          <a:p>
+            <a:r>
+              <a:rPr lang="es-MX" sz="1100" dirty="0"/>
+              <a:t>Port: 5432</a:t>
+            </a:r>
+            <a:endParaRPr lang="es-CO" sz="1100" dirty="0"/>
+          </a:p>
+        </p:txBody>
+      </p:sp>
+      <p:sp>
+        <p:nvSpPr>
+          <p:cNvPr id="15" name="CuadroTexto 14">
+            <a:extLst>
+              <a:ext uri="{FF2B5EF4-FFF2-40B4-BE49-F238E27FC236}">
+                <a16:creationId xmlns:a16="http://schemas.microsoft.com/office/drawing/2014/main" id="{5F9E0C64-61AE-4526-B34E-E9FD99EB7638}"/>
+              </a:ext>
+            </a:extLst>
+          </p:cNvPr>
+          <p:cNvSpPr txBox="1"/>
+          <p:nvPr/>
+        </p:nvSpPr>
+        <p:spPr>
+          <a:xfrm>
+            <a:off x="2808021" y="4078285"/>
+            <a:ext cx="1138335" cy="261610"/>
+          </a:xfrm>
+          <a:prstGeom prst="rect">
+            <a:avLst/>
+          </a:prstGeom>
+          <a:noFill/>
+        </p:spPr>
+        <p:txBody>
+          <a:bodyPr wrap="square" rtlCol="0">
+            <a:spAutoFit/>
+          </a:bodyPr>
+          <a:lstStyle/>
+          <a:p>
+            <a:r>
+              <a:rPr lang="es-MX" sz="1100" dirty="0"/>
+              <a:t>&lt;&lt;JDBC&gt;&gt;</a:t>
+            </a:r>
+            <a:endParaRPr lang="es-CO" sz="1100" dirty="0"/>
+          </a:p>
+        </p:txBody>
+      </p:sp>
+    </p:spTree>
+    <p:extLst>
+      <p:ext uri="{BB962C8B-B14F-4D97-AF65-F5344CB8AC3E}">
+        <p14:creationId xmlns:p14="http://schemas.microsoft.com/office/powerpoint/2010/main" val="3999526091"/>
+      </p:ext>
+    </p:extLst>
+  </p:cSld>
+  <p:clrMapOvr>
+    <a:masterClrMapping/>
+  </p:clrMapOvr>
+</p:sld>
+</file>
+
+<file path=ppt/slides/slide9.xml><?xml version="1.0" encoding="utf-8"?>
+<p:sld xmlns:a="http://schemas.openxmlformats.org/drawingml/2006/main" xmlns:r="http://schemas.openxmlformats.org/officeDocument/2006/relationships" xmlns:p="http://schemas.openxmlformats.org/presentationml/2006/main">
+  <p:cSld>
+    <p:spTree>
+      <p:nvGrpSpPr>
+        <p:cNvPr id="1" name=""/>
+        <p:cNvGrpSpPr/>
+        <p:nvPr/>
+      </p:nvGrpSpPr>
+      <p:grpSpPr>
+        <a:xfrm>
+          <a:off x="0" y="0"/>
+          <a:ext cx="0" cy="0"/>
+          <a:chOff x="0" y="0"/>
+          <a:chExt cx="0" cy="0"/>
+        </a:xfrm>
+      </p:grpSpPr>
+      <p:sp>
+        <p:nvSpPr>
+          <p:cNvPr id="4" name="Título 1">
+            <a:extLst>
+              <a:ext uri="{FF2B5EF4-FFF2-40B4-BE49-F238E27FC236}">
+                <a16:creationId xmlns:a16="http://schemas.microsoft.com/office/drawing/2014/main" id="{4A70FBBF-6280-476B-BEB6-140ADEBC943A}"/>
+              </a:ext>
+            </a:extLst>
+          </p:cNvPr>
+          <p:cNvSpPr txBox="1">
+            <a:spLocks/>
+          </p:cNvSpPr>
+          <p:nvPr/>
+        </p:nvSpPr>
+        <p:spPr>
+          <a:xfrm>
+            <a:off x="838200" y="313882"/>
+            <a:ext cx="10515600" cy="1325563"/>
+          </a:xfrm>
+          <a:prstGeom prst="rect">
+            <a:avLst/>
+          </a:prstGeom>
+        </p:spPr>
+        <p:txBody>
+          <a:bodyPr vert="horz" lIns="91440" tIns="45720" rIns="91440" bIns="45720" rtlCol="0" anchor="ctr">
+            <a:normAutofit/>
+          </a:bodyPr>
+          <a:lstStyle>
+            <a:lvl1pPr algn="l" defTabSz="914400" rtl="0" eaLnBrk="1" latinLnBrk="0" hangingPunct="1">
+              <a:lnSpc>
+                <a:spcPct val="90000"/>
+              </a:lnSpc>
+              <a:spcBef>
+                <a:spcPct val="0"/>
+              </a:spcBef>
+              <a:buNone/>
+              <a:defRPr sz="4000" i="1" kern="1200">
+                <a:solidFill>
+                  <a:schemeClr val="tx1"/>
+                </a:solidFill>
+                <a:latin typeface="+mj-lt"/>
+                <a:ea typeface="+mj-ea"/>
+                <a:cs typeface="+mj-cs"/>
+              </a:defRPr>
+            </a:lvl1pPr>
+          </a:lstStyle>
+          <a:p>
+            <a:r>
+              <a:rPr lang="es-CO" b="1">
+                <a:solidFill>
+                  <a:srgbClr val="24292E"/>
+                </a:solidFill>
+                <a:latin typeface="-apple-system"/>
+              </a:rPr>
+              <a:t>Test Coverage</a:t>
+            </a:r>
+            <a:endParaRPr lang="es-CO" b="1" i="0" dirty="0">
+              <a:solidFill>
+                <a:srgbClr val="24292E"/>
+              </a:solidFill>
+              <a:latin typeface="-apple-system"/>
+            </a:endParaRPr>
+          </a:p>
+        </p:txBody>
+      </p:sp>
+      <p:pic>
+        <p:nvPicPr>
+          <p:cNvPr id="6" name="Imagen 5">
+            <a:extLst>
+              <a:ext uri="{FF2B5EF4-FFF2-40B4-BE49-F238E27FC236}">
+                <a16:creationId xmlns:a16="http://schemas.microsoft.com/office/drawing/2014/main" id="{F3FFF914-E25D-4A23-8226-EAFE461E0284}"/>
+              </a:ext>
+            </a:extLst>
+          </p:cNvPr>
+          <p:cNvPicPr>
+            <a:picLocks noChangeAspect="1"/>
+          </p:cNvPicPr>
+          <p:nvPr/>
+        </p:nvPicPr>
+        <p:blipFill>
+          <a:blip r:embed="rId2"/>
+          <a:stretch>
+            <a:fillRect/>
+          </a:stretch>
+        </p:blipFill>
+        <p:spPr>
+          <a:xfrm>
+            <a:off x="1271587" y="2609850"/>
+            <a:ext cx="9648825" cy="1638300"/>
+          </a:xfrm>
+          <a:prstGeom prst="rect">
+            <a:avLst/>
+          </a:prstGeom>
+        </p:spPr>
+      </p:pic>
+    </p:spTree>
+    <p:extLst>
+      <p:ext uri="{BB962C8B-B14F-4D97-AF65-F5344CB8AC3E}">
+        <p14:creationId xmlns:p14="http://schemas.microsoft.com/office/powerpoint/2010/main" val="2250830390"/>
       </p:ext>
     </p:extLst>
   </p:cSld>

</xml_diff>